<commit_message>
tweaked slides based on feedback from fa24
</commit_message>
<xml_diff>
--- a/Slides/Module 05 Interaction-Level Design Patterns.pptx
+++ b/Slides/Module 05 Interaction-Level Design Patterns.pptx
@@ -5,7 +5,7 @@
     <p:sldMasterId id="2147483648" r:id="rId1"/>
   </p:sldMasterIdLst>
   <p:notesMasterIdLst>
-    <p:notesMasterId r:id="rId49"/>
+    <p:notesMasterId r:id="rId50"/>
   </p:notesMasterIdLst>
   <p:sldIdLst>
     <p:sldId id="485" r:id="rId2"/>
@@ -41,41 +41,42 @@
     <p:sldId id="510" r:id="rId32"/>
     <p:sldId id="512" r:id="rId33"/>
     <p:sldId id="513" r:id="rId34"/>
-    <p:sldId id="517" r:id="rId35"/>
-    <p:sldId id="518" r:id="rId36"/>
-    <p:sldId id="519" r:id="rId37"/>
-    <p:sldId id="456" r:id="rId38"/>
-    <p:sldId id="520" r:id="rId39"/>
-    <p:sldId id="521" r:id="rId40"/>
-    <p:sldId id="472" r:id="rId41"/>
-    <p:sldId id="471" r:id="rId42"/>
-    <p:sldId id="490" r:id="rId43"/>
-    <p:sldId id="491" r:id="rId44"/>
-    <p:sldId id="492" r:id="rId45"/>
-    <p:sldId id="493" r:id="rId46"/>
-    <p:sldId id="494" r:id="rId47"/>
-    <p:sldId id="522" r:id="rId48"/>
+    <p:sldId id="523" r:id="rId35"/>
+    <p:sldId id="517" r:id="rId36"/>
+    <p:sldId id="518" r:id="rId37"/>
+    <p:sldId id="519" r:id="rId38"/>
+    <p:sldId id="456" r:id="rId39"/>
+    <p:sldId id="520" r:id="rId40"/>
+    <p:sldId id="521" r:id="rId41"/>
+    <p:sldId id="472" r:id="rId42"/>
+    <p:sldId id="471" r:id="rId43"/>
+    <p:sldId id="490" r:id="rId44"/>
+    <p:sldId id="491" r:id="rId45"/>
+    <p:sldId id="492" r:id="rId46"/>
+    <p:sldId id="493" r:id="rId47"/>
+    <p:sldId id="494" r:id="rId48"/>
+    <p:sldId id="522" r:id="rId49"/>
   </p:sldIdLst>
   <p:sldSz cx="12192000" cy="6858000"/>
   <p:notesSz cx="6858000" cy="9144000"/>
   <p:embeddedFontLst>
     <p:embeddedFont>
       <p:font typeface="Consolas" panose="020B0609020204030204" pitchFamily="49" charset="0"/>
-      <p:regular r:id="rId50"/>
-      <p:bold r:id="rId51"/>
-      <p:italic r:id="rId52"/>
-      <p:boldItalic r:id="rId53"/>
+      <p:regular r:id="rId51"/>
+      <p:bold r:id="rId52"/>
+      <p:italic r:id="rId53"/>
+      <p:boldItalic r:id="rId54"/>
     </p:embeddedFont>
     <p:embeddedFont>
       <p:font typeface="Ink Free" panose="03080402000500000000" pitchFamily="66" charset="0"/>
-      <p:regular r:id="rId54"/>
+      <p:regular r:id="rId55"/>
     </p:embeddedFont>
     <p:embeddedFont>
       <p:font typeface="Verdana" panose="020B0604030504040204" pitchFamily="34" charset="0"/>
-      <p:regular r:id="rId55"/>
-      <p:bold r:id="rId56"/>
-      <p:italic r:id="rId57"/>
-      <p:boldItalic r:id="rId58"/>
+      <p:regular r:id="rId56"/>
+      <p:bold r:id="rId57"/>
+      <p:italic r:id="rId58"/>
+      <p:boldItalic r:id="rId59"/>
     </p:embeddedFont>
   </p:embeddedFontLst>
   <p:defaultTextStyle>
@@ -211,6 +212,7 @@
             <p14:sldId id="510"/>
             <p14:sldId id="512"/>
             <p14:sldId id="513"/>
+            <p14:sldId id="523"/>
             <p14:sldId id="517"/>
             <p14:sldId id="518"/>
             <p14:sldId id="519"/>
@@ -5011,7 +5013,7 @@
           <a:p>
             <a:fld id="{7C7E5181-6CF5-45F7-A87A-E0E0B1FD7549}" type="datetimeFigureOut">
               <a:rPr lang="en-US" smtClean="0"/>
-              <a:t>1/8/2025</a:t>
+              <a:t>1/19/2025</a:t>
             </a:fld>
             <a:endParaRPr lang="en-US"/>
           </a:p>
@@ -7310,6 +7312,23 @@
           <a:bodyPr/>
           <a:lstStyle/>
           <a:p>
+            <a:pPr marL="0" marR="0" lvl="0" indent="0" algn="l" defTabSz="914400" rtl="0" eaLnBrk="1" fontAlgn="auto" latinLnBrk="0" hangingPunct="1">
+              <a:lnSpc>
+                <a:spcPct val="100000"/>
+              </a:lnSpc>
+              <a:spcBef>
+                <a:spcPts val="0"/>
+              </a:spcBef>
+              <a:spcAft>
+                <a:spcPts val="0"/>
+              </a:spcAft>
+              <a:buClrTx/>
+              <a:buSzTx/>
+              <a:buFontTx/>
+              <a:buNone/>
+              <a:tabLst/>
+              <a:defRPr/>
+            </a:pPr>
             <a:r>
               <a:rPr lang="en-US" dirty="0"/>
               <a:t>Emitters are useful if you have several different types of data to push.  The type </a:t>
@@ -7322,6 +7341,29 @@
               <a:rPr lang="en-US" dirty="0"/>
               <a:t> gives us both the syntax and type of clock events; the comments, as usual, specifies the meaning of each kind of event.  (Remember: make sure your data has meaning!)</a:t>
             </a:r>
+            <a:br>
+              <a:rPr lang="en-US" dirty="0"/>
+            </a:br>
+            <a:br>
+              <a:rPr lang="en-US" dirty="0"/>
+            </a:br>
+            <a:r>
+              <a:rPr lang="en-US" dirty="0"/>
+              <a:t>Sometimes your event interface includes key-value pairs where keys are “events” and “values” are an array of callback function(s) for each event.</a:t>
+            </a:r>
+            <a:br>
+              <a:rPr lang="en-US" dirty="0"/>
+            </a:br>
+            <a:br>
+              <a:rPr lang="en-US" dirty="0"/>
+            </a:br>
+            <a:r>
+              <a:rPr lang="en-US" dirty="0"/>
+              <a:t>https://nodejs.org/en/learn/asynchronous-work/the-nodejs-event-emitter </a:t>
+            </a:r>
+          </a:p>
+          <a:p>
+            <a:endParaRPr lang="en-US" dirty="0"/>
           </a:p>
         </p:txBody>
       </p:sp>
@@ -7415,13 +7457,22 @@
             </a:r>
             <a:r>
               <a:rPr lang="en-US" dirty="0"/>
-              <a:t>` returns the emitter; the demo method sends two messages on the emitter.   The client gets the emitter from the server and sets up two listeners, one for each kind of message.</a:t>
+              <a:t>` returns the emitter; the demo method sends two messages on the emitter (using `emit’ method).  The client gets the emitter from the server and sets up two listeners, one for each kind of message (using `on’ method).</a:t>
             </a:r>
           </a:p>
           <a:p>
             <a:endParaRPr lang="en-US" dirty="0"/>
           </a:p>
           <a:p>
+            <a:r>
+              <a:rPr lang="en-US" dirty="0"/>
+              <a:t>Keys to remember: use `on’ to register/subscribe for events and `emit’ to emit events.</a:t>
+            </a:r>
+          </a:p>
+          <a:p>
+            <a:br>
+              <a:rPr lang="en-US" dirty="0"/>
+            </a:br>
             <a:r>
               <a:rPr lang="en-US" dirty="0"/>
               <a:t>The client could also send messages on the emitter by calling </a:t>
@@ -7791,8 +7842,20 @@
           <a:p>
             <a:r>
               <a:rPr lang="en-US" dirty="0"/>
-              <a:t>This may seem specialized, but it is one of the main patterns used in REACT (in part because REACT doesn't have methods that you can create).</a:t>
-            </a:r>
+              <a:t>Event emitters come in many shapes and forms. Here is a typical emitter interface that allows you to register for an event (using `on’), unregister (using `off’) or emit events.</a:t>
+            </a:r>
+          </a:p>
+          <a:p>
+            <a:endParaRPr lang="en-US" dirty="0"/>
+          </a:p>
+          <a:p>
+            <a:r>
+              <a:rPr lang="en-US" dirty="0"/>
+              <a:t>Sometimes `on’ is also called `subscribe’ or `register’.</a:t>
+            </a:r>
+          </a:p>
+          <a:p>
+            <a:endParaRPr lang="en-US" dirty="0"/>
           </a:p>
         </p:txBody>
       </p:sp>
@@ -7822,7 +7885,7 @@
     </p:spTree>
     <p:extLst>
       <p:ext uri="{BB962C8B-B14F-4D97-AF65-F5344CB8AC3E}">
-        <p14:creationId xmlns:p14="http://schemas.microsoft.com/office/powerpoint/2010/main" val="3000596782"/>
+        <p14:creationId xmlns:p14="http://schemas.microsoft.com/office/powerpoint/2010/main" val="108164340"/>
       </p:ext>
     </p:extLst>
   </p:cSld>
@@ -7878,75 +7941,22 @@
           <a:p>
             <a:r>
               <a:rPr lang="en-US" dirty="0"/>
-              <a:t>The server has a method </a:t>
-            </a:r>
-            <a:r>
-              <a:rPr lang="en-US" dirty="0" err="1"/>
-              <a:t>newClient</a:t>
-            </a:r>
+              <a:t>This may seem specialized, but it is one of the main patterns used in REACT (in part because REACT doesn't have methods that you can create).</a:t>
+            </a:r>
+          </a:p>
+          <a:p>
+            <a:endParaRPr lang="en-US" dirty="0"/>
+          </a:p>
+          <a:p>
             <a:r>
               <a:rPr lang="en-US" dirty="0"/>
-              <a:t> that creates a new client, and passes that client a function; the client calls that function whenever its </a:t>
-            </a:r>
-            <a:r>
-              <a:rPr lang="en-US" dirty="0" err="1"/>
-              <a:t>buttonPush</a:t>
-            </a:r>
-            <a:r>
-              <a:rPr lang="en-US" dirty="0"/>
-              <a:t> method is called.  We call this function the </a:t>
-            </a:r>
-            <a:r>
-              <a:rPr lang="en-US" b="1" i="1" dirty="0"/>
-              <a:t>handler</a:t>
-            </a:r>
-            <a:r>
-              <a:rPr lang="en-US" b="0" i="0" dirty="0"/>
-              <a:t> for </a:t>
-            </a:r>
-            <a:r>
-              <a:rPr lang="en-US" b="0" i="0" dirty="0" err="1"/>
-              <a:t>buttonPushes</a:t>
-            </a:r>
-            <a:r>
-              <a:rPr lang="en-US" b="0" i="0" dirty="0"/>
-              <a:t>.</a:t>
+              <a:t>This patterns is also sometimes called </a:t>
+            </a:r>
+            <a:r>
+              <a:rPr lang="en-US" b="1" dirty="0"/>
+              <a:t>Callback pattern</a:t>
             </a:r>
             <a:endParaRPr lang="en-US" dirty="0"/>
-          </a:p>
-          <a:p>
-            <a:endParaRPr lang="en-US" dirty="0"/>
-          </a:p>
-          <a:p>
-            <a:r>
-              <a:rPr lang="en-US" dirty="0"/>
-              <a:t>And of course this could work at multiple levels:  the Client could have </a:t>
-            </a:r>
-            <a:r>
-              <a:rPr lang="en-US" dirty="0" err="1"/>
-              <a:t>subClients</a:t>
-            </a:r>
-            <a:r>
-              <a:rPr lang="en-US" dirty="0"/>
-              <a:t>, and pass handlers down  (Discuss: and maybe you want each client to be able to report the number of times it and its </a:t>
-            </a:r>
-            <a:r>
-              <a:rPr lang="en-US" dirty="0" err="1"/>
-              <a:t>subclients</a:t>
-            </a:r>
-            <a:r>
-              <a:rPr lang="en-US" dirty="0"/>
-              <a:t> have pushed their buttons.   How might you do this?)</a:t>
-            </a:r>
-          </a:p>
-          <a:p>
-            <a:endParaRPr lang="en-US" dirty="0"/>
-          </a:p>
-          <a:p>
-            <a:r>
-              <a:rPr lang="en-US" dirty="0"/>
-              <a:t>This pattern is important because it is used everywhere in React.</a:t>
-            </a:r>
           </a:p>
         </p:txBody>
       </p:sp>
@@ -7967,7 +7977,7 @@
           <a:p>
             <a:fld id="{07937F07-1250-4CCE-B198-1B2887014F41}" type="slidenum">
               <a:rPr lang="en-US" smtClean="0"/>
-              <a:t>36</a:t>
+              <a:t>35</a:t>
             </a:fld>
             <a:endParaRPr lang="en-US"/>
           </a:p>
@@ -7976,7 +7986,7 @@
     </p:spTree>
     <p:extLst>
       <p:ext uri="{BB962C8B-B14F-4D97-AF65-F5344CB8AC3E}">
-        <p14:creationId xmlns:p14="http://schemas.microsoft.com/office/powerpoint/2010/main" val="1455860488"/>
+        <p14:creationId xmlns:p14="http://schemas.microsoft.com/office/powerpoint/2010/main" val="3000596782"/>
       </p:ext>
     </p:extLst>
   </p:cSld>
@@ -8032,13 +8042,74 @@
           <a:p>
             <a:r>
               <a:rPr lang="en-US" dirty="0"/>
-              <a:t>Let's get back to clocks for one last pattern: The Singleton Pattern.</a:t>
-            </a:r>
-          </a:p>
-          <a:p>
+              <a:t>The server has a method </a:t>
+            </a:r>
+            <a:r>
+              <a:rPr lang="en-US" dirty="0" err="1"/>
+              <a:t>newClient</a:t>
+            </a:r>
             <a:r>
               <a:rPr lang="en-US" dirty="0"/>
-              <a:t>&lt;read slide&gt;</a:t>
+              <a:t> that creates a new client, and passes that client a function; the client calls that function whenever its </a:t>
+            </a:r>
+            <a:r>
+              <a:rPr lang="en-US" dirty="0" err="1"/>
+              <a:t>buttonPush</a:t>
+            </a:r>
+            <a:r>
+              <a:rPr lang="en-US" dirty="0"/>
+              <a:t> method is called.  We call this function the </a:t>
+            </a:r>
+            <a:r>
+              <a:rPr lang="en-US" b="1" i="1" dirty="0"/>
+              <a:t>handler</a:t>
+            </a:r>
+            <a:r>
+              <a:rPr lang="en-US" b="0" i="0" dirty="0"/>
+              <a:t> for </a:t>
+            </a:r>
+            <a:r>
+              <a:rPr lang="en-US" b="0" i="0" dirty="0" err="1"/>
+              <a:t>buttonPushes</a:t>
+            </a:r>
+            <a:r>
+              <a:rPr lang="en-US" b="0" i="0" dirty="0"/>
+              <a:t>.</a:t>
+            </a:r>
+            <a:endParaRPr lang="en-US" dirty="0"/>
+          </a:p>
+          <a:p>
+            <a:endParaRPr lang="en-US" dirty="0"/>
+          </a:p>
+          <a:p>
+            <a:r>
+              <a:rPr lang="en-US" dirty="0"/>
+              <a:t>And of course this could work at multiple levels:  the Client could have </a:t>
+            </a:r>
+            <a:r>
+              <a:rPr lang="en-US" dirty="0" err="1"/>
+              <a:t>subClients</a:t>
+            </a:r>
+            <a:r>
+              <a:rPr lang="en-US" dirty="0"/>
+              <a:t>, and pass handlers down  (Discuss: and maybe you want each client to be able to report the number of times it and its </a:t>
+            </a:r>
+            <a:r>
+              <a:rPr lang="en-US" dirty="0" err="1"/>
+              <a:t>subclients</a:t>
+            </a:r>
+            <a:r>
+              <a:rPr lang="en-US" dirty="0"/>
+              <a:t> have pushed their buttons.   How might you do this?)</a:t>
+            </a:r>
+          </a:p>
+          <a:p>
+            <a:endParaRPr lang="en-US" dirty="0"/>
+          </a:p>
+          <a:p>
+            <a:r>
+              <a:rPr lang="en-US" dirty="0"/>
+              <a:t>This pattern is important because it is used everywhere in React.</a:t>
             </a:r>
           </a:p>
         </p:txBody>
@@ -8069,7 +8140,7 @@
     </p:spTree>
     <p:extLst>
       <p:ext uri="{BB962C8B-B14F-4D97-AF65-F5344CB8AC3E}">
-        <p14:creationId xmlns:p14="http://schemas.microsoft.com/office/powerpoint/2010/main" val="283863748"/>
+        <p14:creationId xmlns:p14="http://schemas.microsoft.com/office/powerpoint/2010/main" val="1455860488"/>
       </p:ext>
     </p:extLst>
   </p:cSld>
@@ -8125,40 +8196,13 @@
           <a:p>
             <a:r>
               <a:rPr lang="en-US" dirty="0"/>
-              <a:t>Instead of saying "new Clock", we'll create a clock factory with a static .</a:t>
-            </a:r>
-            <a:r>
-              <a:rPr lang="en-US" dirty="0" err="1"/>
-              <a:t>createClock</a:t>
-            </a:r>
+              <a:t>Let's get back to clocks for one last pattern: The Singleton Pattern.</a:t>
+            </a:r>
+          </a:p>
+          <a:p>
             <a:r>
               <a:rPr lang="en-US" dirty="0"/>
-              <a:t> method.  We make it a static method so you don't have to say "new </a:t>
-            </a:r>
-            <a:r>
-              <a:rPr lang="en-US" dirty="0" err="1"/>
-              <a:t>SimpleClockFactory</a:t>
-            </a:r>
-            <a:r>
-              <a:rPr lang="en-US" dirty="0"/>
-              <a:t>" every time.</a:t>
-            </a:r>
-          </a:p>
-          <a:p>
-            <a:endParaRPr lang="en-US" dirty="0"/>
-          </a:p>
-          <a:p>
-            <a:r>
-              <a:rPr lang="en-US" dirty="0"/>
-              <a:t>And here's what it should do:  every time you call .</a:t>
-            </a:r>
-            <a:r>
-              <a:rPr lang="en-US" dirty="0" err="1"/>
-              <a:t>createClock</a:t>
-            </a:r>
-            <a:r>
-              <a:rPr lang="en-US" dirty="0"/>
-              <a:t>() you get a clock; we'll do that twice and test to see that each of the clocks works correctly.</a:t>
+              <a:t>&lt;read slide&gt;</a:t>
             </a:r>
           </a:p>
         </p:txBody>
@@ -8189,7 +8233,7 @@
     </p:spTree>
     <p:extLst>
       <p:ext uri="{BB962C8B-B14F-4D97-AF65-F5344CB8AC3E}">
-        <p14:creationId xmlns:p14="http://schemas.microsoft.com/office/powerpoint/2010/main" val="3286825809"/>
+        <p14:creationId xmlns:p14="http://schemas.microsoft.com/office/powerpoint/2010/main" val="283863748"/>
       </p:ext>
     </p:extLst>
   </p:cSld>
@@ -8245,7 +8289,23 @@
           <a:p>
             <a:r>
               <a:rPr lang="en-US" dirty="0"/>
-              <a:t>Following the TDD methodology, let's start by writing some tests for the expected behavior.</a:t>
+              <a:t>Instead of saying "new Clock", we'll create a clock factory with a static .</a:t>
+            </a:r>
+            <a:r>
+              <a:rPr lang="en-US" dirty="0" err="1"/>
+              <a:t>createClock</a:t>
+            </a:r>
+            <a:r>
+              <a:rPr lang="en-US" dirty="0"/>
+              <a:t> method.  We make it a static method so you don't have to say "new </a:t>
+            </a:r>
+            <a:r>
+              <a:rPr lang="en-US" dirty="0" err="1"/>
+              <a:t>SimpleClockFactory</a:t>
+            </a:r>
+            <a:r>
+              <a:rPr lang="en-US" dirty="0"/>
+              <a:t>" every time.</a:t>
             </a:r>
           </a:p>
           <a:p>
@@ -8254,51 +8314,15 @@
           <a:p>
             <a:r>
               <a:rPr lang="en-US" dirty="0"/>
-              <a:t>The standard way to do this is to have a class (here called </a:t>
+              <a:t>And here's what it should do:  every time you call .</a:t>
             </a:r>
             <a:r>
               <a:rPr lang="en-US" dirty="0" err="1"/>
-              <a:t>SingletonClockFactory</a:t>
+              <a:t>createClock</a:t>
             </a:r>
             <a:r>
               <a:rPr lang="en-US" dirty="0"/>
-              <a:t>) with a static method called ‘instance’. ('instance' is a standard name for this.)  Each call to instance() returns a clock.   </a:t>
-            </a:r>
-          </a:p>
-          <a:p>
-            <a:endParaRPr lang="en-US" dirty="0"/>
-          </a:p>
-          <a:p>
-            <a:r>
-              <a:rPr lang="en-US" dirty="0"/>
-              <a:t>We want to arrange things so that every call to instance() returns the *same* clock. If we have two calls to instance(), how can we tell if they are the same clock?</a:t>
-            </a:r>
-          </a:p>
-          <a:p>
-            <a:endParaRPr lang="en-US" dirty="0"/>
-          </a:p>
-          <a:p>
-            <a:r>
-              <a:rPr lang="en-US" dirty="0"/>
-              <a:t>In this test, are clock1 and clock2 the same clock?  More precisely, is the clock named clock1 the same clock as the clock named clock2?</a:t>
-            </a:r>
-          </a:p>
-          <a:p>
-            <a:endParaRPr lang="en-US" dirty="0"/>
-          </a:p>
-          <a:p>
-            <a:r>
-              <a:rPr lang="en-US" dirty="0"/>
-              <a:t>If they are the same clock, then the effect of ticking the clock named clock1 should be visible on the clock named clock2, and vice versa. </a:t>
-            </a:r>
-          </a:p>
-          <a:p>
-            <a:endParaRPr lang="en-US" dirty="0"/>
-          </a:p>
-          <a:p>
-            <a:r>
-              <a:rPr lang="en-US" dirty="0"/>
-              <a:t>Here we test this by ticking clock1 twice and checking  to see that both clock1 and clock2 show the time as 2; we reset clock1, and then check to see that both clock1 and clock2 have been reset to zero.</a:t>
+              <a:t>() you get a clock; we'll do that twice and test to see that each of the clocks works correctly.</a:t>
             </a:r>
           </a:p>
         </p:txBody>
@@ -8320,7 +8344,7 @@
           <a:p>
             <a:fld id="{07937F07-1250-4CCE-B198-1B2887014F41}" type="slidenum">
               <a:rPr lang="en-US" smtClean="0"/>
-              <a:t>40</a:t>
+              <a:t>39</a:t>
             </a:fld>
             <a:endParaRPr lang="en-US"/>
           </a:p>
@@ -8329,7 +8353,7 @@
     </p:spTree>
     <p:extLst>
       <p:ext uri="{BB962C8B-B14F-4D97-AF65-F5344CB8AC3E}">
-        <p14:creationId xmlns:p14="http://schemas.microsoft.com/office/powerpoint/2010/main" val="311776401"/>
+        <p14:creationId xmlns:p14="http://schemas.microsoft.com/office/powerpoint/2010/main" val="3286825809"/>
       </p:ext>
     </p:extLst>
   </p:cSld>
@@ -8385,7 +8409,7 @@
           <a:p>
             <a:r>
               <a:rPr lang="en-US" dirty="0"/>
-              <a:t>How do you implement this behavior?</a:t>
+              <a:t>Following the TDD methodology, let's start by writing some tests for the expected behavior.</a:t>
             </a:r>
           </a:p>
           <a:p>
@@ -8394,88 +8418,7 @@
           <a:p>
             <a:r>
               <a:rPr lang="en-US" dirty="0"/>
-              <a:t>You create a first-time-through switch.  Here we use the static variable ‘</a:t>
-            </a:r>
-            <a:r>
-              <a:rPr lang="en-US" dirty="0" err="1"/>
-              <a:t>theClock</a:t>
-            </a:r>
-            <a:r>
-              <a:rPr lang="en-US" dirty="0"/>
-              <a:t>’ as a first-time-through switch.  It contains either an </a:t>
-            </a:r>
-            <a:r>
-              <a:rPr lang="en-US" dirty="0" err="1"/>
-              <a:t>Iclock</a:t>
-            </a:r>
-            <a:r>
-              <a:rPr lang="en-US" dirty="0"/>
-              <a:t> or the value ‘undefined’.</a:t>
-            </a:r>
-          </a:p>
-          <a:p>
-            <a:endParaRPr lang="en-US" dirty="0"/>
-          </a:p>
-          <a:p>
-            <a:r>
-              <a:rPr lang="en-US" dirty="0"/>
-              <a:t>Initially, it is ‘undefined’</a:t>
-            </a:r>
-          </a:p>
-          <a:p>
-            <a:endParaRPr lang="en-US" dirty="0"/>
-          </a:p>
-          <a:p>
-            <a:r>
-              <a:rPr lang="en-US" dirty="0"/>
-              <a:t>When anyone calls the public static method ‘instance’, it checks to see if ‘</a:t>
-            </a:r>
-            <a:r>
-              <a:rPr lang="en-US" dirty="0" err="1"/>
-              <a:t>theClock</a:t>
-            </a:r>
-            <a:r>
-              <a:rPr lang="en-US" dirty="0"/>
-              <a:t>’ is undefined.  If it is, then it creates a new Clock1(), and stores it in ‘</a:t>
-            </a:r>
-            <a:r>
-              <a:rPr lang="en-US" dirty="0" err="1"/>
-              <a:t>theClock</a:t>
-            </a:r>
-            <a:r>
-              <a:rPr lang="en-US" dirty="0"/>
-              <a:t>’.   Any subsequent calls to ‘instance’ will see that ‘</a:t>
-            </a:r>
-            <a:r>
-              <a:rPr lang="en-US" dirty="0" err="1"/>
-              <a:t>theClock</a:t>
-            </a:r>
-            <a:r>
-              <a:rPr lang="en-US" dirty="0"/>
-              <a:t>’ is not undefined, and do nothing. Either way, ‘instance’ returns the value of ‘</a:t>
-            </a:r>
-            <a:r>
-              <a:rPr lang="en-US" dirty="0" err="1"/>
-              <a:t>theClock</a:t>
-            </a:r>
-            <a:r>
-              <a:rPr lang="en-US" dirty="0"/>
-              <a:t>’.  As a result, we know that ‘new Clock1()’ is called at most once.</a:t>
-            </a:r>
-          </a:p>
-          <a:p>
-            <a:endParaRPr lang="en-US" dirty="0"/>
-          </a:p>
-          <a:p>
-            <a:r>
-              <a:rPr lang="en-US" dirty="0"/>
-              <a:t>But… </a:t>
-            </a:r>
-          </a:p>
-          <a:p>
-            <a:r>
-              <a:rPr lang="en-US" dirty="0"/>
-              <a:t>How do you prevent the client from creating a new Factory?  Easy: you make the constructor of </a:t>
+              <a:t>The standard way to do this is to have a class (here called </a:t>
             </a:r>
             <a:r>
               <a:rPr lang="en-US" dirty="0" err="1"/>
@@ -8483,23 +8426,25 @@
             </a:r>
             <a:r>
               <a:rPr lang="en-US" dirty="0"/>
-              <a:t> private, so nobody can say “new </a:t>
-            </a:r>
-            <a:r>
-              <a:rPr lang="en-US" dirty="0" err="1"/>
-              <a:t>SingletonClockFactory</a:t>
-            </a:r>
+              <a:t>) with a static method called ‘instance’. ('instance' is a standard name for this.)  Each call to instance() returns a clock.   </a:t>
+            </a:r>
+          </a:p>
+          <a:p>
+            <a:endParaRPr lang="en-US" dirty="0"/>
+          </a:p>
+          <a:p>
             <a:r>
               <a:rPr lang="en-US" dirty="0"/>
-              <a:t>”.   Then you make instance() a static method, so the user of this code creates a clock by saying </a:t>
-            </a:r>
-            <a:r>
-              <a:rPr lang="en-US" dirty="0" err="1"/>
-              <a:t>SingletonClockFactory.instance</a:t>
-            </a:r>
+              <a:t>We want to arrange things so that every call to instance() returns the *same* clock. If we have two calls to instance(), how can we tell if they are the same clock?</a:t>
+            </a:r>
+          </a:p>
+          <a:p>
+            <a:endParaRPr lang="en-US" dirty="0"/>
+          </a:p>
+          <a:p>
             <a:r>
               <a:rPr lang="en-US" dirty="0"/>
-              <a:t>().</a:t>
+              <a:t>In this test, are clock1 and clock2 the same clock?  More precisely, is the clock named clock1 the same clock as the clock named clock2?</a:t>
             </a:r>
           </a:p>
           <a:p>
@@ -8508,7 +8453,7 @@
           <a:p>
             <a:r>
               <a:rPr lang="en-US" dirty="0"/>
-              <a:t>This particular bit of code relies on the way that Typescript handles the value ‘undefined’.  Other languages have slightly different idioms for this.</a:t>
+              <a:t>If they are the same clock, then the effect of ticking the clock named clock1 should be visible on the clock named clock2, and vice versa. </a:t>
             </a:r>
           </a:p>
           <a:p>
@@ -8517,22 +8462,8 @@
           <a:p>
             <a:r>
               <a:rPr lang="en-US" dirty="0"/>
-              <a:t>Here we’ve created a singleton </a:t>
-            </a:r>
-            <a:r>
-              <a:rPr lang="en-US" dirty="0" err="1"/>
-              <a:t>PullingClock</a:t>
-            </a:r>
-            <a:r>
-              <a:rPr lang="en-US" dirty="0"/>
-              <a:t>, but you could do the same thing for any class that you only want to have one instance of.</a:t>
-            </a:r>
-          </a:p>
-          <a:p>
-            <a:endParaRPr lang="en-US" dirty="0"/>
-          </a:p>
-          <a:p>
-            <a:endParaRPr lang="en-US" dirty="0"/>
+              <a:t>Here we test this by ticking clock1 twice and checking  to see that both clock1 and clock2 show the time as 2; we reset clock1, and then check to see that both clock1 and clock2 have been reset to zero.</a:t>
+            </a:r>
           </a:p>
         </p:txBody>
       </p:sp>
@@ -8562,7 +8493,7 @@
     </p:spTree>
     <p:extLst>
       <p:ext uri="{BB962C8B-B14F-4D97-AF65-F5344CB8AC3E}">
-        <p14:creationId xmlns:p14="http://schemas.microsoft.com/office/powerpoint/2010/main" val="944057601"/>
+        <p14:creationId xmlns:p14="http://schemas.microsoft.com/office/powerpoint/2010/main" val="311776401"/>
       </p:ext>
     </p:extLst>
   </p:cSld>
@@ -8618,19 +8549,32 @@
           <a:p>
             <a:r>
               <a:rPr lang="en-US" dirty="0"/>
-              <a:t>We said that this week's goal is to give you the vocabulary to talk</a:t>
-            </a:r>
+              <a:t>How do you implement this behavior?</a:t>
+            </a:r>
+          </a:p>
+          <a:p>
+            <a:endParaRPr lang="en-US" dirty="0"/>
           </a:p>
           <a:p>
             <a:r>
               <a:rPr lang="en-US" dirty="0"/>
-              <a:t>about your design.  So it's really about the language(s) of software</a:t>
-            </a:r>
-          </a:p>
-          <a:p>
+              <a:t>You create a first-time-through switch.  Here we use the static variable ‘</a:t>
+            </a:r>
+            <a:r>
+              <a:rPr lang="en-US" dirty="0" err="1"/>
+              <a:t>theClock</a:t>
+            </a:r>
             <a:r>
               <a:rPr lang="en-US" dirty="0"/>
-              <a:t>design.</a:t>
+              <a:t>’ as a first-time-through switch.  It contains either an </a:t>
+            </a:r>
+            <a:r>
+              <a:rPr lang="en-US" dirty="0" err="1"/>
+              <a:t>Iclock</a:t>
+            </a:r>
+            <a:r>
+              <a:rPr lang="en-US" dirty="0"/>
+              <a:t> or the value ‘undefined’.</a:t>
             </a:r>
           </a:p>
           <a:p>
@@ -8639,13 +8583,48 @@
           <a:p>
             <a:r>
               <a:rPr lang="en-US" dirty="0"/>
-              <a:t>Like in any language course, once you learn the words, the next thing</a:t>
-            </a:r>
+              <a:t>Initially, it is ‘undefined’</a:t>
+            </a:r>
+          </a:p>
+          <a:p>
+            <a:endParaRPr lang="en-US" dirty="0"/>
           </a:p>
           <a:p>
             <a:r>
               <a:rPr lang="en-US" dirty="0"/>
-              <a:t>you do is to practice putting them into sentences.</a:t>
+              <a:t>When anyone calls the public static method ‘instance’, it checks to see if ‘</a:t>
+            </a:r>
+            <a:r>
+              <a:rPr lang="en-US" dirty="0" err="1"/>
+              <a:t>theClock</a:t>
+            </a:r>
+            <a:r>
+              <a:rPr lang="en-US" dirty="0"/>
+              <a:t>’ is undefined.  If it is, then it creates a new Clock1(), and stores it in ‘</a:t>
+            </a:r>
+            <a:r>
+              <a:rPr lang="en-US" dirty="0" err="1"/>
+              <a:t>theClock</a:t>
+            </a:r>
+            <a:r>
+              <a:rPr lang="en-US" dirty="0"/>
+              <a:t>’.   Any subsequent calls to ‘instance’ will see that ‘</a:t>
+            </a:r>
+            <a:r>
+              <a:rPr lang="en-US" dirty="0" err="1"/>
+              <a:t>theClock</a:t>
+            </a:r>
+            <a:r>
+              <a:rPr lang="en-US" dirty="0"/>
+              <a:t>’ is not undefined, and do nothing. Either way, ‘instance’ returns the value of ‘</a:t>
+            </a:r>
+            <a:r>
+              <a:rPr lang="en-US" dirty="0" err="1"/>
+              <a:t>theClock</a:t>
+            </a:r>
+            <a:r>
+              <a:rPr lang="en-US" dirty="0"/>
+              <a:t>’.  As a result, we know that ‘new Clock1()’ is called at most once.</a:t>
             </a:r>
           </a:p>
           <a:p>
@@ -8654,14 +8633,67 @@
           <a:p>
             <a:r>
               <a:rPr lang="en-US" dirty="0"/>
-              <a:t>So here's a piece of a design, expressed as a sentence (ok, three</a:t>
+              <a:t>But… </a:t>
             </a:r>
           </a:p>
           <a:p>
             <a:r>
               <a:rPr lang="en-US" dirty="0"/>
-              <a:t>sentences)</a:t>
-            </a:r>
+              <a:t>How do you prevent the client from creating a new Factory?  Easy: you make the constructor of </a:t>
+            </a:r>
+            <a:r>
+              <a:rPr lang="en-US" dirty="0" err="1"/>
+              <a:t>SingletonClockFactory</a:t>
+            </a:r>
+            <a:r>
+              <a:rPr lang="en-US" dirty="0"/>
+              <a:t> private, so nobody can say “new </a:t>
+            </a:r>
+            <a:r>
+              <a:rPr lang="en-US" dirty="0" err="1"/>
+              <a:t>SingletonClockFactory</a:t>
+            </a:r>
+            <a:r>
+              <a:rPr lang="en-US" dirty="0"/>
+              <a:t>”.   Then you make instance() a static method, so the user of this code creates a clock by saying </a:t>
+            </a:r>
+            <a:r>
+              <a:rPr lang="en-US" dirty="0" err="1"/>
+              <a:t>SingletonClockFactory.instance</a:t>
+            </a:r>
+            <a:r>
+              <a:rPr lang="en-US" dirty="0"/>
+              <a:t>().</a:t>
+            </a:r>
+          </a:p>
+          <a:p>
+            <a:endParaRPr lang="en-US" dirty="0"/>
+          </a:p>
+          <a:p>
+            <a:r>
+              <a:rPr lang="en-US" dirty="0"/>
+              <a:t>This particular bit of code relies on the way that Typescript handles the value ‘undefined’.  Other languages have slightly different idioms for this.</a:t>
+            </a:r>
+          </a:p>
+          <a:p>
+            <a:endParaRPr lang="en-US" dirty="0"/>
+          </a:p>
+          <a:p>
+            <a:r>
+              <a:rPr lang="en-US" dirty="0"/>
+              <a:t>Here we’ve created a singleton </a:t>
+            </a:r>
+            <a:r>
+              <a:rPr lang="en-US" dirty="0" err="1"/>
+              <a:t>PullingClock</a:t>
+            </a:r>
+            <a:r>
+              <a:rPr lang="en-US" dirty="0"/>
+              <a:t>, but you could do the same thing for any class that you only want to have one instance of.</a:t>
+            </a:r>
+          </a:p>
+          <a:p>
+            <a:endParaRPr lang="en-US" dirty="0"/>
           </a:p>
           <a:p>
             <a:endParaRPr lang="en-US" dirty="0"/>
@@ -8694,7 +8726,7 @@
     </p:spTree>
     <p:extLst>
       <p:ext uri="{BB962C8B-B14F-4D97-AF65-F5344CB8AC3E}">
-        <p14:creationId xmlns:p14="http://schemas.microsoft.com/office/powerpoint/2010/main" val="476959786"/>
+        <p14:creationId xmlns:p14="http://schemas.microsoft.com/office/powerpoint/2010/main" val="944057601"/>
       </p:ext>
     </p:extLst>
   </p:cSld>
@@ -8750,8 +8782,53 @@
           <a:p>
             <a:r>
               <a:rPr lang="en-US" dirty="0"/>
-              <a:t>Here’s a possible conversation in this new language.   Note that you had to have an agreement with Pat about the protocol for the clock.</a:t>
-            </a:r>
+              <a:t>We said that this week's goal is to give you the vocabulary to talk</a:t>
+            </a:r>
+          </a:p>
+          <a:p>
+            <a:r>
+              <a:rPr lang="en-US" dirty="0"/>
+              <a:t>about your design.  So it's really about the language(s) of software</a:t>
+            </a:r>
+          </a:p>
+          <a:p>
+            <a:r>
+              <a:rPr lang="en-US" dirty="0"/>
+              <a:t>design.</a:t>
+            </a:r>
+          </a:p>
+          <a:p>
+            <a:endParaRPr lang="en-US" dirty="0"/>
+          </a:p>
+          <a:p>
+            <a:r>
+              <a:rPr lang="en-US" dirty="0"/>
+              <a:t>Like in any language course, once you learn the words, the next thing</a:t>
+            </a:r>
+          </a:p>
+          <a:p>
+            <a:r>
+              <a:rPr lang="en-US" dirty="0"/>
+              <a:t>you do is to practice putting them into sentences.</a:t>
+            </a:r>
+          </a:p>
+          <a:p>
+            <a:endParaRPr lang="en-US" dirty="0"/>
+          </a:p>
+          <a:p>
+            <a:r>
+              <a:rPr lang="en-US" dirty="0"/>
+              <a:t>So here's a piece of a design, expressed as a sentence (ok, three</a:t>
+            </a:r>
+          </a:p>
+          <a:p>
+            <a:r>
+              <a:rPr lang="en-US" dirty="0"/>
+              <a:t>sentences)</a:t>
+            </a:r>
+          </a:p>
+          <a:p>
+            <a:endParaRPr lang="en-US" dirty="0"/>
           </a:p>
         </p:txBody>
       </p:sp>
@@ -8781,7 +8858,7 @@
     </p:spTree>
     <p:extLst>
       <p:ext uri="{BB962C8B-B14F-4D97-AF65-F5344CB8AC3E}">
-        <p14:creationId xmlns:p14="http://schemas.microsoft.com/office/powerpoint/2010/main" val="2550609105"/>
+        <p14:creationId xmlns:p14="http://schemas.microsoft.com/office/powerpoint/2010/main" val="476959786"/>
       </p:ext>
     </p:extLst>
   </p:cSld>
@@ -8835,7 +8912,10 @@
           <a:bodyPr/>
           <a:lstStyle/>
           <a:p>
-            <a:endParaRPr lang="en-US" dirty="0"/>
+            <a:r>
+              <a:rPr lang="en-US" dirty="0"/>
+              <a:t>Here’s a possible conversation in this new language.   Note that you had to have an agreement with Pat about the protocol for the clock.</a:t>
+            </a:r>
           </a:p>
         </p:txBody>
       </p:sp>
@@ -8865,7 +8945,7 @@
     </p:spTree>
     <p:extLst>
       <p:ext uri="{BB962C8B-B14F-4D97-AF65-F5344CB8AC3E}">
-        <p14:creationId xmlns:p14="http://schemas.microsoft.com/office/powerpoint/2010/main" val="2222246358"/>
+        <p14:creationId xmlns:p14="http://schemas.microsoft.com/office/powerpoint/2010/main" val="2550609105"/>
       </p:ext>
     </p:extLst>
   </p:cSld>
@@ -8919,10 +8999,7 @@
           <a:bodyPr/>
           <a:lstStyle/>
           <a:p>
-            <a:r>
-              <a:rPr lang="en-US" dirty="0"/>
-              <a:t>You now have a rich vocabulary that you can use to discuss your design.</a:t>
-            </a:r>
+            <a:endParaRPr lang="en-US" dirty="0"/>
           </a:p>
         </p:txBody>
       </p:sp>
@@ -8943,7 +9020,7 @@
           <a:p>
             <a:fld id="{07937F07-1250-4CCE-B198-1B2887014F41}" type="slidenum">
               <a:rPr lang="en-US" smtClean="0"/>
-              <a:t>46</a:t>
+              <a:t>45</a:t>
             </a:fld>
             <a:endParaRPr lang="en-US"/>
           </a:p>
@@ -8952,7 +9029,7 @@
     </p:spTree>
     <p:extLst>
       <p:ext uri="{BB962C8B-B14F-4D97-AF65-F5344CB8AC3E}">
-        <p14:creationId xmlns:p14="http://schemas.microsoft.com/office/powerpoint/2010/main" val="693301086"/>
+        <p14:creationId xmlns:p14="http://schemas.microsoft.com/office/powerpoint/2010/main" val="2222246358"/>
       </p:ext>
     </p:extLst>
   </p:cSld>
@@ -9098,7 +9175,7 @@
           <a:p>
             <a:r>
               <a:rPr lang="en-US" dirty="0"/>
-              <a:t>&lt;read slide&gt;</a:t>
+              <a:t>You now have a rich vocabulary that you can use to discuss your design.</a:t>
             </a:r>
           </a:p>
         </p:txBody>
@@ -9121,6 +9198,93 @@
             <a:fld id="{07937F07-1250-4CCE-B198-1B2887014F41}" type="slidenum">
               <a:rPr lang="en-US" smtClean="0"/>
               <a:t>47</a:t>
+            </a:fld>
+            <a:endParaRPr lang="en-US"/>
+          </a:p>
+        </p:txBody>
+      </p:sp>
+    </p:spTree>
+    <p:extLst>
+      <p:ext uri="{BB962C8B-B14F-4D97-AF65-F5344CB8AC3E}">
+        <p14:creationId xmlns:p14="http://schemas.microsoft.com/office/powerpoint/2010/main" val="693301086"/>
+      </p:ext>
+    </p:extLst>
+  </p:cSld>
+  <p:clrMapOvr>
+    <a:masterClrMapping/>
+  </p:clrMapOvr>
+</p:notes>
+</file>
+
+<file path=ppt/notesSlides/notesSlide41.xml><?xml version="1.0" encoding="utf-8"?>
+<p:notes xmlns:a="http://schemas.openxmlformats.org/drawingml/2006/main" xmlns:r="http://schemas.openxmlformats.org/officeDocument/2006/relationships" xmlns:p="http://schemas.openxmlformats.org/presentationml/2006/main">
+  <p:cSld>
+    <p:spTree>
+      <p:nvGrpSpPr>
+        <p:cNvPr id="1" name=""/>
+        <p:cNvGrpSpPr/>
+        <p:nvPr/>
+      </p:nvGrpSpPr>
+      <p:grpSpPr>
+        <a:xfrm>
+          <a:off x="0" y="0"/>
+          <a:ext cx="0" cy="0"/>
+          <a:chOff x="0" y="0"/>
+          <a:chExt cx="0" cy="0"/>
+        </a:xfrm>
+      </p:grpSpPr>
+      <p:sp>
+        <p:nvSpPr>
+          <p:cNvPr id="2" name="Slide Image Placeholder 1"/>
+          <p:cNvSpPr>
+            <a:spLocks noGrp="1" noRot="1" noChangeAspect="1"/>
+          </p:cNvSpPr>
+          <p:nvPr>
+            <p:ph type="sldImg"/>
+          </p:nvPr>
+        </p:nvSpPr>
+        <p:spPr/>
+      </p:sp>
+      <p:sp>
+        <p:nvSpPr>
+          <p:cNvPr id="3" name="Notes Placeholder 2"/>
+          <p:cNvSpPr>
+            <a:spLocks noGrp="1"/>
+          </p:cNvSpPr>
+          <p:nvPr>
+            <p:ph type="body" idx="1"/>
+          </p:nvPr>
+        </p:nvSpPr>
+        <p:spPr/>
+        <p:txBody>
+          <a:bodyPr/>
+          <a:lstStyle/>
+          <a:p>
+            <a:r>
+              <a:rPr lang="en-US" dirty="0"/>
+              <a:t>&lt;read slide&gt;</a:t>
+            </a:r>
+          </a:p>
+        </p:txBody>
+      </p:sp>
+      <p:sp>
+        <p:nvSpPr>
+          <p:cNvPr id="4" name="Slide Number Placeholder 3"/>
+          <p:cNvSpPr>
+            <a:spLocks noGrp="1"/>
+          </p:cNvSpPr>
+          <p:nvPr>
+            <p:ph type="sldNum" sz="quarter" idx="5"/>
+          </p:nvPr>
+        </p:nvSpPr>
+        <p:spPr/>
+        <p:txBody>
+          <a:bodyPr/>
+          <a:lstStyle/>
+          <a:p>
+            <a:fld id="{07937F07-1250-4CCE-B198-1B2887014F41}" type="slidenum">
+              <a:rPr lang="en-US" smtClean="0"/>
+              <a:t>48</a:t>
             </a:fld>
             <a:endParaRPr lang="en-US"/>
           </a:p>
@@ -9869,7 +10033,7 @@
           <a:p>
             <a:fld id="{5D2A64DE-480B-420F-9649-4F8E696E08E0}" type="datetime1">
               <a:rPr lang="en-US" smtClean="0"/>
-              <a:t>1/8/2025</a:t>
+              <a:t>1/19/2025</a:t>
             </a:fld>
             <a:endParaRPr lang="en-US"/>
           </a:p>
@@ -10193,7 +10357,7 @@
           <a:p>
             <a:fld id="{EA476A42-A091-4468-A075-64A31BE59948}" type="datetime1">
               <a:rPr lang="en-US" smtClean="0"/>
-              <a:t>1/8/2025</a:t>
+              <a:t>1/19/2025</a:t>
             </a:fld>
             <a:endParaRPr lang="en-US"/>
           </a:p>
@@ -10391,7 +10555,7 @@
           <a:p>
             <a:fld id="{0D3616D0-8311-4107-9726-6B805E7D05BA}" type="datetime1">
               <a:rPr lang="en-US" smtClean="0"/>
-              <a:t>1/8/2025</a:t>
+              <a:t>1/19/2025</a:t>
             </a:fld>
             <a:endParaRPr lang="en-US"/>
           </a:p>
@@ -10599,7 +10763,7 @@
           <a:p>
             <a:fld id="{3BC2557A-5C88-417A-A763-5AC779462A5F}" type="datetime1">
               <a:rPr lang="en-US" smtClean="0"/>
-              <a:t>1/8/2025</a:t>
+              <a:t>1/19/2025</a:t>
             </a:fld>
             <a:endParaRPr lang="en-US"/>
           </a:p>
@@ -11123,7 +11287,7 @@
           <a:p>
             <a:fld id="{07C7BFD4-467E-4EDE-93EA-052F5B39A4E5}" type="datetime1">
               <a:rPr lang="en-US" smtClean="0"/>
-              <a:t>1/8/2025</a:t>
+              <a:t>1/19/2025</a:t>
             </a:fld>
             <a:endParaRPr lang="en-US"/>
           </a:p>
@@ -11373,7 +11537,7 @@
           <a:p>
             <a:fld id="{07C7BFD4-467E-4EDE-93EA-052F5B39A4E5}" type="datetime1">
               <a:rPr lang="en-US" smtClean="0"/>
-              <a:t>1/8/2025</a:t>
+              <a:t>1/19/2025</a:t>
             </a:fld>
             <a:endParaRPr lang="en-US"/>
           </a:p>
@@ -11561,7 +11725,7 @@
           <a:p>
             <a:fld id="{109E55A0-C911-4F03-82FC-7E5926047D46}" type="datetime1">
               <a:rPr lang="en-US" smtClean="0"/>
-              <a:t>1/8/2025</a:t>
+              <a:t>1/19/2025</a:t>
             </a:fld>
             <a:endParaRPr lang="en-US"/>
           </a:p>
@@ -11874,7 +12038,7 @@
           <a:p>
             <a:fld id="{A533CBE2-D5BE-47AC-ADC2-9CDFC1D0CF90}" type="datetime1">
               <a:rPr lang="en-US" smtClean="0"/>
-              <a:t>1/8/2025</a:t>
+              <a:t>1/19/2025</a:t>
             </a:fld>
             <a:endParaRPr lang="en-US"/>
           </a:p>
@@ -12175,7 +12339,7 @@
           <a:p>
             <a:fld id="{39B7EDB1-CE74-4951-85A2-0B01C2128E28}" type="datetime1">
               <a:rPr lang="en-US" smtClean="0"/>
-              <a:t>1/8/2025</a:t>
+              <a:t>1/19/2025</a:t>
             </a:fld>
             <a:endParaRPr lang="en-US"/>
           </a:p>
@@ -12623,7 +12787,7 @@
           <a:p>
             <a:fld id="{2BC7EB92-A5C2-4807-A9DC-9EDE6CBFB241}" type="datetime1">
               <a:rPr lang="en-US" smtClean="0"/>
-              <a:t>1/8/2025</a:t>
+              <a:t>1/19/2025</a:t>
             </a:fld>
             <a:endParaRPr lang="en-US"/>
           </a:p>
@@ -12736,7 +12900,7 @@
           <a:p>
             <a:fld id="{2B7B7EE0-7771-4CD5-9B2B-3550753A54A1}" type="datetime1">
               <a:rPr lang="en-US" smtClean="0"/>
-              <a:t>1/8/2025</a:t>
+              <a:t>1/19/2025</a:t>
             </a:fld>
             <a:endParaRPr lang="en-US"/>
           </a:p>
@@ -13047,7 +13211,7 @@
           <a:p>
             <a:fld id="{F8B318B3-0E87-4416-A9B8-D891968C2727}" type="datetime1">
               <a:rPr lang="en-US" smtClean="0"/>
-              <a:t>1/8/2025</a:t>
+              <a:t>1/19/2025</a:t>
             </a:fld>
             <a:endParaRPr lang="en-US"/>
           </a:p>
@@ -13288,7 +13452,7 @@
           <a:p>
             <a:fld id="{54D997E8-DDEE-43F1-8D9B-F8A1E11DE488}" type="datetime1">
               <a:rPr lang="en-US" smtClean="0"/>
-              <a:t>1/8/2025</a:t>
+              <a:t>1/19/2025</a:t>
             </a:fld>
             <a:endParaRPr lang="en-US"/>
           </a:p>
@@ -30966,6 +31130,69 @@
           </a:p>
         </p:txBody>
       </p:sp>
+      <p:sp>
+        <p:nvSpPr>
+          <p:cNvPr id="3" name="Content Placeholder 6">
+            <a:extLst>
+              <a:ext uri="{FF2B5EF4-FFF2-40B4-BE49-F238E27FC236}">
+                <a16:creationId xmlns:a16="http://schemas.microsoft.com/office/drawing/2014/main" id="{8A0F710D-3B9A-A3BF-C8CA-7DFEB994E4C4}"/>
+              </a:ext>
+            </a:extLst>
+          </p:cNvPr>
+          <p:cNvSpPr>
+            <a:spLocks noGrp="1"/>
+          </p:cNvSpPr>
+          <p:nvPr>
+            <p:ph idx="1"/>
+          </p:nvPr>
+        </p:nvSpPr>
+        <p:spPr>
+          <a:xfrm>
+            <a:off x="1035595" y="3983369"/>
+            <a:ext cx="9401738" cy="1837703"/>
+          </a:xfrm>
+        </p:spPr>
+        <p:txBody>
+          <a:bodyPr>
+            <a:normAutofit/>
+          </a:bodyPr>
+          <a:lstStyle/>
+          <a:p>
+            <a:r>
+              <a:rPr lang="en-US" dirty="0"/>
+              <a:t>Here </a:t>
+            </a:r>
+            <a:r>
+              <a:rPr lang="en-US" b="0" dirty="0">
+                <a:solidFill>
+                  <a:srgbClr val="795E26"/>
+                </a:solidFill>
+                <a:effectLst/>
+                <a:latin typeface="Consolas" panose="020B0609020204030204" pitchFamily="49" charset="0"/>
+              </a:rPr>
+              <a:t>reset</a:t>
+            </a:r>
+            <a:r>
+              <a:rPr lang="en-US" dirty="0"/>
+              <a:t> and </a:t>
+            </a:r>
+            <a:r>
+              <a:rPr lang="en-US" b="0" dirty="0">
+                <a:solidFill>
+                  <a:srgbClr val="795E26"/>
+                </a:solidFill>
+                <a:effectLst/>
+                <a:latin typeface="Consolas" panose="020B0609020204030204" pitchFamily="49" charset="0"/>
+              </a:rPr>
+              <a:t>tick</a:t>
+            </a:r>
+            <a:r>
+              <a:rPr lang="en-US" dirty="0"/>
+              <a:t> are different kinds of events.</a:t>
+            </a:r>
+          </a:p>
+        </p:txBody>
+      </p:sp>
     </p:spTree>
     <p:extLst>
       <p:ext uri="{BB962C8B-B14F-4D97-AF65-F5344CB8AC3E}">
@@ -31232,7 +31459,7 @@
         <p:spPr>
           <a:xfrm>
             <a:off x="838200" y="1737598"/>
-            <a:ext cx="9574530" cy="4247317"/>
+            <a:ext cx="9574530" cy="4524315"/>
           </a:xfrm>
           <a:prstGeom prst="rect">
             <a:avLst/>
@@ -31673,21 +31900,680 @@
                 <a:effectLst/>
                 <a:latin typeface="Consolas" panose="020B0609020204030204" pitchFamily="49" charset="0"/>
               </a:rPr>
+              <a:t>    	 </a:t>
+            </a:r>
+            <a:r>
+              <a:rPr lang="en-US" b="0" dirty="0" err="1">
+                <a:solidFill>
+                  <a:srgbClr val="0000FF"/>
+                </a:solidFill>
+                <a:effectLst/>
+                <a:latin typeface="Consolas" panose="020B0609020204030204" pitchFamily="49" charset="0"/>
+              </a:rPr>
+              <a:t>this</a:t>
+            </a:r>
+            <a:r>
+              <a:rPr lang="en-US" b="0" dirty="0" err="1">
+                <a:solidFill>
+                  <a:srgbClr val="000000"/>
+                </a:solidFill>
+                <a:effectLst/>
+                <a:latin typeface="Consolas" panose="020B0609020204030204" pitchFamily="49" charset="0"/>
+              </a:rPr>
+              <a:t>.</a:t>
+            </a:r>
+            <a:r>
+              <a:rPr lang="en-US" b="0" dirty="0" err="1">
+                <a:solidFill>
+                  <a:srgbClr val="001080"/>
+                </a:solidFill>
+                <a:effectLst/>
+                <a:latin typeface="Consolas" panose="020B0609020204030204" pitchFamily="49" charset="0"/>
+              </a:rPr>
+              <a:t>emitter</a:t>
+            </a:r>
+            <a:r>
+              <a:rPr lang="en-US" b="0" dirty="0" err="1">
+                <a:solidFill>
+                  <a:srgbClr val="000000"/>
+                </a:solidFill>
+                <a:effectLst/>
+                <a:latin typeface="Consolas" panose="020B0609020204030204" pitchFamily="49" charset="0"/>
+              </a:rPr>
+              <a:t>.</a:t>
+            </a:r>
+            <a:r>
+              <a:rPr lang="en-US" b="0" dirty="0" err="1">
+                <a:solidFill>
+                  <a:srgbClr val="795E26"/>
+                </a:solidFill>
+                <a:effectLst/>
+                <a:latin typeface="Consolas" panose="020B0609020204030204" pitchFamily="49" charset="0"/>
+              </a:rPr>
+              <a:t>emit</a:t>
+            </a:r>
+            <a:r>
+              <a:rPr lang="en-US" b="0" dirty="0">
+                <a:solidFill>
+                  <a:srgbClr val="000000"/>
+                </a:solidFill>
+                <a:effectLst/>
+                <a:latin typeface="Consolas" panose="020B0609020204030204" pitchFamily="49" charset="0"/>
+              </a:rPr>
+              <a:t>(</a:t>
+            </a:r>
+            <a:r>
+              <a:rPr lang="en-US" b="0" dirty="0">
+                <a:solidFill>
+                  <a:srgbClr val="A31515"/>
+                </a:solidFill>
+                <a:effectLst/>
+                <a:latin typeface="Consolas" panose="020B0609020204030204" pitchFamily="49" charset="0"/>
+              </a:rPr>
+              <a:t>'tick'</a:t>
+            </a:r>
+            <a:r>
+              <a:rPr lang="en-US" b="0" dirty="0">
+                <a:solidFill>
+                  <a:srgbClr val="000000"/>
+                </a:solidFill>
+                <a:effectLst/>
+                <a:latin typeface="Consolas" panose="020B0609020204030204" pitchFamily="49" charset="0"/>
+              </a:rPr>
+              <a:t>, </a:t>
+            </a:r>
+            <a:r>
+              <a:rPr lang="en-US" b="0" dirty="0">
+                <a:solidFill>
+                  <a:srgbClr val="098658"/>
+                </a:solidFill>
+                <a:effectLst/>
+                <a:latin typeface="Consolas" panose="020B0609020204030204" pitchFamily="49" charset="0"/>
+              </a:rPr>
+              <a:t>1</a:t>
+            </a:r>
+            <a:r>
+              <a:rPr lang="en-US" b="0" dirty="0">
+                <a:solidFill>
+                  <a:srgbClr val="000000"/>
+                </a:solidFill>
+                <a:effectLst/>
+                <a:latin typeface="Consolas" panose="020B0609020204030204" pitchFamily="49" charset="0"/>
+              </a:rPr>
+              <a:t>); </a:t>
+            </a:r>
+            <a:br>
+              <a:rPr lang="en-US" b="0" dirty="0">
+                <a:solidFill>
+                  <a:srgbClr val="000000"/>
+                </a:solidFill>
+                <a:effectLst/>
+                <a:latin typeface="Consolas" panose="020B0609020204030204" pitchFamily="49" charset="0"/>
+              </a:rPr>
+            </a:br>
+            <a:r>
+              <a:rPr lang="en-US" b="0" dirty="0">
+                <a:solidFill>
+                  <a:srgbClr val="000000"/>
+                </a:solidFill>
+                <a:effectLst/>
+                <a:latin typeface="Consolas" panose="020B0609020204030204" pitchFamily="49" charset="0"/>
+              </a:rPr>
+              <a:t>	 </a:t>
+            </a:r>
+            <a:r>
+              <a:rPr lang="en-US" b="0" dirty="0" err="1">
+                <a:solidFill>
+                  <a:srgbClr val="0000FF"/>
+                </a:solidFill>
+                <a:effectLst/>
+                <a:latin typeface="Consolas" panose="020B0609020204030204" pitchFamily="49" charset="0"/>
+              </a:rPr>
+              <a:t>this</a:t>
+            </a:r>
+            <a:r>
+              <a:rPr lang="en-US" b="0" dirty="0" err="1">
+                <a:solidFill>
+                  <a:srgbClr val="000000"/>
+                </a:solidFill>
+                <a:effectLst/>
+                <a:latin typeface="Consolas" panose="020B0609020204030204" pitchFamily="49" charset="0"/>
+              </a:rPr>
+              <a:t>.</a:t>
+            </a:r>
+            <a:r>
+              <a:rPr lang="en-US" b="0" dirty="0" err="1">
+                <a:solidFill>
+                  <a:srgbClr val="001080"/>
+                </a:solidFill>
+                <a:effectLst/>
+                <a:latin typeface="Consolas" panose="020B0609020204030204" pitchFamily="49" charset="0"/>
+              </a:rPr>
+              <a:t>emitter</a:t>
+            </a:r>
+            <a:r>
+              <a:rPr lang="en-US" b="0" dirty="0" err="1">
+                <a:solidFill>
+                  <a:srgbClr val="000000"/>
+                </a:solidFill>
+                <a:effectLst/>
+                <a:latin typeface="Consolas" panose="020B0609020204030204" pitchFamily="49" charset="0"/>
+              </a:rPr>
+              <a:t>.</a:t>
+            </a:r>
+            <a:r>
+              <a:rPr lang="en-US" b="0" dirty="0" err="1">
+                <a:solidFill>
+                  <a:srgbClr val="795E26"/>
+                </a:solidFill>
+                <a:effectLst/>
+                <a:latin typeface="Consolas" panose="020B0609020204030204" pitchFamily="49" charset="0"/>
+              </a:rPr>
+              <a:t>emit</a:t>
+            </a:r>
+            <a:r>
+              <a:rPr lang="en-US" b="0" dirty="0">
+                <a:solidFill>
+                  <a:srgbClr val="000000"/>
+                </a:solidFill>
+                <a:effectLst/>
+                <a:latin typeface="Consolas" panose="020B0609020204030204" pitchFamily="49" charset="0"/>
+              </a:rPr>
+              <a:t>(</a:t>
+            </a:r>
+            <a:r>
+              <a:rPr lang="en-US" b="0" dirty="0">
+                <a:solidFill>
+                  <a:srgbClr val="A31515"/>
+                </a:solidFill>
+                <a:effectLst/>
+                <a:latin typeface="Consolas" panose="020B0609020204030204" pitchFamily="49" charset="0"/>
+              </a:rPr>
+              <a:t>'reset'</a:t>
+            </a:r>
+            <a:r>
+              <a:rPr lang="en-US" b="0" dirty="0">
+                <a:solidFill>
+                  <a:srgbClr val="000000"/>
+                </a:solidFill>
+                <a:effectLst/>
+                <a:latin typeface="Consolas" panose="020B0609020204030204" pitchFamily="49" charset="0"/>
+              </a:rPr>
+              <a:t>)</a:t>
+            </a:r>
+          </a:p>
+          <a:p>
+            <a:r>
+              <a:rPr lang="en-US" b="0" dirty="0">
+                <a:solidFill>
+                  <a:srgbClr val="000000"/>
+                </a:solidFill>
+                <a:effectLst/>
+                <a:latin typeface="Consolas" panose="020B0609020204030204" pitchFamily="49" charset="0"/>
+              </a:rPr>
+              <a:t>    }</a:t>
+            </a:r>
+          </a:p>
+          <a:p>
+            <a:r>
+              <a:rPr lang="en-US" b="0" dirty="0">
+                <a:solidFill>
+                  <a:srgbClr val="000000"/>
+                </a:solidFill>
+                <a:effectLst/>
+                <a:latin typeface="Consolas" panose="020B0609020204030204" pitchFamily="49" charset="0"/>
+              </a:rPr>
+              <a:t>}</a:t>
+            </a:r>
+          </a:p>
+          <a:p>
+            <a:br>
+              <a:rPr lang="en-US" b="0" dirty="0">
+                <a:solidFill>
+                  <a:srgbClr val="000000"/>
+                </a:solidFill>
+                <a:effectLst/>
+                <a:latin typeface="Consolas" panose="020B0609020204030204" pitchFamily="49" charset="0"/>
+              </a:rPr>
+            </a:br>
+            <a:r>
+              <a:rPr lang="en-US" b="0" dirty="0">
+                <a:solidFill>
+                  <a:srgbClr val="0000FF"/>
+                </a:solidFill>
+                <a:effectLst/>
+                <a:latin typeface="Consolas" panose="020B0609020204030204" pitchFamily="49" charset="0"/>
+              </a:rPr>
+              <a:t>class</a:t>
+            </a:r>
+            <a:r>
+              <a:rPr lang="en-US" b="0" dirty="0">
+                <a:solidFill>
+                  <a:srgbClr val="000000"/>
+                </a:solidFill>
+                <a:effectLst/>
+                <a:latin typeface="Consolas" panose="020B0609020204030204" pitchFamily="49" charset="0"/>
+              </a:rPr>
+              <a:t> </a:t>
+            </a:r>
+            <a:r>
+              <a:rPr lang="en-US" b="0" dirty="0" err="1">
+                <a:solidFill>
+                  <a:srgbClr val="267F99"/>
+                </a:solidFill>
+                <a:effectLst/>
+                <a:latin typeface="Consolas" panose="020B0609020204030204" pitchFamily="49" charset="0"/>
+              </a:rPr>
+              <a:t>SampleEmitterClient</a:t>
+            </a:r>
+            <a:r>
+              <a:rPr lang="en-US" b="0" dirty="0">
+                <a:solidFill>
+                  <a:srgbClr val="000000"/>
+                </a:solidFill>
+                <a:effectLst/>
+                <a:latin typeface="Consolas" panose="020B0609020204030204" pitchFamily="49" charset="0"/>
+              </a:rPr>
+              <a:t> {</a:t>
+            </a:r>
+          </a:p>
+          <a:p>
+            <a:r>
+              <a:rPr lang="en-US" b="0" dirty="0">
+                <a:solidFill>
+                  <a:srgbClr val="000000"/>
+                </a:solidFill>
+                <a:effectLst/>
+                <a:latin typeface="Consolas" panose="020B0609020204030204" pitchFamily="49" charset="0"/>
+              </a:rPr>
+              <a:t>    </a:t>
+            </a:r>
+            <a:r>
+              <a:rPr lang="en-US" b="0" dirty="0">
+                <a:solidFill>
+                  <a:srgbClr val="0000FF"/>
+                </a:solidFill>
+                <a:effectLst/>
+                <a:latin typeface="Consolas" panose="020B0609020204030204" pitchFamily="49" charset="0"/>
+              </a:rPr>
+              <a:t>constructor</a:t>
+            </a:r>
+            <a:r>
+              <a:rPr lang="en-US" b="0" dirty="0">
+                <a:solidFill>
+                  <a:srgbClr val="000000"/>
+                </a:solidFill>
+                <a:effectLst/>
+                <a:latin typeface="Consolas" panose="020B0609020204030204" pitchFamily="49" charset="0"/>
+              </a:rPr>
+              <a:t> (</a:t>
+            </a:r>
+            <a:r>
+              <a:rPr lang="en-US" b="0" dirty="0" err="1">
+                <a:solidFill>
+                  <a:srgbClr val="001080"/>
+                </a:solidFill>
+                <a:effectLst/>
+                <a:latin typeface="Consolas" panose="020B0609020204030204" pitchFamily="49" charset="0"/>
+              </a:rPr>
+              <a:t>server</a:t>
+            </a:r>
+            <a:r>
+              <a:rPr lang="en-US" b="0" dirty="0" err="1">
+                <a:solidFill>
+                  <a:srgbClr val="000000"/>
+                </a:solidFill>
+                <a:effectLst/>
+                <a:latin typeface="Consolas" panose="020B0609020204030204" pitchFamily="49" charset="0"/>
+              </a:rPr>
+              <a:t>:</a:t>
+            </a:r>
+            <a:r>
+              <a:rPr lang="en-US" b="0" dirty="0" err="1">
+                <a:solidFill>
+                  <a:srgbClr val="267F99"/>
+                </a:solidFill>
+                <a:effectLst/>
+                <a:latin typeface="Consolas" panose="020B0609020204030204" pitchFamily="49" charset="0"/>
+              </a:rPr>
+              <a:t>SampleEmitterServer</a:t>
+            </a:r>
+            <a:r>
+              <a:rPr lang="en-US" b="0" dirty="0">
+                <a:solidFill>
+                  <a:srgbClr val="000000"/>
+                </a:solidFill>
+                <a:effectLst/>
+                <a:latin typeface="Consolas" panose="020B0609020204030204" pitchFamily="49" charset="0"/>
+              </a:rPr>
+              <a:t>) {</a:t>
+            </a:r>
+          </a:p>
+          <a:p>
+            <a:r>
+              <a:rPr lang="en-US" b="0" dirty="0">
+                <a:solidFill>
+                  <a:srgbClr val="000000"/>
+                </a:solidFill>
+                <a:effectLst/>
+                <a:latin typeface="Consolas" panose="020B0609020204030204" pitchFamily="49" charset="0"/>
+              </a:rPr>
               <a:t>        </a:t>
             </a:r>
             <a:r>
+              <a:rPr lang="en-US" b="0" dirty="0">
+                <a:solidFill>
+                  <a:srgbClr val="0000FF"/>
+                </a:solidFill>
+                <a:effectLst/>
+                <a:latin typeface="Consolas" panose="020B0609020204030204" pitchFamily="49" charset="0"/>
+              </a:rPr>
+              <a:t>const</a:t>
+            </a:r>
+            <a:r>
+              <a:rPr lang="en-US" b="0" dirty="0">
+                <a:solidFill>
+                  <a:srgbClr val="000000"/>
+                </a:solidFill>
+                <a:effectLst/>
+                <a:latin typeface="Consolas" panose="020B0609020204030204" pitchFamily="49" charset="0"/>
+              </a:rPr>
+              <a:t> </a:t>
+            </a:r>
+            <a:r>
+              <a:rPr lang="en-US" b="0" dirty="0">
+                <a:solidFill>
+                  <a:srgbClr val="0070C1"/>
+                </a:solidFill>
+                <a:effectLst/>
+                <a:latin typeface="Consolas" panose="020B0609020204030204" pitchFamily="49" charset="0"/>
+              </a:rPr>
+              <a:t>emitter</a:t>
+            </a:r>
+            <a:r>
+              <a:rPr lang="en-US" b="0" dirty="0">
+                <a:solidFill>
+                  <a:srgbClr val="000000"/>
+                </a:solidFill>
+                <a:effectLst/>
+                <a:latin typeface="Consolas" panose="020B0609020204030204" pitchFamily="49" charset="0"/>
+              </a:rPr>
+              <a:t> = </a:t>
+            </a:r>
+            <a:r>
               <a:rPr lang="en-US" b="0" dirty="0" err="1">
                 <a:solidFill>
+                  <a:srgbClr val="001080"/>
+                </a:solidFill>
+                <a:effectLst/>
+                <a:latin typeface="Consolas" panose="020B0609020204030204" pitchFamily="49" charset="0"/>
+              </a:rPr>
+              <a:t>server</a:t>
+            </a:r>
+            <a:r>
+              <a:rPr lang="en-US" b="0" dirty="0" err="1">
+                <a:solidFill>
+                  <a:srgbClr val="000000"/>
+                </a:solidFill>
+                <a:effectLst/>
+                <a:latin typeface="Consolas" panose="020B0609020204030204" pitchFamily="49" charset="0"/>
+              </a:rPr>
+              <a:t>.</a:t>
+            </a:r>
+            <a:r>
+              <a:rPr lang="en-US" b="0" dirty="0" err="1">
+                <a:solidFill>
+                  <a:srgbClr val="795E26"/>
+                </a:solidFill>
+                <a:effectLst/>
+                <a:latin typeface="Consolas" panose="020B0609020204030204" pitchFamily="49" charset="0"/>
+              </a:rPr>
+              <a:t>getEmitter</a:t>
+            </a:r>
+            <a:r>
+              <a:rPr lang="en-US" b="0" dirty="0">
+                <a:solidFill>
+                  <a:srgbClr val="000000"/>
+                </a:solidFill>
+                <a:effectLst/>
+                <a:latin typeface="Consolas" panose="020B0609020204030204" pitchFamily="49" charset="0"/>
+              </a:rPr>
+              <a:t>()</a:t>
+            </a:r>
+          </a:p>
+          <a:p>
+            <a:r>
+              <a:rPr lang="en-US" b="0" dirty="0">
+                <a:solidFill>
+                  <a:srgbClr val="000000"/>
+                </a:solidFill>
+                <a:effectLst/>
+                <a:latin typeface="Consolas" panose="020B0609020204030204" pitchFamily="49" charset="0"/>
+              </a:rPr>
+              <a:t>        </a:t>
+            </a:r>
+            <a:r>
+              <a:rPr lang="en-US" b="0" dirty="0" err="1">
+                <a:solidFill>
+                  <a:srgbClr val="0070C1"/>
+                </a:solidFill>
+                <a:effectLst/>
+                <a:latin typeface="Consolas" panose="020B0609020204030204" pitchFamily="49" charset="0"/>
+              </a:rPr>
+              <a:t>emitter</a:t>
+            </a:r>
+            <a:r>
+              <a:rPr lang="en-US" b="0" dirty="0" err="1">
+                <a:solidFill>
+                  <a:srgbClr val="000000"/>
+                </a:solidFill>
+                <a:effectLst/>
+                <a:latin typeface="Consolas" panose="020B0609020204030204" pitchFamily="49" charset="0"/>
+              </a:rPr>
+              <a:t>.</a:t>
+            </a:r>
+            <a:r>
+              <a:rPr lang="en-US" b="0" dirty="0" err="1">
+                <a:solidFill>
+                  <a:srgbClr val="795E26"/>
+                </a:solidFill>
+                <a:effectLst/>
+                <a:latin typeface="Consolas" panose="020B0609020204030204" pitchFamily="49" charset="0"/>
+              </a:rPr>
+              <a:t>on</a:t>
+            </a:r>
+            <a:r>
+              <a:rPr lang="en-US" b="0" dirty="0">
+                <a:solidFill>
+                  <a:srgbClr val="000000"/>
+                </a:solidFill>
+                <a:effectLst/>
+                <a:latin typeface="Consolas" panose="020B0609020204030204" pitchFamily="49" charset="0"/>
+              </a:rPr>
+              <a:t>(</a:t>
+            </a:r>
+            <a:r>
+              <a:rPr lang="en-US" b="0" dirty="0">
+                <a:solidFill>
+                  <a:srgbClr val="A31515"/>
+                </a:solidFill>
+                <a:effectLst/>
+                <a:latin typeface="Consolas" panose="020B0609020204030204" pitchFamily="49" charset="0"/>
+              </a:rPr>
+              <a:t>'tick'</a:t>
+            </a:r>
+            <a:r>
+              <a:rPr lang="en-US" b="0" dirty="0">
+                <a:solidFill>
+                  <a:srgbClr val="000000"/>
+                </a:solidFill>
+                <a:effectLst/>
+                <a:latin typeface="Consolas" panose="020B0609020204030204" pitchFamily="49" charset="0"/>
+              </a:rPr>
+              <a:t>, (</a:t>
+            </a:r>
+            <a:r>
+              <a:rPr lang="en-US" b="0" dirty="0" err="1">
+                <a:solidFill>
+                  <a:srgbClr val="001080"/>
+                </a:solidFill>
+                <a:effectLst/>
+                <a:latin typeface="Consolas" panose="020B0609020204030204" pitchFamily="49" charset="0"/>
+              </a:rPr>
+              <a:t>t</a:t>
+            </a:r>
+            <a:r>
+              <a:rPr lang="en-US" b="0" dirty="0" err="1">
+                <a:solidFill>
+                  <a:srgbClr val="000000"/>
+                </a:solidFill>
+                <a:effectLst/>
+                <a:latin typeface="Consolas" panose="020B0609020204030204" pitchFamily="49" charset="0"/>
+              </a:rPr>
+              <a:t>:</a:t>
+            </a:r>
+            <a:r>
+              <a:rPr lang="en-US" b="0" dirty="0" err="1">
+                <a:solidFill>
+                  <a:srgbClr val="267F99"/>
+                </a:solidFill>
+                <a:effectLst/>
+                <a:latin typeface="Consolas" panose="020B0609020204030204" pitchFamily="49" charset="0"/>
+              </a:rPr>
+              <a:t>number</a:t>
+            </a:r>
+            <a:r>
+              <a:rPr lang="en-US" b="0" dirty="0">
+                <a:solidFill>
+                  <a:srgbClr val="000000"/>
+                </a:solidFill>
+                <a:effectLst/>
+                <a:latin typeface="Consolas" panose="020B0609020204030204" pitchFamily="49" charset="0"/>
+              </a:rPr>
+              <a:t>) </a:t>
+            </a:r>
+            <a:r>
+              <a:rPr lang="en-US" b="0" dirty="0">
+                <a:solidFill>
                   <a:srgbClr val="0000FF"/>
                 </a:solidFill>
                 <a:effectLst/>
                 <a:latin typeface="Consolas" panose="020B0609020204030204" pitchFamily="49" charset="0"/>
               </a:rPr>
-              <a:t>this</a:t>
+              <a:t>=&gt;</a:t>
+            </a:r>
+            <a:r>
+              <a:rPr lang="en-US" b="0" dirty="0">
+                <a:solidFill>
+                  <a:srgbClr val="000000"/>
+                </a:solidFill>
+                <a:effectLst/>
+                <a:latin typeface="Consolas" panose="020B0609020204030204" pitchFamily="49" charset="0"/>
+              </a:rPr>
+              <a:t> {</a:t>
+            </a:r>
+            <a:r>
+              <a:rPr lang="en-US" b="0" dirty="0">
+                <a:solidFill>
+                  <a:srgbClr val="001080"/>
+                </a:solidFill>
+                <a:effectLst/>
+                <a:latin typeface="Consolas" panose="020B0609020204030204" pitchFamily="49" charset="0"/>
+              </a:rPr>
+              <a:t>console</a:t>
+            </a:r>
+            <a:r>
+              <a:rPr lang="en-US" b="0" dirty="0">
+                <a:solidFill>
+                  <a:srgbClr val="000000"/>
+                </a:solidFill>
+                <a:effectLst/>
+                <a:latin typeface="Consolas" panose="020B0609020204030204" pitchFamily="49" charset="0"/>
+              </a:rPr>
+              <a:t>.</a:t>
+            </a:r>
+            <a:r>
+              <a:rPr lang="en-US" b="0" dirty="0">
+                <a:solidFill>
+                  <a:srgbClr val="795E26"/>
+                </a:solidFill>
+                <a:effectLst/>
+                <a:latin typeface="Consolas" panose="020B0609020204030204" pitchFamily="49" charset="0"/>
+              </a:rPr>
+              <a:t>log</a:t>
+            </a:r>
+            <a:r>
+              <a:rPr lang="en-US" b="0" dirty="0">
+                <a:solidFill>
+                  <a:srgbClr val="000000"/>
+                </a:solidFill>
+                <a:effectLst/>
+                <a:latin typeface="Consolas" panose="020B0609020204030204" pitchFamily="49" charset="0"/>
+              </a:rPr>
+              <a:t>(</a:t>
+            </a:r>
+            <a:r>
+              <a:rPr lang="en-US" b="0" dirty="0">
+                <a:solidFill>
+                  <a:srgbClr val="001080"/>
+                </a:solidFill>
+                <a:effectLst/>
+                <a:latin typeface="Consolas" panose="020B0609020204030204" pitchFamily="49" charset="0"/>
+              </a:rPr>
+              <a:t>t</a:t>
+            </a:r>
+            <a:r>
+              <a:rPr lang="en-US" b="0" dirty="0">
+                <a:solidFill>
+                  <a:srgbClr val="000000"/>
+                </a:solidFill>
+                <a:effectLst/>
+                <a:latin typeface="Consolas" panose="020B0609020204030204" pitchFamily="49" charset="0"/>
+              </a:rPr>
+              <a:t>)}) </a:t>
+            </a:r>
+            <a:r>
+              <a:rPr lang="en-US" b="0" dirty="0">
+                <a:solidFill>
+                  <a:srgbClr val="008000"/>
+                </a:solidFill>
+                <a:effectLst/>
+                <a:latin typeface="Consolas" panose="020B0609020204030204" pitchFamily="49" charset="0"/>
+              </a:rPr>
+              <a:t>//subscribe</a:t>
+            </a:r>
+            <a:endParaRPr lang="en-US" b="0" dirty="0">
+              <a:solidFill>
+                <a:srgbClr val="000000"/>
+              </a:solidFill>
+              <a:effectLst/>
+              <a:latin typeface="Consolas" panose="020B0609020204030204" pitchFamily="49" charset="0"/>
+            </a:endParaRPr>
+          </a:p>
+          <a:p>
+            <a:r>
+              <a:rPr lang="en-US" b="0" dirty="0">
+                <a:solidFill>
+                  <a:srgbClr val="000000"/>
+                </a:solidFill>
+                <a:effectLst/>
+                <a:latin typeface="Consolas" panose="020B0609020204030204" pitchFamily="49" charset="0"/>
+              </a:rPr>
+              <a:t>        </a:t>
             </a:r>
             <a:r>
               <a:rPr lang="en-US" b="0" dirty="0" err="1">
                 <a:solidFill>
+                  <a:srgbClr val="0070C1"/>
+                </a:solidFill>
+                <a:effectLst/>
+                <a:latin typeface="Consolas" panose="020B0609020204030204" pitchFamily="49" charset="0"/>
+              </a:rPr>
+              <a:t>emitter</a:t>
+            </a:r>
+            <a:r>
+              <a:rPr lang="en-US" b="0" dirty="0" err="1">
+                <a:solidFill>
                   <a:srgbClr val="000000"/>
                 </a:solidFill>
                 <a:effectLst/>
@@ -31698,15 +32584,75 @@
             <a:r>
               <a:rPr lang="en-US" b="0" dirty="0" err="1">
                 <a:solidFill>
+                  <a:srgbClr val="795E26"/>
+                </a:solidFill>
+                <a:effectLst/>
+                <a:latin typeface="Consolas" panose="020B0609020204030204" pitchFamily="49" charset="0"/>
+              </a:rPr>
+              <a:t>on</a:t>
+            </a:r>
+            <a:r>
+              <a:rPr lang="en-US" b="0" dirty="0">
+                <a:solidFill>
+                  <a:srgbClr val="000000"/>
+                </a:solidFill>
+                <a:effectLst/>
+                <a:latin typeface="Consolas" panose="020B0609020204030204" pitchFamily="49" charset="0"/>
+              </a:rPr>
+              <a:t>(</a:t>
+            </a:r>
+            <a:r>
+              <a:rPr lang="en-US" b="0" dirty="0">
+                <a:solidFill>
+                  <a:srgbClr val="A31515"/>
+                </a:solidFill>
+                <a:effectLst/>
+                <a:latin typeface="Consolas" panose="020B0609020204030204" pitchFamily="49" charset="0"/>
+              </a:rPr>
+              <a:t>'reset'</a:t>
+            </a:r>
+            <a:r>
+              <a:rPr lang="en-US" b="0" dirty="0">
+                <a:solidFill>
+                  <a:srgbClr val="000000"/>
+                </a:solidFill>
+                <a:effectLst/>
+                <a:latin typeface="Consolas" panose="020B0609020204030204" pitchFamily="49" charset="0"/>
+              </a:rPr>
+              <a:t>, () </a:t>
+            </a:r>
+            <a:r>
+              <a:rPr lang="en-US" b="0" dirty="0">
+                <a:solidFill>
+                  <a:srgbClr val="0000FF"/>
+                </a:solidFill>
+                <a:effectLst/>
+                <a:latin typeface="Consolas" panose="020B0609020204030204" pitchFamily="49" charset="0"/>
+              </a:rPr>
+              <a:t>=&gt;</a:t>
+            </a:r>
+            <a:r>
+              <a:rPr lang="en-US" b="0" dirty="0">
+                <a:solidFill>
+                  <a:srgbClr val="000000"/>
+                </a:solidFill>
+                <a:effectLst/>
+                <a:latin typeface="Consolas" panose="020B0609020204030204" pitchFamily="49" charset="0"/>
+              </a:rPr>
+              <a:t> {</a:t>
+            </a:r>
+            <a:r>
+              <a:rPr lang="en-US" b="0" dirty="0">
+                <a:solidFill>
                   <a:srgbClr val="001080"/>
                 </a:solidFill>
                 <a:effectLst/>
                 <a:latin typeface="Consolas" panose="020B0609020204030204" pitchFamily="49" charset="0"/>
               </a:rPr>
-              <a:t>emitter</a:t>
-            </a:r>
-            <a:r>
-              <a:rPr lang="en-US" b="0" dirty="0" err="1">
+              <a:t>console</a:t>
+            </a:r>
+            <a:r>
+              <a:rPr lang="en-US" b="0" dirty="0">
                 <a:solidFill>
                   <a:srgbClr val="000000"/>
                 </a:solidFill>
@@ -31716,14 +32662,14 @@
               <a:t>.</a:t>
             </a:r>
             <a:r>
-              <a:rPr lang="en-US" b="0" dirty="0" err="1">
+              <a:rPr lang="en-US" b="0" dirty="0">
                 <a:solidFill>
                   <a:srgbClr val="795E26"/>
                 </a:solidFill>
                 <a:effectLst/>
                 <a:latin typeface="Consolas" panose="020B0609020204030204" pitchFamily="49" charset="0"/>
               </a:rPr>
-              <a:t>emit</a:t>
+              <a:t>log</a:t>
             </a:r>
             <a:r>
               <a:rPr lang="en-US" b="0" dirty="0">
@@ -31743,106 +32689,6 @@
                 <a:effectLst/>
                 <a:latin typeface="Consolas" panose="020B0609020204030204" pitchFamily="49" charset="0"/>
               </a:rPr>
-              <a:t>'tick'</a:t>
-            </a:r>
-            <a:r>
-              <a:rPr lang="en-US" b="0" dirty="0">
-                <a:solidFill>
-                  <a:srgbClr val="000000"/>
-                </a:solidFill>
-                <a:effectLst/>
-                <a:latin typeface="Consolas" panose="020B0609020204030204" pitchFamily="49" charset="0"/>
-              </a:rPr>
-              <a:t>, </a:t>
-            </a:r>
-            <a:r>
-              <a:rPr lang="en-US" b="0" dirty="0">
-                <a:solidFill>
-                  <a:srgbClr val="098658"/>
-                </a:solidFill>
-                <a:effectLst/>
-                <a:latin typeface="Consolas" panose="020B0609020204030204" pitchFamily="49" charset="0"/>
-              </a:rPr>
-              <a:t>1</a:t>
-            </a:r>
-            <a:r>
-              <a:rPr lang="en-US" b="0" dirty="0">
-                <a:solidFill>
-                  <a:srgbClr val="000000"/>
-                </a:solidFill>
-                <a:effectLst/>
-                <a:latin typeface="Consolas" panose="020B0609020204030204" pitchFamily="49" charset="0"/>
-              </a:rPr>
-              <a:t>); </a:t>
-            </a:r>
-            <a:r>
-              <a:rPr lang="en-US" b="0" dirty="0" err="1">
-                <a:solidFill>
-                  <a:srgbClr val="0000FF"/>
-                </a:solidFill>
-                <a:effectLst/>
-                <a:latin typeface="Consolas" panose="020B0609020204030204" pitchFamily="49" charset="0"/>
-              </a:rPr>
-              <a:t>this</a:t>
-            </a:r>
-            <a:r>
-              <a:rPr lang="en-US" b="0" dirty="0" err="1">
-                <a:solidFill>
-                  <a:srgbClr val="000000"/>
-                </a:solidFill>
-                <a:effectLst/>
-                <a:latin typeface="Consolas" panose="020B0609020204030204" pitchFamily="49" charset="0"/>
-              </a:rPr>
-              <a:t>.</a:t>
-            </a:r>
-            <a:r>
-              <a:rPr lang="en-US" b="0" dirty="0" err="1">
-                <a:solidFill>
-                  <a:srgbClr val="001080"/>
-                </a:solidFill>
-                <a:effectLst/>
-                <a:latin typeface="Consolas" panose="020B0609020204030204" pitchFamily="49" charset="0"/>
-              </a:rPr>
-              <a:t>emitter</a:t>
-            </a:r>
-            <a:r>
-              <a:rPr lang="en-US" b="0" dirty="0" err="1">
-                <a:solidFill>
-                  <a:srgbClr val="000000"/>
-                </a:solidFill>
-                <a:effectLst/>
-                <a:latin typeface="Consolas" panose="020B0609020204030204" pitchFamily="49" charset="0"/>
-              </a:rPr>
-              <a:t>.</a:t>
-            </a:r>
-            <a:r>
-              <a:rPr lang="en-US" b="0" dirty="0" err="1">
-                <a:solidFill>
-                  <a:srgbClr val="795E26"/>
-                </a:solidFill>
-                <a:effectLst/>
-                <a:latin typeface="Consolas" panose="020B0609020204030204" pitchFamily="49" charset="0"/>
-              </a:rPr>
-              <a:t>emit</a:t>
-            </a:r>
-            <a:r>
-              <a:rPr lang="en-US" b="0" dirty="0">
-                <a:solidFill>
-                  <a:srgbClr val="000000"/>
-                </a:solidFill>
-                <a:effectLst/>
-                <a:latin typeface="Consolas" panose="020B0609020204030204" pitchFamily="49" charset="0"/>
-              </a:rPr>
-              <a:t>(</a:t>
-            </a:r>
-            <a:r>
-              <a:rPr lang="en-US" b="0" dirty="0">
-                <a:solidFill>
-                  <a:srgbClr val="A31515"/>
-                </a:solidFill>
-                <a:effectLst/>
-                <a:latin typeface="Consolas" panose="020B0609020204030204" pitchFamily="49" charset="0"/>
-              </a:rPr>
               <a:t>'reset'</a:t>
             </a:r>
             <a:r>
@@ -31853,7 +32699,7 @@
                 <a:effectLst/>
                 <a:latin typeface="Consolas" panose="020B0609020204030204" pitchFamily="49" charset="0"/>
               </a:rPr>
-              <a:t>)</a:t>
+              <a:t>)})</a:t>
             </a:r>
           </a:p>
           <a:p>
@@ -31880,587 +32726,148 @@
               <a:t>}</a:t>
             </a:r>
           </a:p>
-          <a:p>
-            <a:br>
-              <a:rPr lang="en-US" b="0" dirty="0">
-                <a:solidFill>
-                  <a:srgbClr val="000000"/>
-                </a:solidFill>
-                <a:effectLst/>
-                <a:latin typeface="Consolas" panose="020B0609020204030204" pitchFamily="49" charset="0"/>
-              </a:rPr>
-            </a:br>
-            <a:r>
-              <a:rPr lang="en-US" b="0" dirty="0">
-                <a:solidFill>
-                  <a:srgbClr val="0000FF"/>
-                </a:solidFill>
-                <a:effectLst/>
-                <a:latin typeface="Consolas" panose="020B0609020204030204" pitchFamily="49" charset="0"/>
-              </a:rPr>
-              <a:t>class</a:t>
-            </a:r>
-            <a:r>
-              <a:rPr lang="en-US" b="0" dirty="0">
-                <a:solidFill>
-                  <a:srgbClr val="000000"/>
-                </a:solidFill>
-                <a:effectLst/>
-                <a:latin typeface="Consolas" panose="020B0609020204030204" pitchFamily="49" charset="0"/>
-              </a:rPr>
-              <a:t> </a:t>
-            </a:r>
-            <a:r>
-              <a:rPr lang="en-US" b="0" dirty="0" err="1">
-                <a:solidFill>
-                  <a:srgbClr val="267F99"/>
-                </a:solidFill>
-                <a:effectLst/>
-                <a:latin typeface="Consolas" panose="020B0609020204030204" pitchFamily="49" charset="0"/>
-              </a:rPr>
-              <a:t>SampleEmitterClient</a:t>
-            </a:r>
-            <a:r>
-              <a:rPr lang="en-US" b="0" dirty="0">
-                <a:solidFill>
-                  <a:srgbClr val="000000"/>
-                </a:solidFill>
-                <a:effectLst/>
-                <a:latin typeface="Consolas" panose="020B0609020204030204" pitchFamily="49" charset="0"/>
-              </a:rPr>
-              <a:t> {</a:t>
-            </a:r>
-          </a:p>
-          <a:p>
-            <a:r>
-              <a:rPr lang="en-US" b="0" dirty="0">
-                <a:solidFill>
-                  <a:srgbClr val="000000"/>
-                </a:solidFill>
-                <a:effectLst/>
-                <a:latin typeface="Consolas" panose="020B0609020204030204" pitchFamily="49" charset="0"/>
-              </a:rPr>
-              <a:t>    </a:t>
-            </a:r>
-            <a:r>
-              <a:rPr lang="en-US" b="0" dirty="0">
-                <a:solidFill>
-                  <a:srgbClr val="0000FF"/>
-                </a:solidFill>
-                <a:effectLst/>
-                <a:latin typeface="Consolas" panose="020B0609020204030204" pitchFamily="49" charset="0"/>
-              </a:rPr>
-              <a:t>constructor</a:t>
-            </a:r>
-            <a:r>
-              <a:rPr lang="en-US" b="0" dirty="0">
-                <a:solidFill>
-                  <a:srgbClr val="000000"/>
-                </a:solidFill>
-                <a:effectLst/>
-                <a:latin typeface="Consolas" panose="020B0609020204030204" pitchFamily="49" charset="0"/>
-              </a:rPr>
-              <a:t> (</a:t>
-            </a:r>
-            <a:r>
-              <a:rPr lang="en-US" b="0" dirty="0" err="1">
-                <a:solidFill>
-                  <a:srgbClr val="001080"/>
-                </a:solidFill>
-                <a:effectLst/>
-                <a:latin typeface="Consolas" panose="020B0609020204030204" pitchFamily="49" charset="0"/>
-              </a:rPr>
-              <a:t>server</a:t>
-            </a:r>
-            <a:r>
-              <a:rPr lang="en-US" b="0" dirty="0" err="1">
-                <a:solidFill>
-                  <a:srgbClr val="000000"/>
-                </a:solidFill>
-                <a:effectLst/>
-                <a:latin typeface="Consolas" panose="020B0609020204030204" pitchFamily="49" charset="0"/>
-              </a:rPr>
-              <a:t>:</a:t>
-            </a:r>
-            <a:r>
-              <a:rPr lang="en-US" b="0" dirty="0" err="1">
-                <a:solidFill>
-                  <a:srgbClr val="267F99"/>
-                </a:solidFill>
-                <a:effectLst/>
-                <a:latin typeface="Consolas" panose="020B0609020204030204" pitchFamily="49" charset="0"/>
-              </a:rPr>
-              <a:t>SampleEmitterServer</a:t>
-            </a:r>
-            <a:r>
-              <a:rPr lang="en-US" b="0" dirty="0">
-                <a:solidFill>
-                  <a:srgbClr val="000000"/>
-                </a:solidFill>
-                <a:effectLst/>
-                <a:latin typeface="Consolas" panose="020B0609020204030204" pitchFamily="49" charset="0"/>
-              </a:rPr>
-              <a:t>) {</a:t>
-            </a:r>
-          </a:p>
-          <a:p>
-            <a:r>
-              <a:rPr lang="en-US" b="0" dirty="0">
-                <a:solidFill>
-                  <a:srgbClr val="000000"/>
-                </a:solidFill>
-                <a:effectLst/>
-                <a:latin typeface="Consolas" panose="020B0609020204030204" pitchFamily="49" charset="0"/>
-              </a:rPr>
-              <a:t>        </a:t>
-            </a:r>
-            <a:r>
-              <a:rPr lang="en-US" b="0" dirty="0">
-                <a:solidFill>
-                  <a:srgbClr val="0000FF"/>
-                </a:solidFill>
-                <a:effectLst/>
-                <a:latin typeface="Consolas" panose="020B0609020204030204" pitchFamily="49" charset="0"/>
-              </a:rPr>
-              <a:t>const</a:t>
-            </a:r>
-            <a:r>
-              <a:rPr lang="en-US" b="0" dirty="0">
-                <a:solidFill>
-                  <a:srgbClr val="000000"/>
-                </a:solidFill>
-                <a:effectLst/>
-                <a:latin typeface="Consolas" panose="020B0609020204030204" pitchFamily="49" charset="0"/>
-              </a:rPr>
-              <a:t> </a:t>
-            </a:r>
-            <a:r>
-              <a:rPr lang="en-US" b="0" dirty="0">
-                <a:solidFill>
-                  <a:srgbClr val="0070C1"/>
-                </a:solidFill>
-                <a:effectLst/>
-                <a:latin typeface="Consolas" panose="020B0609020204030204" pitchFamily="49" charset="0"/>
-              </a:rPr>
-              <a:t>emitter</a:t>
-            </a:r>
-            <a:r>
-              <a:rPr lang="en-US" b="0" dirty="0">
-                <a:solidFill>
-                  <a:srgbClr val="000000"/>
-                </a:solidFill>
-                <a:effectLst/>
-                <a:latin typeface="Consolas" panose="020B0609020204030204" pitchFamily="49" charset="0"/>
-              </a:rPr>
-              <a:t> = </a:t>
-            </a:r>
-            <a:r>
-              <a:rPr lang="en-US" b="0" dirty="0" err="1">
-                <a:solidFill>
-                  <a:srgbClr val="001080"/>
-                </a:solidFill>
-                <a:effectLst/>
-                <a:latin typeface="Consolas" panose="020B0609020204030204" pitchFamily="49" charset="0"/>
-              </a:rPr>
-              <a:t>server</a:t>
-            </a:r>
-            <a:r>
-              <a:rPr lang="en-US" b="0" dirty="0" err="1">
-                <a:solidFill>
-                  <a:srgbClr val="000000"/>
-                </a:solidFill>
-                <a:effectLst/>
-                <a:latin typeface="Consolas" panose="020B0609020204030204" pitchFamily="49" charset="0"/>
-              </a:rPr>
-              <a:t>.</a:t>
-            </a:r>
-            <a:r>
-              <a:rPr lang="en-US" b="0" dirty="0" err="1">
-                <a:solidFill>
-                  <a:srgbClr val="795E26"/>
-                </a:solidFill>
-                <a:effectLst/>
-                <a:latin typeface="Consolas" panose="020B0609020204030204" pitchFamily="49" charset="0"/>
-              </a:rPr>
-              <a:t>getEmitter</a:t>
-            </a:r>
-            <a:r>
-              <a:rPr lang="en-US" b="0" dirty="0">
-                <a:solidFill>
-                  <a:srgbClr val="000000"/>
-                </a:solidFill>
-                <a:effectLst/>
-                <a:latin typeface="Consolas" panose="020B0609020204030204" pitchFamily="49" charset="0"/>
-              </a:rPr>
-              <a:t>()</a:t>
-            </a:r>
-          </a:p>
-          <a:p>
-            <a:r>
-              <a:rPr lang="en-US" b="0" dirty="0">
-                <a:solidFill>
-                  <a:srgbClr val="000000"/>
-                </a:solidFill>
-                <a:effectLst/>
-                <a:latin typeface="Consolas" panose="020B0609020204030204" pitchFamily="49" charset="0"/>
-              </a:rPr>
-              <a:t>        </a:t>
-            </a:r>
-            <a:r>
-              <a:rPr lang="en-US" b="0" dirty="0" err="1">
-                <a:solidFill>
-                  <a:srgbClr val="0070C1"/>
-                </a:solidFill>
-                <a:effectLst/>
-                <a:latin typeface="Consolas" panose="020B0609020204030204" pitchFamily="49" charset="0"/>
-              </a:rPr>
-              <a:t>emitter</a:t>
-            </a:r>
-            <a:r>
-              <a:rPr lang="en-US" b="0" dirty="0" err="1">
-                <a:solidFill>
-                  <a:srgbClr val="000000"/>
-                </a:solidFill>
-                <a:effectLst/>
-                <a:latin typeface="Consolas" panose="020B0609020204030204" pitchFamily="49" charset="0"/>
-              </a:rPr>
-              <a:t>.</a:t>
-            </a:r>
-            <a:r>
-              <a:rPr lang="en-US" b="0" dirty="0" err="1">
-                <a:solidFill>
-                  <a:srgbClr val="795E26"/>
-                </a:solidFill>
-                <a:effectLst/>
-                <a:latin typeface="Consolas" panose="020B0609020204030204" pitchFamily="49" charset="0"/>
-              </a:rPr>
-              <a:t>on</a:t>
-            </a:r>
-            <a:r>
-              <a:rPr lang="en-US" b="0" dirty="0">
-                <a:solidFill>
-                  <a:srgbClr val="000000"/>
-                </a:solidFill>
-                <a:effectLst/>
-                <a:latin typeface="Consolas" panose="020B0609020204030204" pitchFamily="49" charset="0"/>
-              </a:rPr>
-              <a:t>(</a:t>
-            </a:r>
-            <a:r>
-              <a:rPr lang="en-US" b="0" dirty="0">
-                <a:solidFill>
-                  <a:srgbClr val="A31515"/>
-                </a:solidFill>
-                <a:effectLst/>
-                <a:latin typeface="Consolas" panose="020B0609020204030204" pitchFamily="49" charset="0"/>
-              </a:rPr>
-              <a:t>'tick'</a:t>
-            </a:r>
-            <a:r>
-              <a:rPr lang="en-US" b="0" dirty="0">
-                <a:solidFill>
-                  <a:srgbClr val="000000"/>
-                </a:solidFill>
-                <a:effectLst/>
-                <a:latin typeface="Consolas" panose="020B0609020204030204" pitchFamily="49" charset="0"/>
-              </a:rPr>
-              <a:t>, (</a:t>
-            </a:r>
-            <a:r>
-              <a:rPr lang="en-US" b="0" dirty="0" err="1">
-                <a:solidFill>
-                  <a:srgbClr val="001080"/>
-                </a:solidFill>
-                <a:effectLst/>
-                <a:latin typeface="Consolas" panose="020B0609020204030204" pitchFamily="49" charset="0"/>
-              </a:rPr>
-              <a:t>t</a:t>
-            </a:r>
-            <a:r>
-              <a:rPr lang="en-US" b="0" dirty="0" err="1">
-                <a:solidFill>
-                  <a:srgbClr val="000000"/>
-                </a:solidFill>
-                <a:effectLst/>
-                <a:latin typeface="Consolas" panose="020B0609020204030204" pitchFamily="49" charset="0"/>
-              </a:rPr>
-              <a:t>:</a:t>
-            </a:r>
-            <a:r>
-              <a:rPr lang="en-US" b="0" dirty="0" err="1">
-                <a:solidFill>
-                  <a:srgbClr val="267F99"/>
-                </a:solidFill>
-                <a:effectLst/>
-                <a:latin typeface="Consolas" panose="020B0609020204030204" pitchFamily="49" charset="0"/>
-              </a:rPr>
-              <a:t>number</a:t>
-            </a:r>
-            <a:r>
-              <a:rPr lang="en-US" b="0" dirty="0">
-                <a:solidFill>
-                  <a:srgbClr val="000000"/>
-                </a:solidFill>
-                <a:effectLst/>
-                <a:latin typeface="Consolas" panose="020B0609020204030204" pitchFamily="49" charset="0"/>
-              </a:rPr>
-              <a:t>) </a:t>
-            </a:r>
-            <a:r>
-              <a:rPr lang="en-US" b="0" dirty="0">
-                <a:solidFill>
-                  <a:srgbClr val="0000FF"/>
-                </a:solidFill>
-                <a:effectLst/>
-                <a:latin typeface="Consolas" panose="020B0609020204030204" pitchFamily="49" charset="0"/>
-              </a:rPr>
-              <a:t>=&gt;</a:t>
-            </a:r>
-            <a:r>
-              <a:rPr lang="en-US" b="0" dirty="0">
-                <a:solidFill>
-                  <a:srgbClr val="000000"/>
-                </a:solidFill>
-                <a:effectLst/>
-                <a:latin typeface="Consolas" panose="020B0609020204030204" pitchFamily="49" charset="0"/>
-              </a:rPr>
-              <a:t> {</a:t>
-            </a:r>
-            <a:r>
-              <a:rPr lang="en-US" b="0" dirty="0">
-                <a:solidFill>
-                  <a:srgbClr val="001080"/>
-                </a:solidFill>
-                <a:effectLst/>
-                <a:latin typeface="Consolas" panose="020B0609020204030204" pitchFamily="49" charset="0"/>
-              </a:rPr>
-              <a:t>console</a:t>
-            </a:r>
-            <a:r>
-              <a:rPr lang="en-US" b="0" dirty="0">
-                <a:solidFill>
-                  <a:srgbClr val="000000"/>
-                </a:solidFill>
-                <a:effectLst/>
-                <a:latin typeface="Consolas" panose="020B0609020204030204" pitchFamily="49" charset="0"/>
-              </a:rPr>
-              <a:t>.</a:t>
-            </a:r>
-            <a:r>
-              <a:rPr lang="en-US" b="0" dirty="0">
-                <a:solidFill>
-                  <a:srgbClr val="795E26"/>
-                </a:solidFill>
-                <a:effectLst/>
-                <a:latin typeface="Consolas" panose="020B0609020204030204" pitchFamily="49" charset="0"/>
-              </a:rPr>
-              <a:t>log</a:t>
-            </a:r>
-            <a:r>
-              <a:rPr lang="en-US" b="0" dirty="0">
-                <a:solidFill>
-                  <a:srgbClr val="000000"/>
-                </a:solidFill>
-                <a:effectLst/>
-                <a:latin typeface="Consolas" panose="020B0609020204030204" pitchFamily="49" charset="0"/>
-              </a:rPr>
-              <a:t>(</a:t>
-            </a:r>
-            <a:r>
-              <a:rPr lang="en-US" b="0" dirty="0">
-                <a:solidFill>
-                  <a:srgbClr val="001080"/>
-                </a:solidFill>
-                <a:effectLst/>
-                <a:latin typeface="Consolas" panose="020B0609020204030204" pitchFamily="49" charset="0"/>
-              </a:rPr>
-              <a:t>t</a:t>
-            </a:r>
-            <a:r>
-              <a:rPr lang="en-US" b="0" dirty="0">
-                <a:solidFill>
-                  <a:srgbClr val="000000"/>
-                </a:solidFill>
-                <a:effectLst/>
-                <a:latin typeface="Consolas" panose="020B0609020204030204" pitchFamily="49" charset="0"/>
-              </a:rPr>
-              <a:t>)})</a:t>
-            </a:r>
-          </a:p>
-          <a:p>
-            <a:r>
-              <a:rPr lang="en-US" b="0" dirty="0">
-                <a:solidFill>
-                  <a:srgbClr val="000000"/>
-                </a:solidFill>
-                <a:effectLst/>
-                <a:latin typeface="Consolas" panose="020B0609020204030204" pitchFamily="49" charset="0"/>
-              </a:rPr>
-              <a:t>        </a:t>
-            </a:r>
-            <a:r>
-              <a:rPr lang="en-US" b="0" dirty="0" err="1">
-                <a:solidFill>
-                  <a:srgbClr val="0070C1"/>
-                </a:solidFill>
-                <a:effectLst/>
-                <a:latin typeface="Consolas" panose="020B0609020204030204" pitchFamily="49" charset="0"/>
-              </a:rPr>
-              <a:t>emitter</a:t>
-            </a:r>
-            <a:r>
-              <a:rPr lang="en-US" b="0" dirty="0" err="1">
-                <a:solidFill>
-                  <a:srgbClr val="000000"/>
-                </a:solidFill>
-                <a:effectLst/>
-                <a:latin typeface="Consolas" panose="020B0609020204030204" pitchFamily="49" charset="0"/>
-              </a:rPr>
-              <a:t>.</a:t>
-            </a:r>
-            <a:r>
-              <a:rPr lang="en-US" b="0" dirty="0" err="1">
-                <a:solidFill>
-                  <a:srgbClr val="795E26"/>
-                </a:solidFill>
-                <a:effectLst/>
-                <a:latin typeface="Consolas" panose="020B0609020204030204" pitchFamily="49" charset="0"/>
-              </a:rPr>
-              <a:t>on</a:t>
-            </a:r>
-            <a:r>
-              <a:rPr lang="en-US" b="0" dirty="0">
-                <a:solidFill>
-                  <a:srgbClr val="000000"/>
-                </a:solidFill>
-                <a:effectLst/>
-                <a:latin typeface="Consolas" panose="020B0609020204030204" pitchFamily="49" charset="0"/>
-              </a:rPr>
-              <a:t>(</a:t>
-            </a:r>
-            <a:r>
-              <a:rPr lang="en-US" b="0" dirty="0">
-                <a:solidFill>
-                  <a:srgbClr val="A31515"/>
-                </a:solidFill>
-                <a:effectLst/>
-                <a:latin typeface="Consolas" panose="020B0609020204030204" pitchFamily="49" charset="0"/>
-              </a:rPr>
-              <a:t>'reset'</a:t>
-            </a:r>
-            <a:r>
-              <a:rPr lang="en-US" b="0" dirty="0">
-                <a:solidFill>
-                  <a:srgbClr val="000000"/>
-                </a:solidFill>
-                <a:effectLst/>
-                <a:latin typeface="Consolas" panose="020B0609020204030204" pitchFamily="49" charset="0"/>
-              </a:rPr>
-              <a:t>, () </a:t>
-            </a:r>
-            <a:r>
-              <a:rPr lang="en-US" b="0" dirty="0">
-                <a:solidFill>
-                  <a:srgbClr val="0000FF"/>
-                </a:solidFill>
-                <a:effectLst/>
-                <a:latin typeface="Consolas" panose="020B0609020204030204" pitchFamily="49" charset="0"/>
-              </a:rPr>
-              <a:t>=&gt;</a:t>
-            </a:r>
-            <a:r>
-              <a:rPr lang="en-US" b="0" dirty="0">
-                <a:solidFill>
-                  <a:srgbClr val="000000"/>
-                </a:solidFill>
-                <a:effectLst/>
-                <a:latin typeface="Consolas" panose="020B0609020204030204" pitchFamily="49" charset="0"/>
-              </a:rPr>
-              <a:t> {</a:t>
-            </a:r>
-            <a:r>
-              <a:rPr lang="en-US" b="0" dirty="0">
-                <a:solidFill>
-                  <a:srgbClr val="001080"/>
-                </a:solidFill>
-                <a:effectLst/>
-                <a:latin typeface="Consolas" panose="020B0609020204030204" pitchFamily="49" charset="0"/>
-              </a:rPr>
-              <a:t>console</a:t>
-            </a:r>
-            <a:r>
-              <a:rPr lang="en-US" b="0" dirty="0">
-                <a:solidFill>
-                  <a:srgbClr val="000000"/>
-                </a:solidFill>
-                <a:effectLst/>
-                <a:latin typeface="Consolas" panose="020B0609020204030204" pitchFamily="49" charset="0"/>
-              </a:rPr>
-              <a:t>.</a:t>
-            </a:r>
-            <a:r>
-              <a:rPr lang="en-US" b="0" dirty="0">
-                <a:solidFill>
-                  <a:srgbClr val="795E26"/>
-                </a:solidFill>
-                <a:effectLst/>
-                <a:latin typeface="Consolas" panose="020B0609020204030204" pitchFamily="49" charset="0"/>
-              </a:rPr>
-              <a:t>log</a:t>
-            </a:r>
-            <a:r>
-              <a:rPr lang="en-US" b="0" dirty="0">
-                <a:solidFill>
-                  <a:srgbClr val="000000"/>
-                </a:solidFill>
-                <a:effectLst/>
-                <a:latin typeface="Consolas" panose="020B0609020204030204" pitchFamily="49" charset="0"/>
-              </a:rPr>
-              <a:t>(</a:t>
-            </a:r>
-            <a:r>
-              <a:rPr lang="en-US" b="0" dirty="0">
-                <a:solidFill>
-                  <a:srgbClr val="A31515"/>
-                </a:solidFill>
-                <a:effectLst/>
-                <a:latin typeface="Consolas" panose="020B0609020204030204" pitchFamily="49" charset="0"/>
-              </a:rPr>
-              <a:t>'reset'</a:t>
-            </a:r>
-            <a:r>
-              <a:rPr lang="en-US" b="0" dirty="0">
-                <a:solidFill>
-                  <a:srgbClr val="000000"/>
-                </a:solidFill>
-                <a:effectLst/>
-                <a:latin typeface="Consolas" panose="020B0609020204030204" pitchFamily="49" charset="0"/>
-              </a:rPr>
-              <a:t>)})</a:t>
-            </a:r>
-          </a:p>
-          <a:p>
-            <a:r>
-              <a:rPr lang="en-US" b="0" dirty="0">
-                <a:solidFill>
-                  <a:srgbClr val="000000"/>
-                </a:solidFill>
-                <a:effectLst/>
-                <a:latin typeface="Consolas" panose="020B0609020204030204" pitchFamily="49" charset="0"/>
-              </a:rPr>
-              <a:t>    }</a:t>
-            </a:r>
-          </a:p>
-          <a:p>
-            <a:r>
-              <a:rPr lang="en-US" b="0" dirty="0">
-                <a:solidFill>
-                  <a:srgbClr val="000000"/>
-                </a:solidFill>
-                <a:effectLst/>
-                <a:latin typeface="Consolas" panose="020B0609020204030204" pitchFamily="49" charset="0"/>
-              </a:rPr>
-              <a:t>}</a:t>
+        </p:txBody>
+      </p:sp>
+      <p:sp>
+        <p:nvSpPr>
+          <p:cNvPr id="3" name="TextBox 2">
+            <a:extLst>
+              <a:ext uri="{FF2B5EF4-FFF2-40B4-BE49-F238E27FC236}">
+                <a16:creationId xmlns:a16="http://schemas.microsoft.com/office/drawing/2014/main" id="{843D4DC8-A441-107D-1B73-9E96E3FA8F38}"/>
+              </a:ext>
+            </a:extLst>
+          </p:cNvPr>
+          <p:cNvSpPr txBox="1"/>
+          <p:nvPr/>
+        </p:nvSpPr>
+        <p:spPr>
+          <a:xfrm>
+            <a:off x="6578600" y="2796804"/>
+            <a:ext cx="4660900" cy="658423"/>
+          </a:xfrm>
+          <a:prstGeom prst="rect">
+            <a:avLst/>
+          </a:prstGeom>
+          <a:solidFill>
+            <a:schemeClr val="accent2"/>
+          </a:solidFill>
+          <a:ln>
+            <a:noFill/>
+          </a:ln>
+        </p:spPr>
+        <p:style>
+          <a:lnRef idx="2">
+            <a:schemeClr val="accent1">
+              <a:shade val="50000"/>
+            </a:schemeClr>
+          </a:lnRef>
+          <a:fillRef idx="1">
+            <a:schemeClr val="accent1"/>
+          </a:fillRef>
+          <a:effectRef idx="0">
+            <a:schemeClr val="accent1"/>
+          </a:effectRef>
+          <a:fontRef idx="minor">
+            <a:schemeClr val="lt1"/>
+          </a:fontRef>
+        </p:style>
+        <p:txBody>
+          <a:bodyPr rot="0" spcFirstLastPara="0" vertOverflow="overflow" horzOverflow="overflow" vert="horz" wrap="square" lIns="91440" tIns="45720" rIns="91440" bIns="45720" numCol="1" spcCol="0" rtlCol="0" fromWordArt="0" anchor="ctr" anchorCtr="0" forceAA="0" compatLnSpc="1">
+            <a:prstTxWarp prst="textNoShape">
+              <a:avLst/>
+            </a:prstTxWarp>
+            <a:noAutofit/>
+          </a:bodyPr>
+          <a:lstStyle/>
+          <a:p>
+            <a:pPr algn="l"/>
+            <a:r>
+              <a:rPr lang="en-US" sz="2800" dirty="0">
+                <a:solidFill>
+                  <a:schemeClr val="tx1"/>
+                </a:solidFill>
+              </a:rPr>
+              <a:t>When an event occurs:</a:t>
+            </a:r>
+            <a:r>
+              <a:rPr lang="en-US" sz="2800" b="1" dirty="0">
+                <a:solidFill>
+                  <a:schemeClr val="tx1"/>
+                </a:solidFill>
+              </a:rPr>
+              <a:t> emit()</a:t>
+            </a:r>
+          </a:p>
+        </p:txBody>
+      </p:sp>
+      <p:sp>
+        <p:nvSpPr>
+          <p:cNvPr id="5" name="TextBox 4">
+            <a:extLst>
+              <a:ext uri="{FF2B5EF4-FFF2-40B4-BE49-F238E27FC236}">
+                <a16:creationId xmlns:a16="http://schemas.microsoft.com/office/drawing/2014/main" id="{D4C2007B-B96D-60CD-3BA5-64619CB8139E}"/>
+              </a:ext>
+            </a:extLst>
+          </p:cNvPr>
+          <p:cNvSpPr txBox="1"/>
+          <p:nvPr/>
+        </p:nvSpPr>
+        <p:spPr>
+          <a:xfrm>
+            <a:off x="6578600" y="5880490"/>
+            <a:ext cx="4876800" cy="658422"/>
+          </a:xfrm>
+          <a:prstGeom prst="rect">
+            <a:avLst/>
+          </a:prstGeom>
+          <a:solidFill>
+            <a:schemeClr val="accent2"/>
+          </a:solidFill>
+          <a:ln>
+            <a:noFill/>
+          </a:ln>
+        </p:spPr>
+        <p:style>
+          <a:lnRef idx="2">
+            <a:schemeClr val="accent1">
+              <a:shade val="50000"/>
+            </a:schemeClr>
+          </a:lnRef>
+          <a:fillRef idx="1">
+            <a:schemeClr val="accent1"/>
+          </a:fillRef>
+          <a:effectRef idx="0">
+            <a:schemeClr val="accent1"/>
+          </a:effectRef>
+          <a:fontRef idx="minor">
+            <a:schemeClr val="lt1"/>
+          </a:fontRef>
+        </p:style>
+        <p:txBody>
+          <a:bodyPr rot="0" spcFirstLastPara="0" vertOverflow="overflow" horzOverflow="overflow" vert="horz" wrap="square" lIns="91440" tIns="45720" rIns="91440" bIns="45720" numCol="1" spcCol="0" rtlCol="0" fromWordArt="0" anchor="ctr" anchorCtr="0" forceAA="0" compatLnSpc="1">
+            <a:prstTxWarp prst="textNoShape">
+              <a:avLst/>
+            </a:prstTxWarp>
+            <a:noAutofit/>
+          </a:bodyPr>
+          <a:lstStyle/>
+          <a:p>
+            <a:pPr algn="l"/>
+            <a:r>
+              <a:rPr lang="en-US" sz="2800" dirty="0">
+                <a:solidFill>
+                  <a:schemeClr val="tx1"/>
+                </a:solidFill>
+              </a:rPr>
+              <a:t>When you need to register:</a:t>
+            </a:r>
+            <a:r>
+              <a:rPr lang="en-US" sz="2800" b="1" dirty="0">
+                <a:solidFill>
+                  <a:schemeClr val="tx1"/>
+                </a:solidFill>
+              </a:rPr>
+              <a:t> on()</a:t>
             </a:r>
           </a:p>
         </p:txBody>
@@ -34642,7 +35049,7 @@
                 <a:effectLst/>
                 <a:latin typeface="Consolas" panose="020B0609020204030204" pitchFamily="49" charset="0"/>
               </a:rPr>
-              <a:t>// set up event listeners       </a:t>
+              <a:t>// set up event listeners or subscribe for events       </a:t>
             </a:r>
             <a:endParaRPr lang="en-US" b="0" dirty="0">
               <a:solidFill>
@@ -35178,6 +35585,468 @@
           <p:cNvPr id="2" name="Title 1">
             <a:extLst>
               <a:ext uri="{FF2B5EF4-FFF2-40B4-BE49-F238E27FC236}">
+                <a16:creationId xmlns:a16="http://schemas.microsoft.com/office/drawing/2014/main" id="{91D08315-FAFF-DEDD-AFF5-DB61B986CF93}"/>
+              </a:ext>
+            </a:extLst>
+          </p:cNvPr>
+          <p:cNvSpPr>
+            <a:spLocks noGrp="1"/>
+          </p:cNvSpPr>
+          <p:nvPr>
+            <p:ph type="title"/>
+          </p:nvPr>
+        </p:nvSpPr>
+        <p:spPr/>
+        <p:txBody>
+          <a:bodyPr/>
+          <a:lstStyle/>
+          <a:p>
+            <a:r>
+              <a:rPr lang="en-US" dirty="0"/>
+              <a:t>Emitter Pattern has many variations</a:t>
+            </a:r>
+          </a:p>
+        </p:txBody>
+      </p:sp>
+      <p:sp>
+        <p:nvSpPr>
+          <p:cNvPr id="3" name="Slide Number Placeholder 2">
+            <a:extLst>
+              <a:ext uri="{FF2B5EF4-FFF2-40B4-BE49-F238E27FC236}">
+                <a16:creationId xmlns:a16="http://schemas.microsoft.com/office/drawing/2014/main" id="{299A3370-B546-40F5-67DE-9984CD8F38DE}"/>
+              </a:ext>
+            </a:extLst>
+          </p:cNvPr>
+          <p:cNvSpPr>
+            <a:spLocks noGrp="1"/>
+          </p:cNvSpPr>
+          <p:nvPr>
+            <p:ph type="sldNum" sz="quarter" idx="12"/>
+          </p:nvPr>
+        </p:nvSpPr>
+        <p:spPr/>
+        <p:txBody>
+          <a:bodyPr/>
+          <a:lstStyle/>
+          <a:p>
+            <a:fld id="{20F37917-FD3A-4669-9018-DA04BCDD3D75}" type="slidenum">
+              <a:rPr lang="en-US" smtClean="0"/>
+              <a:t>34</a:t>
+            </a:fld>
+            <a:endParaRPr lang="en-US"/>
+          </a:p>
+        </p:txBody>
+      </p:sp>
+      <p:sp>
+        <p:nvSpPr>
+          <p:cNvPr id="6" name="TextBox 5">
+            <a:extLst>
+              <a:ext uri="{FF2B5EF4-FFF2-40B4-BE49-F238E27FC236}">
+                <a16:creationId xmlns:a16="http://schemas.microsoft.com/office/drawing/2014/main" id="{7373FFB7-FCBD-EB81-2B2B-F9FA562B1B75}"/>
+              </a:ext>
+            </a:extLst>
+          </p:cNvPr>
+          <p:cNvSpPr txBox="1"/>
+          <p:nvPr/>
+        </p:nvSpPr>
+        <p:spPr>
+          <a:xfrm>
+            <a:off x="1039332" y="1578799"/>
+            <a:ext cx="10515600" cy="4678204"/>
+          </a:xfrm>
+          <a:prstGeom prst="rect">
+            <a:avLst/>
+          </a:prstGeom>
+          <a:noFill/>
+          <a:ln w="12700" cap="flat" cmpd="sng" algn="ctr">
+            <a:noFill/>
+            <a:prstDash val="solid"/>
+            <a:miter lim="800000"/>
+          </a:ln>
+          <a:effectLst/>
+        </p:spPr>
+        <p:style>
+          <a:lnRef idx="2">
+            <a:schemeClr val="accent1">
+              <a:shade val="50000"/>
+            </a:schemeClr>
+          </a:lnRef>
+          <a:fillRef idx="1">
+            <a:schemeClr val="accent1"/>
+          </a:fillRef>
+          <a:effectRef idx="0">
+            <a:schemeClr val="accent1"/>
+          </a:effectRef>
+          <a:fontRef idx="minor">
+            <a:schemeClr val="lt1"/>
+          </a:fontRef>
+        </p:style>
+        <p:txBody>
+          <a:bodyPr wrap="square">
+            <a:spAutoFit/>
+          </a:bodyPr>
+          <a:lstStyle/>
+          <a:p>
+            <a:r>
+              <a:rPr lang="en-US" sz="2000" dirty="0">
+                <a:solidFill>
+                  <a:srgbClr val="AF00DB"/>
+                </a:solidFill>
+                <a:effectLst/>
+                <a:latin typeface="Consolas" panose="020B0609020204030204" pitchFamily="49" charset="0"/>
+              </a:rPr>
+              <a:t>export</a:t>
+            </a:r>
+            <a:r>
+              <a:rPr lang="en-US" sz="2000" dirty="0">
+                <a:solidFill>
+                  <a:srgbClr val="000000"/>
+                </a:solidFill>
+                <a:effectLst/>
+                <a:latin typeface="Consolas" panose="020B0609020204030204" pitchFamily="49" charset="0"/>
+              </a:rPr>
+              <a:t> </a:t>
+            </a:r>
+            <a:r>
+              <a:rPr lang="en-US" sz="2000" dirty="0">
+                <a:solidFill>
+                  <a:srgbClr val="0000FF"/>
+                </a:solidFill>
+                <a:effectLst/>
+                <a:latin typeface="Consolas" panose="020B0609020204030204" pitchFamily="49" charset="0"/>
+              </a:rPr>
+              <a:t>interface</a:t>
+            </a:r>
+            <a:r>
+              <a:rPr lang="en-US" sz="2000" dirty="0">
+                <a:solidFill>
+                  <a:srgbClr val="000000"/>
+                </a:solidFill>
+                <a:effectLst/>
+                <a:latin typeface="Consolas" panose="020B0609020204030204" pitchFamily="49" charset="0"/>
+              </a:rPr>
+              <a:t> </a:t>
+            </a:r>
+            <a:r>
+              <a:rPr lang="en-US" sz="2000" dirty="0" err="1">
+                <a:solidFill>
+                  <a:srgbClr val="267F99"/>
+                </a:solidFill>
+                <a:effectLst/>
+                <a:latin typeface="Consolas" panose="020B0609020204030204" pitchFamily="49" charset="0"/>
+              </a:rPr>
+              <a:t>EventEmitter</a:t>
+            </a:r>
+            <a:r>
+              <a:rPr lang="en-US" sz="2000" dirty="0">
+                <a:solidFill>
+                  <a:srgbClr val="000000"/>
+                </a:solidFill>
+                <a:effectLst/>
+                <a:latin typeface="Consolas" panose="020B0609020204030204" pitchFamily="49" charset="0"/>
+              </a:rPr>
+              <a:t> {</a:t>
+            </a:r>
+          </a:p>
+          <a:p>
+            <a:endParaRPr lang="en-US" sz="2000" dirty="0">
+              <a:solidFill>
+                <a:srgbClr val="008000"/>
+              </a:solidFill>
+              <a:effectLst/>
+              <a:latin typeface="Consolas" panose="020B0609020204030204" pitchFamily="49" charset="0"/>
+            </a:endParaRPr>
+          </a:p>
+          <a:p>
+            <a:r>
+              <a:rPr lang="en-US" sz="2000" dirty="0">
+                <a:solidFill>
+                  <a:srgbClr val="008000"/>
+                </a:solidFill>
+                <a:effectLst/>
+                <a:latin typeface="Consolas" panose="020B0609020204030204" pitchFamily="49" charset="0"/>
+              </a:rPr>
+              <a:t>    /** Run callback every time event is emitted */ </a:t>
+            </a:r>
+          </a:p>
+          <a:p>
+            <a:r>
+              <a:rPr lang="en-US" sz="2000" dirty="0">
+                <a:solidFill>
+                  <a:srgbClr val="008000"/>
+                </a:solidFill>
+                <a:effectLst/>
+                <a:latin typeface="Consolas" panose="020B0609020204030204" pitchFamily="49" charset="0"/>
+              </a:rPr>
+              <a:t>    </a:t>
+            </a:r>
+            <a:r>
+              <a:rPr lang="en-US" sz="2000" dirty="0">
+                <a:solidFill>
+                  <a:srgbClr val="FFC000"/>
+                </a:solidFill>
+                <a:effectLst/>
+                <a:latin typeface="Consolas" panose="020B0609020204030204" pitchFamily="49" charset="0"/>
+              </a:rPr>
+              <a:t>on(event, callback);</a:t>
+            </a:r>
+            <a:endParaRPr lang="en-US" sz="2000" dirty="0">
+              <a:solidFill>
+                <a:srgbClr val="008000"/>
+              </a:solidFill>
+              <a:effectLst/>
+              <a:latin typeface="Consolas" panose="020B0609020204030204" pitchFamily="49" charset="0"/>
+            </a:endParaRPr>
+          </a:p>
+          <a:p>
+            <a:r>
+              <a:rPr lang="en-US" sz="2000" dirty="0">
+                <a:solidFill>
+                  <a:srgbClr val="008000"/>
+                </a:solidFill>
+                <a:latin typeface="Consolas" panose="020B0609020204030204" pitchFamily="49" charset="0"/>
+              </a:rPr>
+              <a:t>    </a:t>
+            </a:r>
+            <a:r>
+              <a:rPr lang="en-US" sz="2000" dirty="0">
+                <a:solidFill>
+                  <a:srgbClr val="008000"/>
+                </a:solidFill>
+                <a:effectLst/>
+                <a:latin typeface="Consolas" panose="020B0609020204030204" pitchFamily="49" charset="0"/>
+              </a:rPr>
+              <a:t>/** Run callback when event is emitted just for the first time */</a:t>
+            </a:r>
+          </a:p>
+          <a:p>
+            <a:r>
+              <a:rPr lang="en-US" sz="2000" dirty="0">
+                <a:solidFill>
+                  <a:srgbClr val="008000"/>
+                </a:solidFill>
+                <a:effectLst/>
+                <a:latin typeface="Consolas" panose="020B0609020204030204" pitchFamily="49" charset="0"/>
+              </a:rPr>
+              <a:t>    </a:t>
+            </a:r>
+            <a:r>
+              <a:rPr lang="en-US" sz="2000" dirty="0">
+                <a:solidFill>
+                  <a:srgbClr val="FFC000"/>
+                </a:solidFill>
+                <a:effectLst/>
+                <a:latin typeface="Consolas" panose="020B0609020204030204" pitchFamily="49" charset="0"/>
+              </a:rPr>
+              <a:t>once(event, callback);</a:t>
+            </a:r>
+            <a:endParaRPr lang="en-US" sz="2000" dirty="0">
+              <a:solidFill>
+                <a:srgbClr val="008000"/>
+              </a:solidFill>
+              <a:effectLst/>
+              <a:latin typeface="Consolas" panose="020B0609020204030204" pitchFamily="49" charset="0"/>
+            </a:endParaRPr>
+          </a:p>
+          <a:p>
+            <a:r>
+              <a:rPr lang="en-US" sz="2000" dirty="0">
+                <a:solidFill>
+                  <a:srgbClr val="008000"/>
+                </a:solidFill>
+                <a:effectLst/>
+                <a:latin typeface="Consolas" panose="020B0609020204030204" pitchFamily="49" charset="0"/>
+              </a:rPr>
+              <a:t>    /** Removes the callback for event */ </a:t>
+            </a:r>
+          </a:p>
+          <a:p>
+            <a:r>
+              <a:rPr lang="en-US" sz="2000" dirty="0">
+                <a:solidFill>
+                  <a:srgbClr val="FFC000"/>
+                </a:solidFill>
+                <a:effectLst/>
+                <a:latin typeface="Consolas" panose="020B0609020204030204" pitchFamily="49" charset="0"/>
+              </a:rPr>
+              <a:t>    off(event, callback</a:t>
+            </a:r>
+            <a:r>
+              <a:rPr lang="en-US" sz="2000" dirty="0">
+                <a:solidFill>
+                  <a:srgbClr val="008000"/>
+                </a:solidFill>
+                <a:effectLst/>
+                <a:latin typeface="Consolas" panose="020B0609020204030204" pitchFamily="49" charset="0"/>
+              </a:rPr>
+              <a:t>);</a:t>
+            </a:r>
+          </a:p>
+          <a:p>
+            <a:r>
+              <a:rPr lang="en-US" sz="2000" dirty="0">
+                <a:solidFill>
+                  <a:srgbClr val="008000"/>
+                </a:solidFill>
+                <a:effectLst/>
+                <a:latin typeface="Consolas" panose="020B0609020204030204" pitchFamily="49" charset="0"/>
+              </a:rPr>
+              <a:t>    /** Removes all callbacks for event */ </a:t>
+            </a:r>
+          </a:p>
+          <a:p>
+            <a:r>
+              <a:rPr lang="en-US" sz="2000" dirty="0">
+                <a:solidFill>
+                  <a:srgbClr val="FFC000"/>
+                </a:solidFill>
+                <a:effectLst/>
+                <a:latin typeface="Consolas" panose="020B0609020204030204" pitchFamily="49" charset="0"/>
+              </a:rPr>
+              <a:t>    off(event);</a:t>
+            </a:r>
+            <a:endParaRPr lang="en-US" sz="2000" dirty="0">
+              <a:solidFill>
+                <a:srgbClr val="008000"/>
+              </a:solidFill>
+              <a:effectLst/>
+              <a:latin typeface="Consolas" panose="020B0609020204030204" pitchFamily="49" charset="0"/>
+            </a:endParaRPr>
+          </a:p>
+          <a:p>
+            <a:r>
+              <a:rPr lang="en-US" sz="2000" dirty="0">
+                <a:solidFill>
+                  <a:srgbClr val="008000"/>
+                </a:solidFill>
+                <a:effectLst/>
+                <a:latin typeface="Consolas" panose="020B0609020204030204" pitchFamily="49" charset="0"/>
+              </a:rPr>
+              <a:t>    /** Removes all callbacks for all events */ </a:t>
+            </a:r>
+          </a:p>
+          <a:p>
+            <a:r>
+              <a:rPr lang="en-US" sz="2000" dirty="0">
+                <a:solidFill>
+                  <a:srgbClr val="FFC000"/>
+                </a:solidFill>
+                <a:effectLst/>
+                <a:latin typeface="Consolas" panose="020B0609020204030204" pitchFamily="49" charset="0"/>
+              </a:rPr>
+              <a:t>    off();</a:t>
+            </a:r>
+          </a:p>
+          <a:p>
+            <a:r>
+              <a:rPr lang="en-US" sz="2000" dirty="0">
+                <a:solidFill>
+                  <a:srgbClr val="008000"/>
+                </a:solidFill>
+                <a:effectLst/>
+                <a:latin typeface="Consolas" panose="020B0609020204030204" pitchFamily="49" charset="0"/>
+              </a:rPr>
+              <a:t>    /** The event callbacks are called with the passed arguments */</a:t>
+            </a:r>
+          </a:p>
+          <a:p>
+            <a:r>
+              <a:rPr lang="en-US" sz="2000" dirty="0">
+                <a:solidFill>
+                  <a:srgbClr val="008000"/>
+                </a:solidFill>
+                <a:effectLst/>
+                <a:latin typeface="Consolas" panose="020B0609020204030204" pitchFamily="49" charset="0"/>
+              </a:rPr>
+              <a:t>    </a:t>
+            </a:r>
+            <a:r>
+              <a:rPr lang="en-US" sz="2000" dirty="0">
+                <a:solidFill>
+                  <a:srgbClr val="FFC000"/>
+                </a:solidFill>
+                <a:effectLst/>
+                <a:latin typeface="Consolas" panose="020B0609020204030204" pitchFamily="49" charset="0"/>
+              </a:rPr>
+              <a:t>emit(type, ... </a:t>
+            </a:r>
+            <a:r>
+              <a:rPr lang="en-US" sz="2000" dirty="0" err="1">
+                <a:solidFill>
+                  <a:srgbClr val="FFC000"/>
+                </a:solidFill>
+                <a:effectLst/>
+                <a:latin typeface="Consolas" panose="020B0609020204030204" pitchFamily="49" charset="0"/>
+              </a:rPr>
+              <a:t>args</a:t>
+            </a:r>
+            <a:r>
+              <a:rPr lang="en-US" sz="2000" dirty="0">
+                <a:solidFill>
+                  <a:srgbClr val="FFC000"/>
+                </a:solidFill>
+                <a:effectLst/>
+                <a:latin typeface="Consolas" panose="020B0609020204030204" pitchFamily="49" charset="0"/>
+              </a:rPr>
+              <a:t>);</a:t>
+            </a:r>
+            <a:endParaRPr lang="en-US" sz="2000" dirty="0">
+              <a:solidFill>
+                <a:srgbClr val="008000"/>
+              </a:solidFill>
+              <a:effectLst/>
+              <a:latin typeface="Consolas" panose="020B0609020204030204" pitchFamily="49" charset="0"/>
+            </a:endParaRPr>
+          </a:p>
+          <a:p>
+            <a:r>
+              <a:rPr lang="en-US" sz="2000" b="0" dirty="0">
+                <a:solidFill>
+                  <a:srgbClr val="000000"/>
+                </a:solidFill>
+                <a:effectLst/>
+                <a:latin typeface="Consolas" panose="020B0609020204030204" pitchFamily="49" charset="0"/>
+              </a:rPr>
+              <a:t>}</a:t>
+            </a:r>
+          </a:p>
+        </p:txBody>
+      </p:sp>
+    </p:spTree>
+    <p:extLst>
+      <p:ext uri="{BB962C8B-B14F-4D97-AF65-F5344CB8AC3E}">
+        <p14:creationId xmlns:p14="http://schemas.microsoft.com/office/powerpoint/2010/main" val="1550529375"/>
+      </p:ext>
+    </p:extLst>
+  </p:cSld>
+  <p:clrMapOvr>
+    <a:masterClrMapping/>
+  </p:clrMapOvr>
+</p:sld>
+</file>
+
+<file path=ppt/slides/slide35.xml><?xml version="1.0" encoding="utf-8"?>
+<p:sld xmlns:a="http://schemas.openxmlformats.org/drawingml/2006/main" xmlns:r="http://schemas.openxmlformats.org/officeDocument/2006/relationships" xmlns:p="http://schemas.openxmlformats.org/presentationml/2006/main">
+  <p:cSld>
+    <p:spTree>
+      <p:nvGrpSpPr>
+        <p:cNvPr id="1" name=""/>
+        <p:cNvGrpSpPr/>
+        <p:nvPr/>
+      </p:nvGrpSpPr>
+      <p:grpSpPr>
+        <a:xfrm>
+          <a:off x="0" y="0"/>
+          <a:ext cx="0" cy="0"/>
+          <a:chOff x="0" y="0"/>
+          <a:chExt cx="0" cy="0"/>
+        </a:xfrm>
+      </p:grpSpPr>
+      <p:sp>
+        <p:nvSpPr>
+          <p:cNvPr id="2" name="Title 1">
+            <a:extLst>
+              <a:ext uri="{FF2B5EF4-FFF2-40B4-BE49-F238E27FC236}">
                 <a16:creationId xmlns:a16="http://schemas.microsoft.com/office/drawing/2014/main" id="{4CE907AB-0992-8834-1E33-EC9EE8D0CC25}"/>
               </a:ext>
             </a:extLst>
@@ -35217,10 +36086,15 @@
             <p:ph idx="1"/>
           </p:nvPr>
         </p:nvSpPr>
-        <p:spPr/>
+        <p:spPr>
+          <a:xfrm>
+            <a:off x="838200" y="1500160"/>
+            <a:ext cx="9829800" cy="4351338"/>
+          </a:xfrm>
+        </p:spPr>
         <p:txBody>
           <a:bodyPr>
-            <a:normAutofit lnSpcReduction="10000"/>
+            <a:normAutofit/>
           </a:bodyPr>
           <a:lstStyle/>
           <a:p>
@@ -35266,8 +36140,9 @@
             </a:r>
             <a:r>
               <a:rPr lang="en-US" dirty="0"/>
-              <a:t> for the client's action.</a:t>
-            </a:r>
+              <a:t> for the client's action. </a:t>
+            </a:r>
+            <a:endParaRPr lang="en-US" b="1" dirty="0"/>
           </a:p>
           <a:p>
             <a:r>
@@ -35276,7 +36151,7 @@
                   <a:srgbClr val="FF0000"/>
                 </a:solidFill>
               </a:rPr>
-              <a:t>This pattern is used all the time in REACT.</a:t>
+              <a:t>This pattern is used all the time in REACT. We call them callbacks</a:t>
             </a:r>
           </a:p>
         </p:txBody>
@@ -35304,7 +36179,7 @@
           <a:p>
             <a:fld id="{20F37917-FD3A-4669-9018-DA04BCDD3D75}" type="slidenum">
               <a:rPr lang="en-US" smtClean="0"/>
-              <a:t>34</a:t>
+              <a:t>35</a:t>
             </a:fld>
             <a:endParaRPr lang="en-US"/>
           </a:p>
@@ -35323,7 +36198,7 @@
 </p:sld>
 </file>
 
-<file path=ppt/slides/slide35.xml><?xml version="1.0" encoding="utf-8"?>
+<file path=ppt/slides/slide36.xml><?xml version="1.0" encoding="utf-8"?>
 <p:sld xmlns:a="http://schemas.openxmlformats.org/drawingml/2006/main" xmlns:r="http://schemas.openxmlformats.org/officeDocument/2006/relationships" xmlns:p="http://schemas.openxmlformats.org/presentationml/2006/main">
   <p:cSld>
     <p:spTree>
@@ -35386,8 +36261,8 @@
         </p:nvSpPr>
         <p:spPr>
           <a:xfrm>
-            <a:off x="8246271" y="1631794"/>
-            <a:ext cx="3536425" cy="4351338"/>
+            <a:off x="7442201" y="1631794"/>
+            <a:ext cx="4340496" cy="4351338"/>
           </a:xfrm>
         </p:spPr>
         <p:txBody>
@@ -35451,7 +36326,7 @@
           <a:p>
             <a:fld id="{20F37917-FD3A-4669-9018-DA04BCDD3D75}" type="slidenum">
               <a:rPr lang="en-US" smtClean="0"/>
-              <a:t>35</a:t>
+              <a:t>36</a:t>
             </a:fld>
             <a:endParaRPr lang="en-US"/>
           </a:p>
@@ -36503,7 +37378,7 @@
 </p:sld>
 </file>
 
-<file path=ppt/slides/slide36.xml><?xml version="1.0" encoding="utf-8"?>
+<file path=ppt/slides/slide37.xml><?xml version="1.0" encoding="utf-8"?>
 <p:sld xmlns:a="http://schemas.openxmlformats.org/drawingml/2006/main" xmlns:r="http://schemas.openxmlformats.org/officeDocument/2006/relationships" xmlns:p="http://schemas.openxmlformats.org/presentationml/2006/main">
   <p:cSld>
     <p:spTree>
@@ -36571,7 +37446,7 @@
           <a:p>
             <a:fld id="{20F37917-FD3A-4669-9018-DA04BCDD3D75}" type="slidenum">
               <a:rPr lang="en-US" smtClean="0"/>
-              <a:t>36</a:t>
+              <a:t>37</a:t>
             </a:fld>
             <a:endParaRPr lang="en-US"/>
           </a:p>
@@ -38099,7 +38974,7 @@
 </p:sld>
 </file>
 
-<file path=ppt/slides/slide37.xml><?xml version="1.0" encoding="utf-8"?>
+<file path=ppt/slides/slide38.xml><?xml version="1.0" encoding="utf-8"?>
 <p:sld xmlns:a="http://schemas.openxmlformats.org/drawingml/2006/main" xmlns:r="http://schemas.openxmlformats.org/officeDocument/2006/relationships" xmlns:p="http://schemas.openxmlformats.org/presentationml/2006/main">
   <p:cSld>
     <p:spTree>
@@ -38207,7 +39082,7 @@
           <a:p>
             <a:fld id="{20F37917-FD3A-4669-9018-DA04BCDD3D75}" type="slidenum">
               <a:rPr lang="en-US" smtClean="0"/>
-              <a:t>37</a:t>
+              <a:t>38</a:t>
             </a:fld>
             <a:endParaRPr lang="en-US"/>
           </a:p>
@@ -38226,7 +39101,7 @@
 </p:sld>
 </file>
 
-<file path=ppt/slides/slide38.xml><?xml version="1.0" encoding="utf-8"?>
+<file path=ppt/slides/slide39.xml><?xml version="1.0" encoding="utf-8"?>
 <p:sld xmlns:a="http://schemas.openxmlformats.org/drawingml/2006/main" xmlns:r="http://schemas.openxmlformats.org/officeDocument/2006/relationships" xmlns:p="http://schemas.openxmlformats.org/presentationml/2006/main">
   <p:cSld>
     <p:spTree>
@@ -38294,7 +39169,7 @@
           <a:p>
             <a:fld id="{20F37917-FD3A-4669-9018-DA04BCDD3D75}" type="slidenum">
               <a:rPr lang="en-US" smtClean="0"/>
-              <a:t>38</a:t>
+              <a:t>39</a:t>
             </a:fld>
             <a:endParaRPr lang="en-US"/>
           </a:p>
@@ -39544,127 +40419,6 @@
 </p:sld>
 </file>
 
-<file path=ppt/slides/slide39.xml><?xml version="1.0" encoding="utf-8"?>
-<p:sld xmlns:a="http://schemas.openxmlformats.org/drawingml/2006/main" xmlns:r="http://schemas.openxmlformats.org/officeDocument/2006/relationships" xmlns:p="http://schemas.openxmlformats.org/presentationml/2006/main">
-  <p:cSld>
-    <p:spTree>
-      <p:nvGrpSpPr>
-        <p:cNvPr id="1" name=""/>
-        <p:cNvGrpSpPr/>
-        <p:nvPr/>
-      </p:nvGrpSpPr>
-      <p:grpSpPr>
-        <a:xfrm>
-          <a:off x="0" y="0"/>
-          <a:ext cx="0" cy="0"/>
-          <a:chOff x="0" y="0"/>
-          <a:chExt cx="0" cy="0"/>
-        </a:xfrm>
-      </p:grpSpPr>
-      <p:sp>
-        <p:nvSpPr>
-          <p:cNvPr id="2" name="Title 1">
-            <a:extLst>
-              <a:ext uri="{FF2B5EF4-FFF2-40B4-BE49-F238E27FC236}">
-                <a16:creationId xmlns:a16="http://schemas.microsoft.com/office/drawing/2014/main" id="{B665A8D4-207D-C833-BA48-98F5F8186518}"/>
-              </a:ext>
-            </a:extLst>
-          </p:cNvPr>
-          <p:cNvSpPr>
-            <a:spLocks noGrp="1"/>
-          </p:cNvSpPr>
-          <p:nvPr>
-            <p:ph type="title"/>
-          </p:nvPr>
-        </p:nvSpPr>
-        <p:spPr/>
-        <p:txBody>
-          <a:bodyPr/>
-          <a:lstStyle/>
-          <a:p>
-            <a:r>
-              <a:rPr lang="en-US" dirty="0"/>
-              <a:t>But we said we wanted only one clock!</a:t>
-            </a:r>
-          </a:p>
-        </p:txBody>
-      </p:sp>
-      <p:sp>
-        <p:nvSpPr>
-          <p:cNvPr id="3" name="Content Placeholder 2">
-            <a:extLst>
-              <a:ext uri="{FF2B5EF4-FFF2-40B4-BE49-F238E27FC236}">
-                <a16:creationId xmlns:a16="http://schemas.microsoft.com/office/drawing/2014/main" id="{D384681E-DA72-0CAB-0316-66CD7EB54EBB}"/>
-              </a:ext>
-            </a:extLst>
-          </p:cNvPr>
-          <p:cNvSpPr>
-            <a:spLocks noGrp="1"/>
-          </p:cNvSpPr>
-          <p:nvPr>
-            <p:ph idx="1"/>
-          </p:nvPr>
-        </p:nvSpPr>
-        <p:spPr/>
-        <p:txBody>
-          <a:bodyPr/>
-          <a:lstStyle/>
-          <a:p>
-            <a:r>
-              <a:rPr lang="en-US" dirty="0"/>
-              <a:t>No problem!</a:t>
-            </a:r>
-          </a:p>
-          <a:p>
-            <a:r>
-              <a:rPr lang="en-US" dirty="0"/>
-              <a:t>Just modify the factory so it only creates a clock once, and after that just returns the same one over and over again.</a:t>
-            </a:r>
-          </a:p>
-        </p:txBody>
-      </p:sp>
-      <p:sp>
-        <p:nvSpPr>
-          <p:cNvPr id="4" name="Slide Number Placeholder 3">
-            <a:extLst>
-              <a:ext uri="{FF2B5EF4-FFF2-40B4-BE49-F238E27FC236}">
-                <a16:creationId xmlns:a16="http://schemas.microsoft.com/office/drawing/2014/main" id="{FD97DE1A-C5A7-DBDA-9DAB-62CD1772B5FC}"/>
-              </a:ext>
-            </a:extLst>
-          </p:cNvPr>
-          <p:cNvSpPr>
-            <a:spLocks noGrp="1"/>
-          </p:cNvSpPr>
-          <p:nvPr>
-            <p:ph type="sldNum" sz="quarter" idx="12"/>
-          </p:nvPr>
-        </p:nvSpPr>
-        <p:spPr/>
-        <p:txBody>
-          <a:bodyPr/>
-          <a:lstStyle/>
-          <a:p>
-            <a:fld id="{20F37917-FD3A-4669-9018-DA04BCDD3D75}" type="slidenum">
-              <a:rPr lang="en-US" smtClean="0"/>
-              <a:t>39</a:t>
-            </a:fld>
-            <a:endParaRPr lang="en-US"/>
-          </a:p>
-        </p:txBody>
-      </p:sp>
-    </p:spTree>
-    <p:extLst>
-      <p:ext uri="{BB962C8B-B14F-4D97-AF65-F5344CB8AC3E}">
-        <p14:creationId xmlns:p14="http://schemas.microsoft.com/office/powerpoint/2010/main" val="2063450173"/>
-      </p:ext>
-    </p:extLst>
-  </p:cSld>
-  <p:clrMapOvr>
-    <a:masterClrMapping/>
-  </p:clrMapOvr>
-</p:sld>
-</file>
-
 <file path=ppt/slides/slide4.xml><?xml version="1.0" encoding="utf-8"?>
 <p:sld xmlns:a="http://schemas.openxmlformats.org/drawingml/2006/main" xmlns:r="http://schemas.openxmlformats.org/officeDocument/2006/relationships" xmlns:p="http://schemas.openxmlformats.org/presentationml/2006/main">
   <p:cSld>
@@ -39802,6 +40556,127 @@
           <p:cNvPr id="2" name="Title 1">
             <a:extLst>
               <a:ext uri="{FF2B5EF4-FFF2-40B4-BE49-F238E27FC236}">
+                <a16:creationId xmlns:a16="http://schemas.microsoft.com/office/drawing/2014/main" id="{B665A8D4-207D-C833-BA48-98F5F8186518}"/>
+              </a:ext>
+            </a:extLst>
+          </p:cNvPr>
+          <p:cNvSpPr>
+            <a:spLocks noGrp="1"/>
+          </p:cNvSpPr>
+          <p:nvPr>
+            <p:ph type="title"/>
+          </p:nvPr>
+        </p:nvSpPr>
+        <p:spPr/>
+        <p:txBody>
+          <a:bodyPr/>
+          <a:lstStyle/>
+          <a:p>
+            <a:r>
+              <a:rPr lang="en-US" dirty="0"/>
+              <a:t>But we said we wanted only one clock!</a:t>
+            </a:r>
+          </a:p>
+        </p:txBody>
+      </p:sp>
+      <p:sp>
+        <p:nvSpPr>
+          <p:cNvPr id="3" name="Content Placeholder 2">
+            <a:extLst>
+              <a:ext uri="{FF2B5EF4-FFF2-40B4-BE49-F238E27FC236}">
+                <a16:creationId xmlns:a16="http://schemas.microsoft.com/office/drawing/2014/main" id="{D384681E-DA72-0CAB-0316-66CD7EB54EBB}"/>
+              </a:ext>
+            </a:extLst>
+          </p:cNvPr>
+          <p:cNvSpPr>
+            <a:spLocks noGrp="1"/>
+          </p:cNvSpPr>
+          <p:nvPr>
+            <p:ph idx="1"/>
+          </p:nvPr>
+        </p:nvSpPr>
+        <p:spPr/>
+        <p:txBody>
+          <a:bodyPr/>
+          <a:lstStyle/>
+          <a:p>
+            <a:r>
+              <a:rPr lang="en-US" dirty="0"/>
+              <a:t>No problem!</a:t>
+            </a:r>
+          </a:p>
+          <a:p>
+            <a:r>
+              <a:rPr lang="en-US" dirty="0"/>
+              <a:t>Just modify the factory so it only creates a clock once, and after that just returns the same one over and over again.</a:t>
+            </a:r>
+          </a:p>
+        </p:txBody>
+      </p:sp>
+      <p:sp>
+        <p:nvSpPr>
+          <p:cNvPr id="4" name="Slide Number Placeholder 3">
+            <a:extLst>
+              <a:ext uri="{FF2B5EF4-FFF2-40B4-BE49-F238E27FC236}">
+                <a16:creationId xmlns:a16="http://schemas.microsoft.com/office/drawing/2014/main" id="{FD97DE1A-C5A7-DBDA-9DAB-62CD1772B5FC}"/>
+              </a:ext>
+            </a:extLst>
+          </p:cNvPr>
+          <p:cNvSpPr>
+            <a:spLocks noGrp="1"/>
+          </p:cNvSpPr>
+          <p:nvPr>
+            <p:ph type="sldNum" sz="quarter" idx="12"/>
+          </p:nvPr>
+        </p:nvSpPr>
+        <p:spPr/>
+        <p:txBody>
+          <a:bodyPr/>
+          <a:lstStyle/>
+          <a:p>
+            <a:fld id="{20F37917-FD3A-4669-9018-DA04BCDD3D75}" type="slidenum">
+              <a:rPr lang="en-US" smtClean="0"/>
+              <a:t>40</a:t>
+            </a:fld>
+            <a:endParaRPr lang="en-US"/>
+          </a:p>
+        </p:txBody>
+      </p:sp>
+    </p:spTree>
+    <p:extLst>
+      <p:ext uri="{BB962C8B-B14F-4D97-AF65-F5344CB8AC3E}">
+        <p14:creationId xmlns:p14="http://schemas.microsoft.com/office/powerpoint/2010/main" val="2063450173"/>
+      </p:ext>
+    </p:extLst>
+  </p:cSld>
+  <p:clrMapOvr>
+    <a:masterClrMapping/>
+  </p:clrMapOvr>
+</p:sld>
+</file>
+
+<file path=ppt/slides/slide41.xml><?xml version="1.0" encoding="utf-8"?>
+<p:sld xmlns:a="http://schemas.openxmlformats.org/drawingml/2006/main" xmlns:r="http://schemas.openxmlformats.org/officeDocument/2006/relationships" xmlns:p="http://schemas.openxmlformats.org/presentationml/2006/main">
+  <p:cSld>
+    <p:spTree>
+      <p:nvGrpSpPr>
+        <p:cNvPr id="1" name=""/>
+        <p:cNvGrpSpPr/>
+        <p:nvPr/>
+      </p:nvGrpSpPr>
+      <p:grpSpPr>
+        <a:xfrm>
+          <a:off x="0" y="0"/>
+          <a:ext cx="0" cy="0"/>
+          <a:chOff x="0" y="0"/>
+          <a:chExt cx="0" cy="0"/>
+        </a:xfrm>
+      </p:grpSpPr>
+      <p:sp>
+        <p:nvSpPr>
+          <p:cNvPr id="2" name="Title 1">
+            <a:extLst>
+              <a:ext uri="{FF2B5EF4-FFF2-40B4-BE49-F238E27FC236}">
                 <a16:creationId xmlns:a16="http://schemas.microsoft.com/office/drawing/2014/main" id="{79C0E3CA-0AF9-44A5-AE3D-3E6F93AA4B3F}"/>
               </a:ext>
             </a:extLst>
@@ -39848,7 +40723,7 @@
           <a:p>
             <a:fld id="{20F37917-FD3A-4669-9018-DA04BCDD3D75}" type="slidenum">
               <a:rPr lang="en-US" smtClean="0"/>
-              <a:t>40</a:t>
+              <a:t>41</a:t>
             </a:fld>
             <a:endParaRPr lang="en-US"/>
           </a:p>
@@ -41384,7 +42259,7 @@
 </p:sld>
 </file>
 
-<file path=ppt/slides/slide41.xml><?xml version="1.0" encoding="utf-8"?>
+<file path=ppt/slides/slide42.xml><?xml version="1.0" encoding="utf-8"?>
 <p:sld xmlns:a="http://schemas.openxmlformats.org/drawingml/2006/main" xmlns:r="http://schemas.openxmlformats.org/officeDocument/2006/relationships" xmlns:p="http://schemas.openxmlformats.org/presentationml/2006/main">
   <p:cSld>
     <p:spTree>
@@ -41457,7 +42332,7 @@
           <a:p>
             <a:fld id="{20F37917-FD3A-4669-9018-DA04BCDD3D75}" type="slidenum">
               <a:rPr lang="en-US" smtClean="0"/>
-              <a:t>41</a:t>
+              <a:t>42</a:t>
             </a:fld>
             <a:endParaRPr lang="en-US"/>
           </a:p>
@@ -42521,7 +43396,7 @@
 </p:sld>
 </file>
 
-<file path=ppt/slides/slide42.xml><?xml version="1.0" encoding="utf-8"?>
+<file path=ppt/slides/slide43.xml><?xml version="1.0" encoding="utf-8"?>
 <p:sld xmlns:a="http://schemas.openxmlformats.org/drawingml/2006/main" xmlns:r="http://schemas.openxmlformats.org/officeDocument/2006/relationships" xmlns:p="http://schemas.openxmlformats.org/presentationml/2006/main">
   <p:cSld>
     <p:spTree>
@@ -42590,7 +43465,7 @@
         </p:spPr>
         <p:txBody>
           <a:bodyPr>
-            <a:normAutofit lnSpcReduction="10000"/>
+            <a:normAutofit/>
           </a:bodyPr>
           <a:lstStyle/>
           <a:p>
@@ -42598,7 +43473,7 @@
               <a:buNone/>
             </a:pPr>
             <a:r>
-              <a:rPr lang="en-US" sz="3600" dirty="0"/>
+              <a:rPr lang="en-US" sz="3200" dirty="0"/>
               <a:t>When I create an object that needs a clock, I ask the master clock factory to issue me a clock, and then I have my new object register itself with the clock.  </a:t>
             </a:r>
           </a:p>
@@ -42607,7 +43482,7 @@
               <a:buNone/>
             </a:pPr>
             <a:r>
-              <a:rPr lang="en-US" sz="3600" dirty="0"/>
+              <a:rPr lang="en-US" sz="3200" dirty="0"/>
               <a:t>The master clock updates my object whenever the master clock changes.  </a:t>
             </a:r>
           </a:p>
@@ -42616,7 +43491,7 @@
               <a:buNone/>
             </a:pPr>
             <a:r>
-              <a:rPr lang="en-US" sz="3600" dirty="0"/>
+              <a:rPr lang="en-US" sz="3200" dirty="0"/>
               <a:t>The master clock also sends my object an update message when it registers, so my object will always have the latest time.</a:t>
             </a:r>
           </a:p>
@@ -42624,7 +43499,7 @@
             <a:pPr marL="0" indent="0">
               <a:buNone/>
             </a:pPr>
-            <a:endParaRPr lang="en-US" dirty="0"/>
+            <a:endParaRPr lang="en-US" sz="2400" dirty="0"/>
           </a:p>
         </p:txBody>
       </p:sp>
@@ -42651,7 +43526,7 @@
           <a:p>
             <a:fld id="{20F37917-FD3A-4669-9018-DA04BCDD3D75}" type="slidenum">
               <a:rPr lang="en-US" smtClean="0"/>
-              <a:t>42</a:t>
+              <a:t>43</a:t>
             </a:fld>
             <a:endParaRPr lang="en-US"/>
           </a:p>
@@ -42670,7 +43545,7 @@
 </p:sld>
 </file>
 
-<file path=ppt/slides/slide43.xml><?xml version="1.0" encoding="utf-8"?>
+<file path=ppt/slides/slide44.xml><?xml version="1.0" encoding="utf-8"?>
 <p:sld xmlns:a="http://schemas.openxmlformats.org/drawingml/2006/main" xmlns:r="http://schemas.openxmlformats.org/officeDocument/2006/relationships" xmlns:p="http://schemas.openxmlformats.org/presentationml/2006/main">
   <p:cSld>
     <p:spTree>
@@ -42740,7 +43615,7 @@
           <a:p>
             <a:fld id="{20F37917-FD3A-4669-9018-DA04BCDD3D75}" type="slidenum">
               <a:rPr lang="en-US" smtClean="0"/>
-              <a:t>43</a:t>
+              <a:t>44</a:t>
             </a:fld>
             <a:endParaRPr lang="en-US"/>
           </a:p>
@@ -42892,7 +43767,7 @@
 </p:sld>
 </file>
 
-<file path=ppt/slides/slide44.xml><?xml version="1.0" encoding="utf-8"?>
+<file path=ppt/slides/slide45.xml><?xml version="1.0" encoding="utf-8"?>
 <p:sld xmlns:a="http://schemas.openxmlformats.org/drawingml/2006/main" xmlns:r="http://schemas.openxmlformats.org/officeDocument/2006/relationships" xmlns:p="http://schemas.openxmlformats.org/presentationml/2006/main">
   <p:cSld>
     <p:spTree>
@@ -42962,7 +43837,7 @@
           <a:p>
             <a:fld id="{20F37917-FD3A-4669-9018-DA04BCDD3D75}" type="slidenum">
               <a:rPr lang="en-US" smtClean="0"/>
-              <a:t>44</a:t>
+              <a:t>45</a:t>
             </a:fld>
             <a:endParaRPr lang="en-US"/>
           </a:p>
@@ -43125,7 +44000,7 @@
 </p:sld>
 </file>
 
-<file path=ppt/slides/slide45.xml><?xml version="1.0" encoding="utf-8"?>
+<file path=ppt/slides/slide46.xml><?xml version="1.0" encoding="utf-8"?>
 <p:sld xmlns:a="http://schemas.openxmlformats.org/drawingml/2006/main" xmlns:r="http://schemas.openxmlformats.org/officeDocument/2006/relationships" xmlns:p="http://schemas.openxmlformats.org/presentationml/2006/main">
   <p:cSld>
     <p:spTree>
@@ -43195,7 +44070,7 @@
           <a:p>
             <a:fld id="{20F37917-FD3A-4669-9018-DA04BCDD3D75}" type="slidenum">
               <a:rPr lang="en-US" smtClean="0"/>
-              <a:t>45</a:t>
+              <a:t>46</a:t>
             </a:fld>
             <a:endParaRPr lang="en-US"/>
           </a:p>
@@ -43347,7 +44222,7 @@
 </p:sld>
 </file>
 
-<file path=ppt/slides/slide46.xml><?xml version="1.0" encoding="utf-8"?>
+<file path=ppt/slides/slide47.xml><?xml version="1.0" encoding="utf-8"?>
 <p:sld xmlns:a="http://schemas.openxmlformats.org/drawingml/2006/main" xmlns:r="http://schemas.openxmlformats.org/officeDocument/2006/relationships" xmlns:p="http://schemas.openxmlformats.org/presentationml/2006/main">
   <p:cSld>
     <p:spTree>
@@ -43417,7 +44292,7 @@
           <a:p>
             <a:fld id="{20F37917-FD3A-4669-9018-DA04BCDD3D75}" type="slidenum">
               <a:rPr lang="en-US" smtClean="0"/>
-              <a:t>46</a:t>
+              <a:t>47</a:t>
             </a:fld>
             <a:endParaRPr lang="en-US"/>
           </a:p>
@@ -43580,7 +44455,7 @@
 </p:sld>
 </file>
 
-<file path=ppt/slides/slide47.xml><?xml version="1.0" encoding="utf-8"?>
+<file path=ppt/slides/slide48.xml><?xml version="1.0" encoding="utf-8"?>
 <p:sld xmlns:a="http://schemas.openxmlformats.org/drawingml/2006/main" xmlns:r="http://schemas.openxmlformats.org/officeDocument/2006/relationships" xmlns:p="http://schemas.openxmlformats.org/presentationml/2006/main">
   <p:cSld>
     <p:spTree>
@@ -43766,7 +44641,7 @@
           <a:p>
             <a:fld id="{20F37917-FD3A-4669-9018-DA04BCDD3D75}" type="slidenum">
               <a:rPr lang="en-US" smtClean="0"/>
-              <a:t>47</a:t>
+              <a:t>48</a:t>
             </a:fld>
             <a:endParaRPr lang="en-US"/>
           </a:p>

</xml_diff>

<commit_message>
reorg'd Examples, put correct file labels in slides
</commit_message>
<xml_diff>
--- a/Slides/Module 05 Interaction-Level Design Patterns.pptx
+++ b/Slides/Module 05 Interaction-Level Design Patterns.pptx
@@ -15281,8 +15281,8 @@
         </p:nvSpPr>
         <p:spPr>
           <a:xfrm>
-            <a:off x="9131902" y="136525"/>
-            <a:ext cx="2834640" cy="601981"/>
+            <a:off x="7569200" y="136525"/>
+            <a:ext cx="4397342" cy="601981"/>
           </a:xfrm>
           <a:prstGeom prst="roundRect">
             <a:avLst/>
@@ -15320,6 +15320,22 @@
           <a:lstStyle/>
           <a:p>
             <a:pPr algn="ctr"/>
+            <a:r>
+              <a:rPr lang="en-US" sz="2400" dirty="0" err="1">
+                <a:solidFill>
+                  <a:schemeClr val="tx1"/>
+                </a:solidFill>
+              </a:rPr>
+              <a:t>PullingClocks</a:t>
+            </a:r>
+            <a:r>
+              <a:rPr lang="en-US" sz="2400" dirty="0">
+                <a:solidFill>
+                  <a:schemeClr val="tx1"/>
+                </a:solidFill>
+              </a:rPr>
+              <a:t>/</a:t>
+            </a:r>
             <a:r>
               <a:rPr lang="en-US" sz="2400" dirty="0" err="1">
                 <a:solidFill>
@@ -16310,8 +16326,8 @@
         </p:nvSpPr>
         <p:spPr>
           <a:xfrm>
-            <a:off x="7965510" y="380045"/>
-            <a:ext cx="4033380" cy="601981"/>
+            <a:off x="4762500" y="5571377"/>
+            <a:ext cx="6059632" cy="601981"/>
           </a:xfrm>
           <a:prstGeom prst="roundRect">
             <a:avLst/>
@@ -16349,6 +16365,22 @@
           <a:lstStyle/>
           <a:p>
             <a:pPr algn="ctr"/>
+            <a:r>
+              <a:rPr lang="en-US" sz="2400" dirty="0" err="1">
+                <a:solidFill>
+                  <a:schemeClr val="tx1"/>
+                </a:solidFill>
+              </a:rPr>
+              <a:t>PullingClocks</a:t>
+            </a:r>
+            <a:r>
+              <a:rPr lang="en-US" sz="2400" dirty="0">
+                <a:solidFill>
+                  <a:schemeClr val="tx1"/>
+                </a:solidFill>
+              </a:rPr>
+              <a:t>/</a:t>
+            </a:r>
             <a:r>
               <a:rPr lang="en-US" sz="2400" dirty="0" err="1">
                 <a:solidFill>
@@ -18437,8 +18469,8 @@
         </p:nvSpPr>
         <p:spPr>
           <a:xfrm>
-            <a:off x="8610600" y="136525"/>
-            <a:ext cx="3355942" cy="601981"/>
+            <a:off x="6096000" y="136525"/>
+            <a:ext cx="5870542" cy="601981"/>
           </a:xfrm>
           <a:prstGeom prst="roundRect">
             <a:avLst/>
@@ -18476,6 +18508,22 @@
           <a:lstStyle/>
           <a:p>
             <a:pPr algn="ctr"/>
+            <a:r>
+              <a:rPr lang="en-US" sz="2400" dirty="0" err="1">
+                <a:solidFill>
+                  <a:schemeClr val="tx1"/>
+                </a:solidFill>
+              </a:rPr>
+              <a:t>PullingClock</a:t>
+            </a:r>
+            <a:r>
+              <a:rPr lang="en-US" sz="2400" dirty="0">
+                <a:solidFill>
+                  <a:schemeClr val="tx1"/>
+                </a:solidFill>
+              </a:rPr>
+              <a:t>/</a:t>
+            </a:r>
             <a:r>
               <a:rPr lang="en-US" sz="2400" dirty="0" err="1">
                 <a:solidFill>
@@ -20789,8 +20837,8 @@
         </p:nvSpPr>
         <p:spPr>
           <a:xfrm>
-            <a:off x="7749153" y="136525"/>
-            <a:ext cx="4246534" cy="601981"/>
+            <a:off x="6324600" y="136525"/>
+            <a:ext cx="5671087" cy="601981"/>
           </a:xfrm>
           <a:prstGeom prst="roundRect">
             <a:avLst/>
@@ -20828,6 +20876,22 @@
           <a:lstStyle/>
           <a:p>
             <a:pPr algn="ctr"/>
+            <a:r>
+              <a:rPr lang="en-US" sz="2400" dirty="0" err="1">
+                <a:solidFill>
+                  <a:schemeClr val="tx1"/>
+                </a:solidFill>
+              </a:rPr>
+              <a:t>PushingClocks</a:t>
+            </a:r>
+            <a:r>
+              <a:rPr lang="en-US" sz="2400" dirty="0">
+                <a:solidFill>
+                  <a:schemeClr val="tx1"/>
+                </a:solidFill>
+              </a:rPr>
+              <a:t>/</a:t>
+            </a:r>
             <a:r>
               <a:rPr lang="en-US" sz="2400" dirty="0" err="1">
                 <a:solidFill>
@@ -21245,10 +21309,10 @@
       </p:sp>
       <p:sp>
         <p:nvSpPr>
-          <p:cNvPr id="4" name="Rectangle: Rounded Corners 3">
+          <p:cNvPr id="6" name="Rectangle: Rounded Corners 5">
             <a:extLst>
               <a:ext uri="{FF2B5EF4-FFF2-40B4-BE49-F238E27FC236}">
-                <a16:creationId xmlns:a16="http://schemas.microsoft.com/office/drawing/2014/main" id="{BDEECF39-29FF-FB19-2F5F-E836CE244A3E}"/>
+                <a16:creationId xmlns:a16="http://schemas.microsoft.com/office/drawing/2014/main" id="{A96B6DD4-33EA-6752-9AAE-5C2C2355D096}"/>
               </a:ext>
             </a:extLst>
           </p:cNvPr>
@@ -21257,8 +21321,8 @@
         </p:nvSpPr>
         <p:spPr>
           <a:xfrm>
-            <a:off x="7749153" y="136525"/>
-            <a:ext cx="4246534" cy="601981"/>
+            <a:off x="6324600" y="136525"/>
+            <a:ext cx="5671087" cy="601981"/>
           </a:xfrm>
           <a:prstGeom prst="roundRect">
             <a:avLst/>
@@ -21296,6 +21360,22 @@
           <a:lstStyle/>
           <a:p>
             <a:pPr algn="ctr"/>
+            <a:r>
+              <a:rPr lang="en-US" sz="2400" dirty="0" err="1">
+                <a:solidFill>
+                  <a:schemeClr val="tx1"/>
+                </a:solidFill>
+              </a:rPr>
+              <a:t>PushingClocks</a:t>
+            </a:r>
+            <a:r>
+              <a:rPr lang="en-US" sz="2400" dirty="0">
+                <a:solidFill>
+                  <a:schemeClr val="tx1"/>
+                </a:solidFill>
+              </a:rPr>
+              <a:t>/</a:t>
+            </a:r>
             <a:r>
               <a:rPr lang="en-US" sz="2400" dirty="0" err="1">
                 <a:solidFill>
@@ -23147,22 +23227,22 @@
       </p:sp>
       <p:sp>
         <p:nvSpPr>
-          <p:cNvPr id="10" name="TextBox 9">
+          <p:cNvPr id="4" name="Rectangle: Rounded Corners 3">
             <a:extLst>
               <a:ext uri="{FF2B5EF4-FFF2-40B4-BE49-F238E27FC236}">
-                <a16:creationId xmlns:a16="http://schemas.microsoft.com/office/drawing/2014/main" id="{9701DF95-3E5D-4C53-AB83-7D26FFACF45E}"/>
+                <a16:creationId xmlns:a16="http://schemas.microsoft.com/office/drawing/2014/main" id="{91E38F01-18CD-A22F-786B-79FE20F5D531}"/>
               </a:ext>
             </a:extLst>
           </p:cNvPr>
-          <p:cNvSpPr txBox="1"/>
+          <p:cNvSpPr/>
           <p:nvPr/>
         </p:nvSpPr>
         <p:spPr>
           <a:xfrm>
-            <a:off x="8519160" y="361791"/>
-            <a:ext cx="2834640" cy="601980"/>
+            <a:off x="5682713" y="404075"/>
+            <a:ext cx="5671087" cy="601981"/>
           </a:xfrm>
-          <a:prstGeom prst="rect">
+          <a:prstGeom prst="roundRect">
             <a:avLst/>
           </a:prstGeom>
           <a:solidFill>
@@ -23195,24 +23275,38 @@
         </p:style>
         <p:txBody>
           <a:bodyPr rtlCol="0" anchor="ctr"/>
-          <a:lstStyle>
-            <a:defPPr>
-              <a:defRPr lang="en-US"/>
-            </a:defPPr>
-            <a:lvl1pPr algn="ctr">
-              <a:defRPr sz="2400">
+          <a:lstStyle/>
+          <a:p>
+            <a:pPr algn="ctr"/>
+            <a:r>
+              <a:rPr lang="en-US" sz="2400" dirty="0" err="1">
                 <a:solidFill>
                   <a:schemeClr val="tx1"/>
                 </a:solidFill>
-              </a:defRPr>
-            </a:lvl1pPr>
-          </a:lstStyle>
-          <a:p>
-            <a:r>
-              <a:rPr lang="en-US" dirty="0" err="1"/>
+              </a:rPr>
+              <a:t>PushingClocks</a:t>
+            </a:r>
+            <a:r>
+              <a:rPr lang="en-US" sz="2400" dirty="0">
+                <a:solidFill>
+                  <a:schemeClr val="tx1"/>
+                </a:solidFill>
+              </a:rPr>
+              <a:t>/</a:t>
+            </a:r>
+            <a:r>
+              <a:rPr lang="en-US" sz="2400" dirty="0" err="1">
+                <a:solidFill>
+                  <a:schemeClr val="tx1"/>
+                </a:solidFill>
+              </a:rPr>
               <a:t>PushingClock.test.ts</a:t>
             </a:r>
-            <a:endParaRPr lang="en-US" dirty="0"/>
+            <a:endParaRPr lang="en-US" sz="2400" dirty="0">
+              <a:solidFill>
+                <a:schemeClr val="tx1"/>
+              </a:solidFill>
+            </a:endParaRPr>
           </a:p>
         </p:txBody>
       </p:sp>
@@ -24674,10 +24768,10 @@
       </p:sp>
       <p:sp>
         <p:nvSpPr>
-          <p:cNvPr id="4" name="Rectangle: Rounded Corners 3">
+          <p:cNvPr id="6" name="Rectangle: Rounded Corners 5">
             <a:extLst>
               <a:ext uri="{FF2B5EF4-FFF2-40B4-BE49-F238E27FC236}">
-                <a16:creationId xmlns:a16="http://schemas.microsoft.com/office/drawing/2014/main" id="{9829B9B0-C5FF-2CA6-9E62-021ED034BE59}"/>
+                <a16:creationId xmlns:a16="http://schemas.microsoft.com/office/drawing/2014/main" id="{BD22AF7F-90C7-DF0F-2920-D19744D11946}"/>
               </a:ext>
             </a:extLst>
           </p:cNvPr>
@@ -24686,8 +24780,8 @@
         </p:nvSpPr>
         <p:spPr>
           <a:xfrm>
-            <a:off x="7749153" y="136525"/>
-            <a:ext cx="4246534" cy="601981"/>
+            <a:off x="6295627" y="361790"/>
+            <a:ext cx="5671087" cy="601981"/>
           </a:xfrm>
           <a:prstGeom prst="roundRect">
             <a:avLst/>
@@ -24725,6 +24819,22 @@
           <a:lstStyle/>
           <a:p>
             <a:pPr algn="ctr"/>
+            <a:r>
+              <a:rPr lang="en-US" sz="2400" dirty="0" err="1">
+                <a:solidFill>
+                  <a:schemeClr val="tx1"/>
+                </a:solidFill>
+              </a:rPr>
+              <a:t>PushingClocks</a:t>
+            </a:r>
+            <a:r>
+              <a:rPr lang="en-US" sz="2400" dirty="0">
+                <a:solidFill>
+                  <a:schemeClr val="tx1"/>
+                </a:solidFill>
+              </a:rPr>
+              <a:t>/</a:t>
+            </a:r>
             <a:r>
               <a:rPr lang="en-US" sz="2400" dirty="0" err="1">
                 <a:solidFill>
@@ -25565,10 +25675,10 @@
       </p:sp>
       <p:sp>
         <p:nvSpPr>
-          <p:cNvPr id="4" name="Rectangle: Rounded Corners 3">
+          <p:cNvPr id="6" name="Rectangle: Rounded Corners 5">
             <a:extLst>
               <a:ext uri="{FF2B5EF4-FFF2-40B4-BE49-F238E27FC236}">
-                <a16:creationId xmlns:a16="http://schemas.microsoft.com/office/drawing/2014/main" id="{3BB475BE-AE37-3692-4A9C-5661488C33AA}"/>
+                <a16:creationId xmlns:a16="http://schemas.microsoft.com/office/drawing/2014/main" id="{84DE9295-7BBA-E1A1-CAAE-62D34F6557A7}"/>
               </a:ext>
             </a:extLst>
           </p:cNvPr>
@@ -25577,8 +25687,8 @@
         </p:nvSpPr>
         <p:spPr>
           <a:xfrm>
-            <a:off x="7749153" y="136525"/>
-            <a:ext cx="4246534" cy="601981"/>
+            <a:off x="6295627" y="361790"/>
+            <a:ext cx="5671087" cy="601981"/>
           </a:xfrm>
           <a:prstGeom prst="roundRect">
             <a:avLst/>
@@ -25616,6 +25726,22 @@
           <a:lstStyle/>
           <a:p>
             <a:pPr algn="ctr"/>
+            <a:r>
+              <a:rPr lang="en-US" sz="2400" dirty="0" err="1">
+                <a:solidFill>
+                  <a:schemeClr val="tx1"/>
+                </a:solidFill>
+              </a:rPr>
+              <a:t>PushingClocks</a:t>
+            </a:r>
+            <a:r>
+              <a:rPr lang="en-US" sz="2400" dirty="0">
+                <a:solidFill>
+                  <a:schemeClr val="tx1"/>
+                </a:solidFill>
+              </a:rPr>
+              <a:t>/</a:t>
+            </a:r>
             <a:r>
               <a:rPr lang="en-US" sz="2400" dirty="0" err="1">
                 <a:solidFill>
@@ -26176,10 +26302,10 @@
       </p:sp>
       <p:sp>
         <p:nvSpPr>
-          <p:cNvPr id="5" name="Rectangle: Rounded Corners 4">
+          <p:cNvPr id="8" name="Rectangle: Rounded Corners 7">
             <a:extLst>
               <a:ext uri="{FF2B5EF4-FFF2-40B4-BE49-F238E27FC236}">
-                <a16:creationId xmlns:a16="http://schemas.microsoft.com/office/drawing/2014/main" id="{A14661AC-7D23-5070-6773-117C8A21A9D9}"/>
+                <a16:creationId xmlns:a16="http://schemas.microsoft.com/office/drawing/2014/main" id="{834166D4-3C9A-4D3F-9594-07470496BD92}"/>
               </a:ext>
             </a:extLst>
           </p:cNvPr>
@@ -26188,8 +26314,8 @@
         </p:nvSpPr>
         <p:spPr>
           <a:xfrm>
-            <a:off x="7749153" y="136525"/>
-            <a:ext cx="4246534" cy="601981"/>
+            <a:off x="6422627" y="136525"/>
+            <a:ext cx="5671087" cy="601981"/>
           </a:xfrm>
           <a:prstGeom prst="roundRect">
             <a:avLst/>
@@ -26227,6 +26353,22 @@
           <a:lstStyle/>
           <a:p>
             <a:pPr algn="ctr"/>
+            <a:r>
+              <a:rPr lang="en-US" sz="2400" dirty="0" err="1">
+                <a:solidFill>
+                  <a:schemeClr val="tx1"/>
+                </a:solidFill>
+              </a:rPr>
+              <a:t>PushingClocks</a:t>
+            </a:r>
+            <a:r>
+              <a:rPr lang="en-US" sz="2400" dirty="0">
+                <a:solidFill>
+                  <a:schemeClr val="tx1"/>
+                </a:solidFill>
+              </a:rPr>
+              <a:t>/</a:t>
+            </a:r>
             <a:r>
               <a:rPr lang="en-US" sz="2400" dirty="0" err="1">
                 <a:solidFill>
@@ -27460,6 +27602,91 @@
           </a:p>
         </p:txBody>
       </p:sp>
+      <p:sp>
+        <p:nvSpPr>
+          <p:cNvPr id="4" name="Rectangle: Rounded Corners 3">
+            <a:extLst>
+              <a:ext uri="{FF2B5EF4-FFF2-40B4-BE49-F238E27FC236}">
+                <a16:creationId xmlns:a16="http://schemas.microsoft.com/office/drawing/2014/main" id="{A00FEE15-3142-E54B-552F-A9FDBC4FDD4A}"/>
+              </a:ext>
+            </a:extLst>
+          </p:cNvPr>
+          <p:cNvSpPr/>
+          <p:nvPr/>
+        </p:nvSpPr>
+        <p:spPr>
+          <a:xfrm>
+            <a:off x="6096000" y="5231446"/>
+            <a:ext cx="5671087" cy="601981"/>
+          </a:xfrm>
+          <a:prstGeom prst="roundRect">
+            <a:avLst/>
+          </a:prstGeom>
+          <a:solidFill>
+            <a:schemeClr val="accent6">
+              <a:lumMod val="20000"/>
+              <a:lumOff val="80000"/>
+            </a:schemeClr>
+          </a:solidFill>
+          <a:ln>
+            <a:solidFill>
+              <a:srgbClr val="0070C0"/>
+            </a:solidFill>
+          </a:ln>
+        </p:spPr>
+        <p:style>
+          <a:lnRef idx="2">
+            <a:schemeClr val="accent1">
+              <a:shade val="50000"/>
+            </a:schemeClr>
+          </a:lnRef>
+          <a:fillRef idx="1">
+            <a:schemeClr val="accent1"/>
+          </a:fillRef>
+          <a:effectRef idx="0">
+            <a:schemeClr val="accent1"/>
+          </a:effectRef>
+          <a:fontRef idx="minor">
+            <a:schemeClr val="lt1"/>
+          </a:fontRef>
+        </p:style>
+        <p:txBody>
+          <a:bodyPr rtlCol="0" anchor="ctr"/>
+          <a:lstStyle/>
+          <a:p>
+            <a:pPr algn="ctr"/>
+            <a:r>
+              <a:rPr lang="en-US" sz="2400" dirty="0" err="1">
+                <a:solidFill>
+                  <a:schemeClr val="tx1"/>
+                </a:solidFill>
+              </a:rPr>
+              <a:t>PushingClocks</a:t>
+            </a:r>
+            <a:r>
+              <a:rPr lang="en-US" sz="2400" dirty="0">
+                <a:solidFill>
+                  <a:schemeClr val="tx1"/>
+                </a:solidFill>
+              </a:rPr>
+              <a:t>/</a:t>
+            </a:r>
+            <a:r>
+              <a:rPr lang="en-US" sz="2400" dirty="0" err="1">
+                <a:solidFill>
+                  <a:schemeClr val="tx1"/>
+                </a:solidFill>
+              </a:rPr>
+              <a:t>IPushingClockAndClients.ts</a:t>
+            </a:r>
+            <a:endParaRPr lang="en-US" sz="2400" dirty="0">
+              <a:solidFill>
+                <a:schemeClr val="tx1"/>
+              </a:solidFill>
+            </a:endParaRPr>
+          </a:p>
+        </p:txBody>
+      </p:sp>
     </p:spTree>
     <p:extLst>
       <p:ext uri="{BB962C8B-B14F-4D97-AF65-F5344CB8AC3E}">
@@ -28338,6 +28565,91 @@
           </a:p>
         </p:txBody>
       </p:sp>
+      <p:sp>
+        <p:nvSpPr>
+          <p:cNvPr id="4" name="Rectangle: Rounded Corners 3">
+            <a:extLst>
+              <a:ext uri="{FF2B5EF4-FFF2-40B4-BE49-F238E27FC236}">
+                <a16:creationId xmlns:a16="http://schemas.microsoft.com/office/drawing/2014/main" id="{CBD743B4-AB68-ADDE-00C4-44C04CF43AA0}"/>
+              </a:ext>
+            </a:extLst>
+          </p:cNvPr>
+          <p:cNvSpPr/>
+          <p:nvPr/>
+        </p:nvSpPr>
+        <p:spPr>
+          <a:xfrm>
+            <a:off x="6295627" y="361790"/>
+            <a:ext cx="5671087" cy="601981"/>
+          </a:xfrm>
+          <a:prstGeom prst="roundRect">
+            <a:avLst/>
+          </a:prstGeom>
+          <a:solidFill>
+            <a:schemeClr val="accent6">
+              <a:lumMod val="20000"/>
+              <a:lumOff val="80000"/>
+            </a:schemeClr>
+          </a:solidFill>
+          <a:ln>
+            <a:solidFill>
+              <a:srgbClr val="0070C0"/>
+            </a:solidFill>
+          </a:ln>
+        </p:spPr>
+        <p:style>
+          <a:lnRef idx="2">
+            <a:schemeClr val="accent1">
+              <a:shade val="50000"/>
+            </a:schemeClr>
+          </a:lnRef>
+          <a:fillRef idx="1">
+            <a:schemeClr val="accent1"/>
+          </a:fillRef>
+          <a:effectRef idx="0">
+            <a:schemeClr val="accent1"/>
+          </a:effectRef>
+          <a:fontRef idx="minor">
+            <a:schemeClr val="lt1"/>
+          </a:fontRef>
+        </p:style>
+        <p:txBody>
+          <a:bodyPr rtlCol="0" anchor="ctr"/>
+          <a:lstStyle/>
+          <a:p>
+            <a:pPr algn="ctr"/>
+            <a:r>
+              <a:rPr lang="en-US" sz="2400" dirty="0" err="1">
+                <a:solidFill>
+                  <a:schemeClr val="tx1"/>
+                </a:solidFill>
+              </a:rPr>
+              <a:t>PushingClocks</a:t>
+            </a:r>
+            <a:r>
+              <a:rPr lang="en-US" sz="2400" dirty="0">
+                <a:solidFill>
+                  <a:schemeClr val="tx1"/>
+                </a:solidFill>
+              </a:rPr>
+              <a:t>/</a:t>
+            </a:r>
+            <a:r>
+              <a:rPr lang="en-US" sz="2400" dirty="0" err="1">
+                <a:solidFill>
+                  <a:schemeClr val="tx1"/>
+                </a:solidFill>
+              </a:rPr>
+              <a:t>PushingClock.test.ts</a:t>
+            </a:r>
+            <a:endParaRPr lang="en-US" sz="2400" dirty="0">
+              <a:solidFill>
+                <a:schemeClr val="tx1"/>
+              </a:solidFill>
+            </a:endParaRPr>
+          </a:p>
+        </p:txBody>
+      </p:sp>
     </p:spTree>
     <p:extLst>
       <p:ext uri="{BB962C8B-B14F-4D97-AF65-F5344CB8AC3E}">
@@ -29447,6 +29759,91 @@
               </a:rPr>
               <a:t>    })</a:t>
             </a:r>
+          </a:p>
+        </p:txBody>
+      </p:sp>
+      <p:sp>
+        <p:nvSpPr>
+          <p:cNvPr id="4" name="Rectangle: Rounded Corners 3">
+            <a:extLst>
+              <a:ext uri="{FF2B5EF4-FFF2-40B4-BE49-F238E27FC236}">
+                <a16:creationId xmlns:a16="http://schemas.microsoft.com/office/drawing/2014/main" id="{53BF4FA0-4735-B573-EBE2-4F2226C59FDA}"/>
+              </a:ext>
+            </a:extLst>
+          </p:cNvPr>
+          <p:cNvSpPr/>
+          <p:nvPr/>
+        </p:nvSpPr>
+        <p:spPr>
+          <a:xfrm>
+            <a:off x="6096000" y="5454143"/>
+            <a:ext cx="5671087" cy="601981"/>
+          </a:xfrm>
+          <a:prstGeom prst="roundRect">
+            <a:avLst/>
+          </a:prstGeom>
+          <a:solidFill>
+            <a:schemeClr val="accent6">
+              <a:lumMod val="20000"/>
+              <a:lumOff val="80000"/>
+            </a:schemeClr>
+          </a:solidFill>
+          <a:ln>
+            <a:solidFill>
+              <a:srgbClr val="0070C0"/>
+            </a:solidFill>
+          </a:ln>
+        </p:spPr>
+        <p:style>
+          <a:lnRef idx="2">
+            <a:schemeClr val="accent1">
+              <a:shade val="50000"/>
+            </a:schemeClr>
+          </a:lnRef>
+          <a:fillRef idx="1">
+            <a:schemeClr val="accent1"/>
+          </a:fillRef>
+          <a:effectRef idx="0">
+            <a:schemeClr val="accent1"/>
+          </a:effectRef>
+          <a:fontRef idx="minor">
+            <a:schemeClr val="lt1"/>
+          </a:fontRef>
+        </p:style>
+        <p:txBody>
+          <a:bodyPr rtlCol="0" anchor="ctr"/>
+          <a:lstStyle/>
+          <a:p>
+            <a:pPr algn="ctr"/>
+            <a:r>
+              <a:rPr lang="en-US" sz="2400" dirty="0" err="1">
+                <a:solidFill>
+                  <a:schemeClr val="tx1"/>
+                </a:solidFill>
+              </a:rPr>
+              <a:t>PushingClocks</a:t>
+            </a:r>
+            <a:r>
+              <a:rPr lang="en-US" sz="2400" dirty="0">
+                <a:solidFill>
+                  <a:schemeClr val="tx1"/>
+                </a:solidFill>
+              </a:rPr>
+              <a:t>/</a:t>
+            </a:r>
+            <a:r>
+              <a:rPr lang="en-US" sz="2400" dirty="0" err="1">
+                <a:solidFill>
+                  <a:schemeClr val="tx1"/>
+                </a:solidFill>
+              </a:rPr>
+              <a:t>IPushingClockAndClients.ts</a:t>
+            </a:r>
+            <a:endParaRPr lang="en-US" sz="2400" dirty="0">
+              <a:solidFill>
+                <a:schemeClr val="tx1"/>
+              </a:solidFill>
+            </a:endParaRPr>
           </a:p>
         </p:txBody>
       </p:sp>
@@ -30898,6 +31295,91 @@
           </a:p>
         </p:txBody>
       </p:sp>
+      <p:sp>
+        <p:nvSpPr>
+          <p:cNvPr id="9" name="Rectangle: Rounded Corners 8">
+            <a:extLst>
+              <a:ext uri="{FF2B5EF4-FFF2-40B4-BE49-F238E27FC236}">
+                <a16:creationId xmlns:a16="http://schemas.microsoft.com/office/drawing/2014/main" id="{DDCA262B-070C-459D-9AF9-8E3ADA463D0C}"/>
+              </a:ext>
+            </a:extLst>
+          </p:cNvPr>
+          <p:cNvSpPr/>
+          <p:nvPr/>
+        </p:nvSpPr>
+        <p:spPr>
+          <a:xfrm>
+            <a:off x="6337300" y="136525"/>
+            <a:ext cx="5671087" cy="601981"/>
+          </a:xfrm>
+          <a:prstGeom prst="roundRect">
+            <a:avLst/>
+          </a:prstGeom>
+          <a:solidFill>
+            <a:schemeClr val="accent6">
+              <a:lumMod val="20000"/>
+              <a:lumOff val="80000"/>
+            </a:schemeClr>
+          </a:solidFill>
+          <a:ln>
+            <a:solidFill>
+              <a:srgbClr val="0070C0"/>
+            </a:solidFill>
+          </a:ln>
+        </p:spPr>
+        <p:style>
+          <a:lnRef idx="2">
+            <a:schemeClr val="accent1">
+              <a:shade val="50000"/>
+            </a:schemeClr>
+          </a:lnRef>
+          <a:fillRef idx="1">
+            <a:schemeClr val="accent1"/>
+          </a:fillRef>
+          <a:effectRef idx="0">
+            <a:schemeClr val="accent1"/>
+          </a:effectRef>
+          <a:fontRef idx="minor">
+            <a:schemeClr val="lt1"/>
+          </a:fontRef>
+        </p:style>
+        <p:txBody>
+          <a:bodyPr rtlCol="0" anchor="ctr"/>
+          <a:lstStyle/>
+          <a:p>
+            <a:pPr algn="ctr"/>
+            <a:r>
+              <a:rPr lang="en-US" sz="2400" dirty="0" err="1">
+                <a:solidFill>
+                  <a:schemeClr val="tx1"/>
+                </a:solidFill>
+              </a:rPr>
+              <a:t>CallBacks</a:t>
+            </a:r>
+            <a:r>
+              <a:rPr lang="en-US" sz="2400" dirty="0">
+                <a:solidFill>
+                  <a:schemeClr val="tx1"/>
+                </a:solidFill>
+              </a:rPr>
+              <a:t>/</a:t>
+            </a:r>
+            <a:r>
+              <a:rPr lang="en-US" sz="2400" dirty="0" err="1">
+                <a:solidFill>
+                  <a:schemeClr val="tx1"/>
+                </a:solidFill>
+              </a:rPr>
+              <a:t>callBackExample.test.ts</a:t>
+            </a:r>
+            <a:endParaRPr lang="en-US" sz="2400" dirty="0">
+              <a:solidFill>
+                <a:schemeClr val="tx1"/>
+              </a:solidFill>
+            </a:endParaRPr>
+          </a:p>
+        </p:txBody>
+      </p:sp>
     </p:spTree>
     <p:extLst>
       <p:ext uri="{BB962C8B-B14F-4D97-AF65-F5344CB8AC3E}">
@@ -32612,6 +33094,91 @@
               </a:solidFill>
               <a:effectLst/>
               <a:latin typeface="Consolas" panose="020B0609020204030204" pitchFamily="49" charset="0"/>
+            </a:endParaRPr>
+          </a:p>
+        </p:txBody>
+      </p:sp>
+      <p:sp>
+        <p:nvSpPr>
+          <p:cNvPr id="9" name="Rectangle: Rounded Corners 8">
+            <a:extLst>
+              <a:ext uri="{FF2B5EF4-FFF2-40B4-BE49-F238E27FC236}">
+                <a16:creationId xmlns:a16="http://schemas.microsoft.com/office/drawing/2014/main" id="{D3F528BC-E36B-FB84-4EB6-9C477E03CD2E}"/>
+              </a:ext>
+            </a:extLst>
+          </p:cNvPr>
+          <p:cNvSpPr/>
+          <p:nvPr/>
+        </p:nvSpPr>
+        <p:spPr>
+          <a:xfrm>
+            <a:off x="6337300" y="136525"/>
+            <a:ext cx="5671087" cy="601981"/>
+          </a:xfrm>
+          <a:prstGeom prst="roundRect">
+            <a:avLst/>
+          </a:prstGeom>
+          <a:solidFill>
+            <a:schemeClr val="accent6">
+              <a:lumMod val="20000"/>
+              <a:lumOff val="80000"/>
+            </a:schemeClr>
+          </a:solidFill>
+          <a:ln>
+            <a:solidFill>
+              <a:srgbClr val="0070C0"/>
+            </a:solidFill>
+          </a:ln>
+        </p:spPr>
+        <p:style>
+          <a:lnRef idx="2">
+            <a:schemeClr val="accent1">
+              <a:shade val="50000"/>
+            </a:schemeClr>
+          </a:lnRef>
+          <a:fillRef idx="1">
+            <a:schemeClr val="accent1"/>
+          </a:fillRef>
+          <a:effectRef idx="0">
+            <a:schemeClr val="accent1"/>
+          </a:effectRef>
+          <a:fontRef idx="minor">
+            <a:schemeClr val="lt1"/>
+          </a:fontRef>
+        </p:style>
+        <p:txBody>
+          <a:bodyPr rtlCol="0" anchor="ctr"/>
+          <a:lstStyle/>
+          <a:p>
+            <a:pPr algn="ctr"/>
+            <a:r>
+              <a:rPr lang="en-US" sz="2400" dirty="0" err="1">
+                <a:solidFill>
+                  <a:schemeClr val="tx1"/>
+                </a:solidFill>
+              </a:rPr>
+              <a:t>CallBacks</a:t>
+            </a:r>
+            <a:r>
+              <a:rPr lang="en-US" sz="2400" dirty="0">
+                <a:solidFill>
+                  <a:schemeClr val="tx1"/>
+                </a:solidFill>
+              </a:rPr>
+              <a:t>/</a:t>
+            </a:r>
+            <a:r>
+              <a:rPr lang="en-US" sz="2400" dirty="0" err="1">
+                <a:solidFill>
+                  <a:schemeClr val="tx1"/>
+                </a:solidFill>
+              </a:rPr>
+              <a:t>callBackExample.ts</a:t>
+            </a:r>
+            <a:endParaRPr lang="en-US" sz="2400" dirty="0">
+              <a:solidFill>
+                <a:schemeClr val="tx1"/>
+              </a:solidFill>
             </a:endParaRPr>
           </a:p>
         </p:txBody>
@@ -33349,8 +33916,8 @@
         </p:nvSpPr>
         <p:spPr>
           <a:xfrm>
-            <a:off x="7603655" y="1837767"/>
-            <a:ext cx="4246534" cy="601981"/>
+            <a:off x="5523316" y="5406467"/>
+            <a:ext cx="6174567" cy="601981"/>
           </a:xfrm>
           <a:prstGeom prst="roundRect">
             <a:avLst/>
@@ -33388,6 +33955,22 @@
           <a:lstStyle/>
           <a:p>
             <a:pPr algn="ctr"/>
+            <a:r>
+              <a:rPr lang="en-US" sz="2400" dirty="0" err="1">
+                <a:solidFill>
+                  <a:schemeClr val="tx1"/>
+                </a:solidFill>
+              </a:rPr>
+              <a:t>EmittingClocks</a:t>
+            </a:r>
+            <a:r>
+              <a:rPr lang="en-US" sz="2400" dirty="0">
+                <a:solidFill>
+                  <a:schemeClr val="tx1"/>
+                </a:solidFill>
+              </a:rPr>
+              <a:t>/</a:t>
+            </a:r>
             <a:r>
               <a:rPr lang="en-US" sz="2400" dirty="0" err="1">
                 <a:solidFill>
@@ -34739,6 +35322,91 @@
           </a:p>
         </p:txBody>
       </p:sp>
+      <p:sp>
+        <p:nvSpPr>
+          <p:cNvPr id="7" name="Rectangle: Rounded Corners 6">
+            <a:extLst>
+              <a:ext uri="{FF2B5EF4-FFF2-40B4-BE49-F238E27FC236}">
+                <a16:creationId xmlns:a16="http://schemas.microsoft.com/office/drawing/2014/main" id="{45C4BD2F-6E4A-0EC4-EA05-B4EB2F905906}"/>
+              </a:ext>
+            </a:extLst>
+          </p:cNvPr>
+          <p:cNvSpPr/>
+          <p:nvPr/>
+        </p:nvSpPr>
+        <p:spPr>
+          <a:xfrm>
+            <a:off x="5802716" y="271104"/>
+            <a:ext cx="6174567" cy="601981"/>
+          </a:xfrm>
+          <a:prstGeom prst="roundRect">
+            <a:avLst/>
+          </a:prstGeom>
+          <a:solidFill>
+            <a:schemeClr val="accent6">
+              <a:lumMod val="20000"/>
+              <a:lumOff val="80000"/>
+            </a:schemeClr>
+          </a:solidFill>
+          <a:ln>
+            <a:solidFill>
+              <a:srgbClr val="0070C0"/>
+            </a:solidFill>
+          </a:ln>
+        </p:spPr>
+        <p:style>
+          <a:lnRef idx="2">
+            <a:schemeClr val="accent1">
+              <a:shade val="50000"/>
+            </a:schemeClr>
+          </a:lnRef>
+          <a:fillRef idx="1">
+            <a:schemeClr val="accent1"/>
+          </a:fillRef>
+          <a:effectRef idx="0">
+            <a:schemeClr val="accent1"/>
+          </a:effectRef>
+          <a:fontRef idx="minor">
+            <a:schemeClr val="lt1"/>
+          </a:fontRef>
+        </p:style>
+        <p:txBody>
+          <a:bodyPr rtlCol="0" anchor="ctr"/>
+          <a:lstStyle/>
+          <a:p>
+            <a:pPr algn="ctr"/>
+            <a:r>
+              <a:rPr lang="en-US" sz="2400" dirty="0" err="1">
+                <a:solidFill>
+                  <a:schemeClr val="tx1"/>
+                </a:solidFill>
+              </a:rPr>
+              <a:t>EmittingClocks</a:t>
+            </a:r>
+            <a:r>
+              <a:rPr lang="en-US" sz="2400" dirty="0">
+                <a:solidFill>
+                  <a:schemeClr val="tx1"/>
+                </a:solidFill>
+              </a:rPr>
+              <a:t>/</a:t>
+            </a:r>
+            <a:r>
+              <a:rPr lang="en-US" sz="2400" dirty="0" err="1">
+                <a:solidFill>
+                  <a:schemeClr val="tx1"/>
+                </a:solidFill>
+              </a:rPr>
+              <a:t>IEmittingClockAndClients.ts</a:t>
+            </a:r>
+            <a:endParaRPr lang="en-US" sz="2400" dirty="0">
+              <a:solidFill>
+                <a:schemeClr val="tx1"/>
+              </a:solidFill>
+            </a:endParaRPr>
+          </a:p>
+        </p:txBody>
+      </p:sp>
     </p:spTree>
     <p:extLst>
       <p:ext uri="{BB962C8B-B14F-4D97-AF65-F5344CB8AC3E}">
@@ -35318,6 +35986,91 @@
               </a:rPr>
               <a:t>}</a:t>
             </a:r>
+          </a:p>
+        </p:txBody>
+      </p:sp>
+      <p:sp>
+        <p:nvSpPr>
+          <p:cNvPr id="3" name="Rectangle: Rounded Corners 2">
+            <a:extLst>
+              <a:ext uri="{FF2B5EF4-FFF2-40B4-BE49-F238E27FC236}">
+                <a16:creationId xmlns:a16="http://schemas.microsoft.com/office/drawing/2014/main" id="{B1F35F52-6E7B-0314-C10A-3DBB46B1636A}"/>
+              </a:ext>
+            </a:extLst>
+          </p:cNvPr>
+          <p:cNvSpPr/>
+          <p:nvPr/>
+        </p:nvSpPr>
+        <p:spPr>
+          <a:xfrm>
+            <a:off x="5179233" y="5514351"/>
+            <a:ext cx="6174567" cy="601981"/>
+          </a:xfrm>
+          <a:prstGeom prst="roundRect">
+            <a:avLst/>
+          </a:prstGeom>
+          <a:solidFill>
+            <a:schemeClr val="accent6">
+              <a:lumMod val="20000"/>
+              <a:lumOff val="80000"/>
+            </a:schemeClr>
+          </a:solidFill>
+          <a:ln>
+            <a:solidFill>
+              <a:srgbClr val="0070C0"/>
+            </a:solidFill>
+          </a:ln>
+        </p:spPr>
+        <p:style>
+          <a:lnRef idx="2">
+            <a:schemeClr val="accent1">
+              <a:shade val="50000"/>
+            </a:schemeClr>
+          </a:lnRef>
+          <a:fillRef idx="1">
+            <a:schemeClr val="accent1"/>
+          </a:fillRef>
+          <a:effectRef idx="0">
+            <a:schemeClr val="accent1"/>
+          </a:effectRef>
+          <a:fontRef idx="minor">
+            <a:schemeClr val="lt1"/>
+          </a:fontRef>
+        </p:style>
+        <p:txBody>
+          <a:bodyPr rtlCol="0" anchor="ctr"/>
+          <a:lstStyle/>
+          <a:p>
+            <a:pPr algn="ctr"/>
+            <a:r>
+              <a:rPr lang="en-US" sz="2400" dirty="0" err="1">
+                <a:solidFill>
+                  <a:schemeClr val="tx1"/>
+                </a:solidFill>
+              </a:rPr>
+              <a:t>EmittingClocks</a:t>
+            </a:r>
+            <a:r>
+              <a:rPr lang="en-US" sz="2400" dirty="0">
+                <a:solidFill>
+                  <a:schemeClr val="tx1"/>
+                </a:solidFill>
+              </a:rPr>
+              <a:t>/</a:t>
+            </a:r>
+            <a:r>
+              <a:rPr lang="en-US" sz="2400" dirty="0" err="1">
+                <a:solidFill>
+                  <a:schemeClr val="tx1"/>
+                </a:solidFill>
+              </a:rPr>
+              <a:t>IEmittingClockAndClients.ts</a:t>
+            </a:r>
+            <a:endParaRPr lang="en-US" sz="2400" dirty="0">
+              <a:solidFill>
+                <a:schemeClr val="tx1"/>
+              </a:solidFill>
+            </a:endParaRPr>
           </a:p>
         </p:txBody>
       </p:sp>
@@ -36405,6 +37158,91 @@
           </a:p>
         </p:txBody>
       </p:sp>
+      <p:sp>
+        <p:nvSpPr>
+          <p:cNvPr id="4" name="Rectangle: Rounded Corners 3">
+            <a:extLst>
+              <a:ext uri="{FF2B5EF4-FFF2-40B4-BE49-F238E27FC236}">
+                <a16:creationId xmlns:a16="http://schemas.microsoft.com/office/drawing/2014/main" id="{6BA12E4F-86E7-8B01-60AE-73FDC6587F1E}"/>
+              </a:ext>
+            </a:extLst>
+          </p:cNvPr>
+          <p:cNvSpPr/>
+          <p:nvPr/>
+        </p:nvSpPr>
+        <p:spPr>
+          <a:xfrm>
+            <a:off x="5179233" y="325557"/>
+            <a:ext cx="6174567" cy="601981"/>
+          </a:xfrm>
+          <a:prstGeom prst="roundRect">
+            <a:avLst/>
+          </a:prstGeom>
+          <a:solidFill>
+            <a:schemeClr val="accent6">
+              <a:lumMod val="20000"/>
+              <a:lumOff val="80000"/>
+            </a:schemeClr>
+          </a:solidFill>
+          <a:ln>
+            <a:solidFill>
+              <a:srgbClr val="0070C0"/>
+            </a:solidFill>
+          </a:ln>
+        </p:spPr>
+        <p:style>
+          <a:lnRef idx="2">
+            <a:schemeClr val="accent1">
+              <a:shade val="50000"/>
+            </a:schemeClr>
+          </a:lnRef>
+          <a:fillRef idx="1">
+            <a:schemeClr val="accent1"/>
+          </a:fillRef>
+          <a:effectRef idx="0">
+            <a:schemeClr val="accent1"/>
+          </a:effectRef>
+          <a:fontRef idx="minor">
+            <a:schemeClr val="lt1"/>
+          </a:fontRef>
+        </p:style>
+        <p:txBody>
+          <a:bodyPr rtlCol="0" anchor="ctr"/>
+          <a:lstStyle/>
+          <a:p>
+            <a:pPr algn="ctr"/>
+            <a:r>
+              <a:rPr lang="en-US" sz="2400" dirty="0" err="1">
+                <a:solidFill>
+                  <a:schemeClr val="tx1"/>
+                </a:solidFill>
+              </a:rPr>
+              <a:t>EmittingClocks</a:t>
+            </a:r>
+            <a:r>
+              <a:rPr lang="en-US" sz="2400" dirty="0">
+                <a:solidFill>
+                  <a:schemeClr val="tx1"/>
+                </a:solidFill>
+              </a:rPr>
+              <a:t>/</a:t>
+            </a:r>
+            <a:r>
+              <a:rPr lang="en-US" sz="2400" dirty="0" err="1">
+                <a:solidFill>
+                  <a:schemeClr val="tx1"/>
+                </a:solidFill>
+              </a:rPr>
+              <a:t>IEmittingClockAndClients.ts</a:t>
+            </a:r>
+            <a:endParaRPr lang="en-US" sz="2400" dirty="0">
+              <a:solidFill>
+                <a:schemeClr val="tx1"/>
+              </a:solidFill>
+            </a:endParaRPr>
+          </a:p>
+        </p:txBody>
+      </p:sp>
     </p:spTree>
     <p:extLst>
       <p:ext uri="{BB962C8B-B14F-4D97-AF65-F5344CB8AC3E}">
@@ -37303,13 +38141,112 @@
               <a:t>    </a:t>
             </a:r>
             <a:r>
-              <a:rPr lang="en-US" b="0" dirty="0">
+              <a:rPr lang="en-US" b="0" dirty="0" err="1">
+                <a:solidFill>
+                  <a:srgbClr val="000000"/>
+                </a:solidFill>
+                <a:effectLst/>
+                <a:latin typeface="Consolas" panose="020B0609020204030204" pitchFamily="49" charset="0"/>
+              </a:rPr>
+              <a:t>getT</a:t>
+            </a:r>
+            <a:r>
+              <a:rPr lang="en-US" b="0" dirty="0" err="1">
                 <a:solidFill>
                   <a:srgbClr val="795E26"/>
                 </a:solidFill>
                 <a:effectLst/>
                 <a:latin typeface="Consolas" panose="020B0609020204030204" pitchFamily="49" charset="0"/>
               </a:rPr>
+              <a:t>ime</a:t>
+            </a:r>
+            <a:r>
+              <a:rPr lang="en-US" dirty="0">
+                <a:solidFill>
+                  <a:srgbClr val="795E26"/>
+                </a:solidFill>
+                <a:latin typeface="Consolas" panose="020B0609020204030204" pitchFamily="49" charset="0"/>
+              </a:rPr>
+              <a:t>()</a:t>
+            </a:r>
+            <a:r>
+              <a:rPr lang="en-US" b="0" dirty="0">
+                <a:solidFill>
+                  <a:srgbClr val="000000"/>
+                </a:solidFill>
+                <a:effectLst/>
+                <a:latin typeface="Consolas" panose="020B0609020204030204" pitchFamily="49" charset="0"/>
+              </a:rPr>
+              <a:t>: </a:t>
+            </a:r>
+            <a:r>
+              <a:rPr lang="en-US" b="0" dirty="0">
+                <a:solidFill>
+                  <a:srgbClr val="267F99"/>
+                </a:solidFill>
+                <a:effectLst/>
+                <a:latin typeface="Consolas" panose="020B0609020204030204" pitchFamily="49" charset="0"/>
+              </a:rPr>
+              <a:t>number</a:t>
+            </a:r>
+            <a:r>
+              <a:rPr lang="en-US" b="0" dirty="0">
+                <a:solidFill>
+                  <a:srgbClr val="000000"/>
+                </a:solidFill>
+                <a:effectLst/>
+                <a:latin typeface="Consolas" panose="020B0609020204030204" pitchFamily="49" charset="0"/>
+              </a:rPr>
+              <a:t> { </a:t>
+            </a:r>
+            <a:r>
+              <a:rPr lang="en-US" b="0" dirty="0">
+                <a:solidFill>
+                  <a:srgbClr val="AF00DB"/>
+                </a:solidFill>
+                <a:effectLst/>
+                <a:latin typeface="Consolas" panose="020B0609020204030204" pitchFamily="49" charset="0"/>
+              </a:rPr>
+              <a:t>return</a:t>
+            </a:r>
+            <a:r>
+              <a:rPr lang="en-US" b="0" dirty="0">
+                <a:solidFill>
+                  <a:srgbClr val="000000"/>
+                </a:solidFill>
+                <a:effectLst/>
+                <a:latin typeface="Consolas" panose="020B0609020204030204" pitchFamily="49" charset="0"/>
+              </a:rPr>
+              <a:t> </a:t>
+            </a:r>
+            <a:r>
+              <a:rPr lang="en-US" b="0" dirty="0" err="1">
+                <a:solidFill>
+                  <a:srgbClr val="0000FF"/>
+                </a:solidFill>
+                <a:effectLst/>
+                <a:latin typeface="Consolas" panose="020B0609020204030204" pitchFamily="49" charset="0"/>
+              </a:rPr>
+              <a:t>this</a:t>
+            </a:r>
+            <a:r>
+              <a:rPr lang="en-US" b="0" dirty="0" err="1">
+                <a:solidFill>
+                  <a:srgbClr val="000000"/>
+                </a:solidFill>
+                <a:effectLst/>
+                <a:latin typeface="Consolas" panose="020B0609020204030204" pitchFamily="49" charset="0"/>
+              </a:rPr>
+              <a:t>.</a:t>
+            </a:r>
+            <a:r>
+              <a:rPr lang="en-US" b="0" dirty="0" err="1">
+                <a:solidFill>
+                  <a:srgbClr val="001080"/>
+                </a:solidFill>
+                <a:effectLst/>
+                <a:latin typeface="Consolas" panose="020B0609020204030204" pitchFamily="49" charset="0"/>
+              </a:rPr>
               <a:t>time</a:t>
             </a:r>
             <a:r>
@@ -37320,86 +38257,6 @@
                 <a:effectLst/>
                 <a:latin typeface="Consolas" panose="020B0609020204030204" pitchFamily="49" charset="0"/>
               </a:rPr>
-              <a:t>: </a:t>
-            </a:r>
-            <a:r>
-              <a:rPr lang="en-US" b="0" dirty="0">
-                <a:solidFill>
-                  <a:srgbClr val="267F99"/>
-                </a:solidFill>
-                <a:effectLst/>
-                <a:latin typeface="Consolas" panose="020B0609020204030204" pitchFamily="49" charset="0"/>
-              </a:rPr>
-              <a:t>number</a:t>
-            </a:r>
-            <a:r>
-              <a:rPr lang="en-US" b="0" dirty="0">
-                <a:solidFill>
-                  <a:srgbClr val="000000"/>
-                </a:solidFill>
-                <a:effectLst/>
-                <a:latin typeface="Consolas" panose="020B0609020204030204" pitchFamily="49" charset="0"/>
-              </a:rPr>
-              <a:t> { </a:t>
-            </a:r>
-            <a:r>
-              <a:rPr lang="en-US" b="0" dirty="0">
-                <a:solidFill>
-                  <a:srgbClr val="AF00DB"/>
-                </a:solidFill>
-                <a:effectLst/>
-                <a:latin typeface="Consolas" panose="020B0609020204030204" pitchFamily="49" charset="0"/>
-              </a:rPr>
-              <a:t>return</a:t>
-            </a:r>
-            <a:r>
-              <a:rPr lang="en-US" b="0" dirty="0">
-                <a:solidFill>
-                  <a:srgbClr val="000000"/>
-                </a:solidFill>
-                <a:effectLst/>
-                <a:latin typeface="Consolas" panose="020B0609020204030204" pitchFamily="49" charset="0"/>
-              </a:rPr>
-              <a:t> </a:t>
-            </a:r>
-            <a:r>
-              <a:rPr lang="en-US" b="0" dirty="0" err="1">
-                <a:solidFill>
-                  <a:srgbClr val="0000FF"/>
-                </a:solidFill>
-                <a:effectLst/>
-                <a:latin typeface="Consolas" panose="020B0609020204030204" pitchFamily="49" charset="0"/>
-              </a:rPr>
-              <a:t>this</a:t>
-            </a:r>
-            <a:r>
-              <a:rPr lang="en-US" b="0" dirty="0" err="1">
-                <a:solidFill>
-                  <a:srgbClr val="000000"/>
-                </a:solidFill>
-                <a:effectLst/>
-                <a:latin typeface="Consolas" panose="020B0609020204030204" pitchFamily="49" charset="0"/>
-              </a:rPr>
-              <a:t>.</a:t>
-            </a:r>
-            <a:r>
-              <a:rPr lang="en-US" b="0" dirty="0" err="1">
-                <a:solidFill>
-                  <a:srgbClr val="001080"/>
-                </a:solidFill>
-                <a:effectLst/>
-                <a:latin typeface="Consolas" panose="020B0609020204030204" pitchFamily="49" charset="0"/>
-              </a:rPr>
-              <a:t>time</a:t>
-            </a:r>
-            <a:r>
-              <a:rPr lang="en-US" b="0" dirty="0">
-                <a:solidFill>
-                  <a:srgbClr val="000000"/>
-                </a:solidFill>
-                <a:effectLst/>
-                <a:latin typeface="Consolas" panose="020B0609020204030204" pitchFamily="49" charset="0"/>
-              </a:rPr>
               <a:t> }</a:t>
             </a:r>
           </a:p>
@@ -37414,6 +38271,91 @@
               </a:rPr>
               <a:t>}</a:t>
             </a:r>
+          </a:p>
+        </p:txBody>
+      </p:sp>
+      <p:sp>
+        <p:nvSpPr>
+          <p:cNvPr id="4" name="Rectangle: Rounded Corners 3">
+            <a:extLst>
+              <a:ext uri="{FF2B5EF4-FFF2-40B4-BE49-F238E27FC236}">
+                <a16:creationId xmlns:a16="http://schemas.microsoft.com/office/drawing/2014/main" id="{4E6EB3B2-3C1A-C157-05EF-428A1E537B0F}"/>
+              </a:ext>
+            </a:extLst>
+          </p:cNvPr>
+          <p:cNvSpPr/>
+          <p:nvPr/>
+        </p:nvSpPr>
+        <p:spPr>
+          <a:xfrm>
+            <a:off x="5523316" y="5406467"/>
+            <a:ext cx="6174567" cy="601981"/>
+          </a:xfrm>
+          <a:prstGeom prst="roundRect">
+            <a:avLst/>
+          </a:prstGeom>
+          <a:solidFill>
+            <a:schemeClr val="accent6">
+              <a:lumMod val="20000"/>
+              <a:lumOff val="80000"/>
+            </a:schemeClr>
+          </a:solidFill>
+          <a:ln>
+            <a:solidFill>
+              <a:srgbClr val="0070C0"/>
+            </a:solidFill>
+          </a:ln>
+        </p:spPr>
+        <p:style>
+          <a:lnRef idx="2">
+            <a:schemeClr val="accent1">
+              <a:shade val="50000"/>
+            </a:schemeClr>
+          </a:lnRef>
+          <a:fillRef idx="1">
+            <a:schemeClr val="accent1"/>
+          </a:fillRef>
+          <a:effectRef idx="0">
+            <a:schemeClr val="accent1"/>
+          </a:effectRef>
+          <a:fontRef idx="minor">
+            <a:schemeClr val="lt1"/>
+          </a:fontRef>
+        </p:style>
+        <p:txBody>
+          <a:bodyPr rtlCol="0" anchor="ctr"/>
+          <a:lstStyle/>
+          <a:p>
+            <a:pPr algn="ctr"/>
+            <a:r>
+              <a:rPr lang="en-US" sz="2400" dirty="0" err="1">
+                <a:solidFill>
+                  <a:schemeClr val="tx1"/>
+                </a:solidFill>
+              </a:rPr>
+              <a:t>EmittingClocks</a:t>
+            </a:r>
+            <a:r>
+              <a:rPr lang="en-US" sz="2400" dirty="0">
+                <a:solidFill>
+                  <a:schemeClr val="tx1"/>
+                </a:solidFill>
+              </a:rPr>
+              <a:t>/</a:t>
+            </a:r>
+            <a:r>
+              <a:rPr lang="en-US" sz="2400" dirty="0" err="1">
+                <a:solidFill>
+                  <a:schemeClr val="tx1"/>
+                </a:solidFill>
+              </a:rPr>
+              <a:t>IEmittingClockAndClients.ts</a:t>
+            </a:r>
+            <a:endParaRPr lang="en-US" sz="2400" dirty="0">
+              <a:solidFill>
+                <a:schemeClr val="tx1"/>
+              </a:solidFill>
+            </a:endParaRPr>
           </a:p>
         </p:txBody>
       </p:sp>
@@ -38862,6 +39804,83 @@
           </a:p>
         </p:txBody>
       </p:sp>
+      <p:sp>
+        <p:nvSpPr>
+          <p:cNvPr id="3" name="Rectangle: Rounded Corners 2">
+            <a:extLst>
+              <a:ext uri="{FF2B5EF4-FFF2-40B4-BE49-F238E27FC236}">
+                <a16:creationId xmlns:a16="http://schemas.microsoft.com/office/drawing/2014/main" id="{0141CD11-500C-A8FE-DAD4-AD5362BF70B6}"/>
+              </a:ext>
+            </a:extLst>
+          </p:cNvPr>
+          <p:cNvSpPr/>
+          <p:nvPr/>
+        </p:nvSpPr>
+        <p:spPr>
+          <a:xfrm>
+            <a:off x="5777316" y="156208"/>
+            <a:ext cx="6174567" cy="601981"/>
+          </a:xfrm>
+          <a:prstGeom prst="roundRect">
+            <a:avLst/>
+          </a:prstGeom>
+          <a:solidFill>
+            <a:schemeClr val="accent6">
+              <a:lumMod val="20000"/>
+              <a:lumOff val="80000"/>
+            </a:schemeClr>
+          </a:solidFill>
+          <a:ln>
+            <a:solidFill>
+              <a:srgbClr val="0070C0"/>
+            </a:solidFill>
+          </a:ln>
+        </p:spPr>
+        <p:style>
+          <a:lnRef idx="2">
+            <a:schemeClr val="accent1">
+              <a:shade val="50000"/>
+            </a:schemeClr>
+          </a:lnRef>
+          <a:fillRef idx="1">
+            <a:schemeClr val="accent1"/>
+          </a:fillRef>
+          <a:effectRef idx="0">
+            <a:schemeClr val="accent1"/>
+          </a:effectRef>
+          <a:fontRef idx="minor">
+            <a:schemeClr val="lt1"/>
+          </a:fontRef>
+        </p:style>
+        <p:txBody>
+          <a:bodyPr rtlCol="0" anchor="ctr"/>
+          <a:lstStyle/>
+          <a:p>
+            <a:pPr algn="ctr"/>
+            <a:r>
+              <a:rPr lang="en-US" sz="2400" dirty="0">
+                <a:solidFill>
+                  <a:schemeClr val="tx1"/>
+                </a:solidFill>
+              </a:rPr>
+              <a:t>Singletons/</a:t>
+            </a:r>
+            <a:r>
+              <a:rPr lang="en-US" sz="2400" dirty="0" err="1">
+                <a:solidFill>
+                  <a:schemeClr val="tx1"/>
+                </a:solidFill>
+              </a:rPr>
+              <a:t>simpleClockFactory.test.ts</a:t>
+            </a:r>
+            <a:endParaRPr lang="en-US" sz="2400" dirty="0">
+              <a:solidFill>
+                <a:schemeClr val="tx1"/>
+              </a:solidFill>
+            </a:endParaRPr>
+          </a:p>
+        </p:txBody>
+      </p:sp>
     </p:spTree>
     <p:extLst>
       <p:ext uri="{BB962C8B-B14F-4D97-AF65-F5344CB8AC3E}">
@@ -40630,26 +41649,26 @@
       </p:sp>
       <p:sp>
         <p:nvSpPr>
-          <p:cNvPr id="3" name="TextBox 2">
+          <p:cNvPr id="5" name="Rectangle: Rounded Corners 4">
             <a:extLst>
               <a:ext uri="{FF2B5EF4-FFF2-40B4-BE49-F238E27FC236}">
-                <a16:creationId xmlns:a16="http://schemas.microsoft.com/office/drawing/2014/main" id="{C63C036E-136B-E9CF-FB5D-9D027B612261}"/>
+                <a16:creationId xmlns:a16="http://schemas.microsoft.com/office/drawing/2014/main" id="{36D61FA6-E790-CA09-1B0F-096E8957BC75}"/>
               </a:ext>
             </a:extLst>
           </p:cNvPr>
-          <p:cNvSpPr txBox="1"/>
+          <p:cNvSpPr/>
           <p:nvPr/>
         </p:nvSpPr>
         <p:spPr>
           <a:xfrm>
-            <a:off x="8519160" y="361791"/>
-            <a:ext cx="2834640" cy="601980"/>
+            <a:off x="5777316" y="156208"/>
+            <a:ext cx="6174567" cy="601981"/>
           </a:xfrm>
-          <a:prstGeom prst="rect">
+          <a:prstGeom prst="roundRect">
             <a:avLst/>
           </a:prstGeom>
           <a:solidFill>
-            <a:schemeClr val="accent2">
+            <a:schemeClr val="accent6">
               <a:lumMod val="20000"/>
               <a:lumOff val="80000"/>
             </a:schemeClr>
@@ -40677,24 +41696,27 @@
           </a:fontRef>
         </p:style>
         <p:txBody>
-          <a:bodyPr rot="0" spcFirstLastPara="0" vertOverflow="overflow" horzOverflow="overflow" vert="horz" wrap="none" lIns="91440" tIns="45720" rIns="91440" bIns="45720" numCol="1" spcCol="0" rtlCol="0" fromWordArt="0" anchor="ctr" anchorCtr="0" forceAA="0" compatLnSpc="1">
-            <a:prstTxWarp prst="textNoShape">
-              <a:avLst/>
-            </a:prstTxWarp>
-            <a:noAutofit/>
-          </a:bodyPr>
+          <a:bodyPr rtlCol="0" anchor="ctr"/>
           <a:lstStyle/>
           <a:p>
             <a:pPr algn="ctr"/>
             <a:r>
-              <a:rPr lang="en-US" dirty="0" err="1">
+              <a:rPr lang="en-US" sz="2400" dirty="0">
                 <a:solidFill>
                   <a:schemeClr val="tx1"/>
                 </a:solidFill>
               </a:rPr>
+              <a:t>Singletons/</a:t>
+            </a:r>
+            <a:r>
+              <a:rPr lang="en-US" sz="2400" dirty="0" err="1">
+                <a:solidFill>
+                  <a:schemeClr val="tx1"/>
+                </a:solidFill>
+              </a:rPr>
               <a:t>singletonClockFactory.test.ts</a:t>
             </a:r>
-            <a:endParaRPr lang="en-US" dirty="0">
+            <a:endParaRPr lang="en-US" sz="2400" dirty="0">
               <a:solidFill>
                 <a:schemeClr val="tx1"/>
               </a:solidFill>
@@ -40755,13 +41777,8 @@
           <a:p>
             <a:r>
               <a:rPr lang="en-US" dirty="0"/>
-              <a:t>Solution: Use a first-time through switch and a </a:t>
-            </a:r>
-            <a:r>
-              <a:rPr lang="en-US"/>
-              <a:t>private constructor</a:t>
-            </a:r>
-            <a:endParaRPr lang="en-US" dirty="0"/>
+              <a:t>Solution: Use a first-time through switch and a private constructor</a:t>
+            </a:r>
           </a:p>
         </p:txBody>
       </p:sp>
@@ -41767,26 +42784,26 @@
       </p:sp>
       <p:sp>
         <p:nvSpPr>
-          <p:cNvPr id="3" name="TextBox 2">
+          <p:cNvPr id="2" name="Rectangle: Rounded Corners 1">
             <a:extLst>
               <a:ext uri="{FF2B5EF4-FFF2-40B4-BE49-F238E27FC236}">
-                <a16:creationId xmlns:a16="http://schemas.microsoft.com/office/drawing/2014/main" id="{2EDAB71C-5E05-8995-2012-0FA009ED264C}"/>
+                <a16:creationId xmlns:a16="http://schemas.microsoft.com/office/drawing/2014/main" id="{DE3228F6-A8BD-2519-EE29-278AD8C29099}"/>
               </a:ext>
             </a:extLst>
           </p:cNvPr>
-          <p:cNvSpPr txBox="1"/>
+          <p:cNvSpPr/>
           <p:nvPr/>
         </p:nvSpPr>
         <p:spPr>
           <a:xfrm>
-            <a:off x="8952297" y="888989"/>
-            <a:ext cx="2834640" cy="601980"/>
+            <a:off x="5358216" y="5461287"/>
+            <a:ext cx="6174567" cy="601981"/>
           </a:xfrm>
-          <a:prstGeom prst="rect">
+          <a:prstGeom prst="roundRect">
             <a:avLst/>
           </a:prstGeom>
           <a:solidFill>
-            <a:schemeClr val="accent2">
+            <a:schemeClr val="accent6">
               <a:lumMod val="20000"/>
               <a:lumOff val="80000"/>
             </a:schemeClr>
@@ -41814,24 +42831,27 @@
           </a:fontRef>
         </p:style>
         <p:txBody>
-          <a:bodyPr rot="0" spcFirstLastPara="0" vertOverflow="overflow" horzOverflow="overflow" vert="horz" wrap="none" lIns="91440" tIns="45720" rIns="91440" bIns="45720" numCol="1" spcCol="0" rtlCol="0" fromWordArt="0" anchor="ctr" anchorCtr="0" forceAA="0" compatLnSpc="1">
-            <a:prstTxWarp prst="textNoShape">
-              <a:avLst/>
-            </a:prstTxWarp>
-            <a:noAutofit/>
-          </a:bodyPr>
+          <a:bodyPr rtlCol="0" anchor="ctr"/>
           <a:lstStyle/>
           <a:p>
             <a:pPr algn="ctr"/>
             <a:r>
-              <a:rPr lang="en-US" dirty="0" err="1">
+              <a:rPr lang="en-US" sz="2400" dirty="0">
                 <a:solidFill>
                   <a:schemeClr val="tx1"/>
                 </a:solidFill>
               </a:rPr>
+              <a:t>Singletons/</a:t>
+            </a:r>
+            <a:r>
+              <a:rPr lang="en-US" sz="2400" dirty="0" err="1">
+                <a:solidFill>
+                  <a:schemeClr val="tx1"/>
+                </a:solidFill>
+              </a:rPr>
               <a:t>singletonClockFactory.ts</a:t>
             </a:r>
-            <a:endParaRPr lang="en-US" dirty="0">
+            <a:endParaRPr lang="en-US" sz="2400" dirty="0">
               <a:solidFill>
                 <a:schemeClr val="tx1"/>
               </a:solidFill>

</xml_diff>

<commit_message>
tweaked slides to add notes and few minor updates
</commit_message>
<xml_diff>
--- a/Slides/Module 05 Interaction-Level Design Patterns.pptx
+++ b/Slides/Module 05 Interaction-Level Design Patterns.pptx
@@ -5525,7 +5525,24 @@
           <a:p>
             <a:r>
               <a:rPr lang="en-US" dirty="0"/>
-              <a:t>.bind() returns a new function that when called will call the original function with a specific “this” value</a:t>
+              <a:t>Bind creates a new function that will force the “this” inside the function to be the parameter passed to bind(). </a:t>
+            </a:r>
+            <a:br>
+              <a:rPr lang="en-US" dirty="0"/>
+            </a:br>
+            <a:endParaRPr lang="en-US" dirty="0"/>
+          </a:p>
+          <a:p>
+            <a:r>
+              <a:rPr lang="en-US" dirty="0"/>
+              <a:t>In a nutshell, .bind() returns a new function that when called will call the original function with a specific “this” value. </a:t>
+            </a:r>
+            <a:br>
+              <a:rPr lang="en-US" dirty="0"/>
+            </a:br>
+            <a:r>
+              <a:rPr lang="en-US" dirty="0"/>
+              <a:t>.bind() is used when you need to pass a callback (e.g. some sort of function reference), but you want the caller to call your function with a specific this value. This is most common when your function is actually a method and you want the “this” value set to be a specific object so the method will operate on that specific object . If you don't use .bind() in those cases, then the “this” value will be determined by the caller (not you) and if the caller doesn't set it specifically, it will end up being the global object or (in strict mode) undefined. If what you were passing was a method that relies on a specific value of this in order to do its job, it would not work properly with the wrong “this” value.</a:t>
             </a:r>
           </a:p>
         </p:txBody>
@@ -18620,7 +18637,7 @@
           <a:p>
             <a:r>
               <a:rPr lang="en-US" dirty="0"/>
-              <a:t>Probably there will be more than one consumer</a:t>
+              <a:t>Producer knows about the consumer. Probably there will be more than one consumer</a:t>
             </a:r>
           </a:p>
         </p:txBody>
@@ -18712,7 +18729,7 @@
           <a:p>
             <a:r>
               <a:rPr lang="en-US" dirty="0"/>
-              <a:t>The object being observed (the "subject") keeps a list of the objects who need to be notified when something changes.</a:t>
+              <a:t>The object being observed (the “subject”) keeps a list of the objects who need to be notified when something changes.</a:t>
             </a:r>
           </a:p>
           <a:p>
@@ -18725,7 +18742,7 @@
           <a:p>
             <a:r>
               <a:rPr lang="en-US" dirty="0"/>
-              <a:t>When a new object wants to be notified when the subject changes, it registers with ("subscribes to") with the subject/producer/publisher</a:t>
+              <a:t>When a new object (i.e., the “consumer”) wants to be notified when the subject changes, it registers with ("subscribes to") the subject/producer/publisher</a:t>
             </a:r>
           </a:p>
           <a:p>
@@ -29061,7 +29078,7 @@
           <a:p>
             <a:r>
               <a:rPr lang="en-US" dirty="0"/>
-              <a:t>Typically this will be a function inside the server</a:t>
+              <a:t>Typically, this will be a function inside the server</a:t>
             </a:r>
           </a:p>
           <a:p>
@@ -41839,7 +41856,7 @@
                 <a:effectLst/>
                 <a:latin typeface="Consolas" panose="020B0609020204030204" pitchFamily="49" charset="0"/>
               </a:rPr>
-              <a:t>clock1</a:t>
+              <a:t>clock2</a:t>
             </a:r>
             <a:r>
               <a:rPr lang="en-US" b="0" dirty="0">
@@ -45380,6 +45397,42 @@
           </a:p>
         </p:txBody>
       </p:sp>
+      <p:pic>
+        <p:nvPicPr>
+          <p:cNvPr id="6" name="Picture 5" descr="A book cover with a design pattern&#10;&#10;Description automatically generated">
+            <a:extLst>
+              <a:ext uri="{FF2B5EF4-FFF2-40B4-BE49-F238E27FC236}">
+                <a16:creationId xmlns:a16="http://schemas.microsoft.com/office/drawing/2014/main" id="{7E890BC2-38E9-5C27-FD42-F2ED9C963991}"/>
+              </a:ext>
+            </a:extLst>
+          </p:cNvPr>
+          <p:cNvPicPr>
+            <a:picLocks noChangeAspect="1"/>
+          </p:cNvPicPr>
+          <p:nvPr/>
+        </p:nvPicPr>
+        <p:blipFill>
+          <a:blip r:embed="rId3">
+            <a:extLst>
+              <a:ext uri="{28A0092B-C50C-407E-A947-70E740481C1C}">
+                <a14:useLocalDpi xmlns:a14="http://schemas.microsoft.com/office/drawing/2010/main" val="0"/>
+              </a:ext>
+            </a:extLst>
+          </a:blip>
+          <a:stretch>
+            <a:fillRect/>
+          </a:stretch>
+        </p:blipFill>
+        <p:spPr>
+          <a:xfrm>
+            <a:off x="8259233" y="2384178"/>
+            <a:ext cx="3094567" cy="3856306"/>
+          </a:xfrm>
+          <a:prstGeom prst="rect">
+            <a:avLst/>
+          </a:prstGeom>
+        </p:spPr>
+      </p:pic>
     </p:spTree>
     <p:extLst>
       <p:ext uri="{BB962C8B-B14F-4D97-AF65-F5344CB8AC3E}">

</xml_diff>